<commit_message>
lecture 17 in progress...
</commit_message>
<xml_diff>
--- a/classes/prog2017/Prog3-Lecture17.pptx
+++ b/classes/prog2017/Prog3-Lecture17.pptx
@@ -5,7 +5,7 @@
     <p:sldMasterId id="2147483648" r:id="rId1"/>
   </p:sldMasterIdLst>
   <p:notesMasterIdLst>
-    <p:notesMasterId r:id="rId44"/>
+    <p:notesMasterId r:id="rId46"/>
   </p:notesMasterIdLst>
   <p:sldIdLst>
     <p:sldId id="339" r:id="rId2"/>
@@ -35,21 +35,23 @@
     <p:sldId id="310" r:id="rId26"/>
     <p:sldId id="322" r:id="rId27"/>
     <p:sldId id="324" r:id="rId28"/>
-    <p:sldId id="323" r:id="rId29"/>
-    <p:sldId id="273" r:id="rId30"/>
-    <p:sldId id="274" r:id="rId31"/>
-    <p:sldId id="275" r:id="rId32"/>
-    <p:sldId id="311" r:id="rId33"/>
-    <p:sldId id="312" r:id="rId34"/>
-    <p:sldId id="321" r:id="rId35"/>
-    <p:sldId id="313" r:id="rId36"/>
-    <p:sldId id="314" r:id="rId37"/>
-    <p:sldId id="315" r:id="rId38"/>
-    <p:sldId id="320" r:id="rId39"/>
-    <p:sldId id="318" r:id="rId40"/>
-    <p:sldId id="316" r:id="rId41"/>
-    <p:sldId id="319" r:id="rId42"/>
-    <p:sldId id="332" r:id="rId43"/>
+    <p:sldId id="340" r:id="rId29"/>
+    <p:sldId id="341" r:id="rId30"/>
+    <p:sldId id="323" r:id="rId31"/>
+    <p:sldId id="273" r:id="rId32"/>
+    <p:sldId id="274" r:id="rId33"/>
+    <p:sldId id="275" r:id="rId34"/>
+    <p:sldId id="311" r:id="rId35"/>
+    <p:sldId id="312" r:id="rId36"/>
+    <p:sldId id="321" r:id="rId37"/>
+    <p:sldId id="313" r:id="rId38"/>
+    <p:sldId id="314" r:id="rId39"/>
+    <p:sldId id="315" r:id="rId40"/>
+    <p:sldId id="320" r:id="rId41"/>
+    <p:sldId id="318" r:id="rId42"/>
+    <p:sldId id="316" r:id="rId43"/>
+    <p:sldId id="319" r:id="rId44"/>
+    <p:sldId id="332" r:id="rId45"/>
   </p:sldIdLst>
   <p:sldSz cx="9144000" cy="6858000" type="screen4x3"/>
   <p:notesSz cx="6858000" cy="9144000"/>
@@ -254,7 +256,7 @@
             <a:fld id="{D58794C4-1EC2-4677-9397-D08FD83000DB}" type="datetimeFigureOut">
               <a:rPr lang="en-US" smtClean="0"/>
               <a:pPr/>
-              <a:t>10/26/2017</a:t>
+              <a:t>10/28/2017</a:t>
             </a:fld>
             <a:endParaRPr lang="en-US"/>
           </a:p>
@@ -679,7 +681,7 @@
             <a:fld id="{CE8159C0-37C1-4059-BC61-1D860E37DACA}" type="slidenum">
               <a:rPr lang="en-US" smtClean="0"/>
               <a:pPr/>
-              <a:t>29</a:t>
+              <a:t>31</a:t>
             </a:fld>
             <a:endParaRPr lang="en-US"/>
           </a:p>
@@ -766,7 +768,7 @@
             <a:fld id="{CE8159C0-37C1-4059-BC61-1D860E37DACA}" type="slidenum">
               <a:rPr lang="en-US" smtClean="0"/>
               <a:pPr/>
-              <a:t>30</a:t>
+              <a:t>32</a:t>
             </a:fld>
             <a:endParaRPr lang="en-US"/>
           </a:p>
@@ -853,7 +855,7 @@
             <a:fld id="{CE8159C0-37C1-4059-BC61-1D860E37DACA}" type="slidenum">
               <a:rPr lang="en-US" smtClean="0"/>
               <a:pPr/>
-              <a:t>31</a:t>
+              <a:t>33</a:t>
             </a:fld>
             <a:endParaRPr lang="en-US"/>
           </a:p>
@@ -1052,7 +1054,7 @@
             <a:fld id="{1D8BD707-D9CF-40AE-B4C6-C98DA3205C09}" type="datetimeFigureOut">
               <a:rPr lang="en-US" smtClean="0"/>
               <a:pPr/>
-              <a:t>10/26/2017</a:t>
+              <a:t>10/28/2017</a:t>
             </a:fld>
             <a:endParaRPr lang="en-US"/>
           </a:p>
@@ -1217,7 +1219,7 @@
             <a:fld id="{1D8BD707-D9CF-40AE-B4C6-C98DA3205C09}" type="datetimeFigureOut">
               <a:rPr lang="en-US" smtClean="0"/>
               <a:pPr/>
-              <a:t>10/26/2017</a:t>
+              <a:t>10/28/2017</a:t>
             </a:fld>
             <a:endParaRPr lang="en-US"/>
           </a:p>
@@ -1392,7 +1394,7 @@
             <a:fld id="{1D8BD707-D9CF-40AE-B4C6-C98DA3205C09}" type="datetimeFigureOut">
               <a:rPr lang="en-US" smtClean="0"/>
               <a:pPr/>
-              <a:t>10/26/2017</a:t>
+              <a:t>10/28/2017</a:t>
             </a:fld>
             <a:endParaRPr lang="en-US"/>
           </a:p>
@@ -1557,7 +1559,7 @@
             <a:fld id="{1D8BD707-D9CF-40AE-B4C6-C98DA3205C09}" type="datetimeFigureOut">
               <a:rPr lang="en-US" smtClean="0"/>
               <a:pPr/>
-              <a:t>10/26/2017</a:t>
+              <a:t>10/28/2017</a:t>
             </a:fld>
             <a:endParaRPr lang="en-US"/>
           </a:p>
@@ -1799,7 +1801,7 @@
             <a:fld id="{1D8BD707-D9CF-40AE-B4C6-C98DA3205C09}" type="datetimeFigureOut">
               <a:rPr lang="en-US" smtClean="0"/>
               <a:pPr/>
-              <a:t>10/26/2017</a:t>
+              <a:t>10/28/2017</a:t>
             </a:fld>
             <a:endParaRPr lang="en-US"/>
           </a:p>
@@ -2081,7 +2083,7 @@
             <a:fld id="{1D8BD707-D9CF-40AE-B4C6-C98DA3205C09}" type="datetimeFigureOut">
               <a:rPr lang="en-US" smtClean="0"/>
               <a:pPr/>
-              <a:t>10/26/2017</a:t>
+              <a:t>10/28/2017</a:t>
             </a:fld>
             <a:endParaRPr lang="en-US"/>
           </a:p>
@@ -2497,7 +2499,7 @@
             <a:fld id="{1D8BD707-D9CF-40AE-B4C6-C98DA3205C09}" type="datetimeFigureOut">
               <a:rPr lang="en-US" smtClean="0"/>
               <a:pPr/>
-              <a:t>10/26/2017</a:t>
+              <a:t>10/28/2017</a:t>
             </a:fld>
             <a:endParaRPr lang="en-US"/>
           </a:p>
@@ -2611,7 +2613,7 @@
             <a:fld id="{1D8BD707-D9CF-40AE-B4C6-C98DA3205C09}" type="datetimeFigureOut">
               <a:rPr lang="en-US" smtClean="0"/>
               <a:pPr/>
-              <a:t>10/26/2017</a:t>
+              <a:t>10/28/2017</a:t>
             </a:fld>
             <a:endParaRPr lang="en-US"/>
           </a:p>
@@ -2703,7 +2705,7 @@
             <a:fld id="{1D8BD707-D9CF-40AE-B4C6-C98DA3205C09}" type="datetimeFigureOut">
               <a:rPr lang="en-US" smtClean="0"/>
               <a:pPr/>
-              <a:t>10/26/2017</a:t>
+              <a:t>10/28/2017</a:t>
             </a:fld>
             <a:endParaRPr lang="en-US"/>
           </a:p>
@@ -2975,7 +2977,7 @@
             <a:fld id="{1D8BD707-D9CF-40AE-B4C6-C98DA3205C09}" type="datetimeFigureOut">
               <a:rPr lang="en-US" smtClean="0"/>
               <a:pPr/>
-              <a:t>10/26/2017</a:t>
+              <a:t>10/28/2017</a:t>
             </a:fld>
             <a:endParaRPr lang="en-US"/>
           </a:p>
@@ -3224,7 +3226,7 @@
             <a:fld id="{1D8BD707-D9CF-40AE-B4C6-C98DA3205C09}" type="datetimeFigureOut">
               <a:rPr lang="en-US" smtClean="0"/>
               <a:pPr/>
-              <a:t>10/26/2017</a:t>
+              <a:t>10/28/2017</a:t>
             </a:fld>
             <a:endParaRPr lang="en-US"/>
           </a:p>
@@ -3432,7 +3434,7 @@
             <a:fld id="{1D8BD707-D9CF-40AE-B4C6-C98DA3205C09}" type="datetimeFigureOut">
               <a:rPr lang="en-US" smtClean="0"/>
               <a:pPr/>
-              <a:t>10/26/2017</a:t>
+              <a:t>10/28/2017</a:t>
             </a:fld>
             <a:endParaRPr lang="en-US"/>
           </a:p>
@@ -6440,14 +6442,99 @@
       </p:grpSpPr>
       <p:sp>
         <p:nvSpPr>
-          <p:cNvPr id="6" name="TextBox 5"/>
+          <p:cNvPr id="4" name="TextBox 3">
+            <a:extLst>
+              <a:ext uri="{FF2B5EF4-FFF2-40B4-BE49-F238E27FC236}">
+                <a16:creationId xmlns:a16="http://schemas.microsoft.com/office/drawing/2014/main" id="{A18CA39B-C20D-492D-9C1C-8D3947E756E6}"/>
+              </a:ext>
+            </a:extLst>
+          </p:cNvPr>
           <p:cNvSpPr txBox="1"/>
           <p:nvPr/>
         </p:nvSpPr>
         <p:spPr>
           <a:xfrm>
-            <a:off x="609600" y="457200"/>
-            <a:ext cx="3889655" cy="2308324"/>
+            <a:off x="457200" y="-36731"/>
+            <a:ext cx="8382000" cy="646331"/>
+          </a:xfrm>
+          <a:prstGeom prst="rect">
+            <a:avLst/>
+          </a:prstGeom>
+          <a:noFill/>
+        </p:spPr>
+        <p:txBody>
+          <a:bodyPr wrap="square" rtlCol="0">
+            <a:spAutoFit/>
+          </a:bodyPr>
+          <a:lstStyle/>
+          <a:p>
+            <a:r>
+              <a:rPr lang="en-US" dirty="0"/>
+              <a:t>We can use the </a:t>
+            </a:r>
+            <a:r>
+              <a:rPr lang="en-US" dirty="0" err="1"/>
+              <a:t>CountDownLatch</a:t>
+            </a:r>
+            <a:r>
+              <a:rPr lang="en-US" dirty="0"/>
+              <a:t> to launch one thread per file</a:t>
+            </a:r>
+          </a:p>
+          <a:p>
+            <a:r>
+              <a:rPr lang="en-US" dirty="0"/>
+              <a:t>(this works surprisingly well…)</a:t>
+            </a:r>
+          </a:p>
+        </p:txBody>
+      </p:sp>
+      <p:pic>
+        <p:nvPicPr>
+          <p:cNvPr id="6" name="Picture 5">
+            <a:extLst>
+              <a:ext uri="{FF2B5EF4-FFF2-40B4-BE49-F238E27FC236}">
+                <a16:creationId xmlns:a16="http://schemas.microsoft.com/office/drawing/2014/main" id="{7BB43DB1-1383-4BBB-AE15-B15690C387CF}"/>
+              </a:ext>
+            </a:extLst>
+          </p:cNvPr>
+          <p:cNvPicPr>
+            <a:picLocks noChangeAspect="1"/>
+          </p:cNvPicPr>
+          <p:nvPr/>
+        </p:nvPicPr>
+        <p:blipFill>
+          <a:blip r:embed="rId2"/>
+          <a:stretch>
+            <a:fillRect/>
+          </a:stretch>
+        </p:blipFill>
+        <p:spPr>
+          <a:xfrm>
+            <a:off x="0" y="1026593"/>
+            <a:ext cx="9144000" cy="5069407"/>
+          </a:xfrm>
+          <a:prstGeom prst="rect">
+            <a:avLst/>
+          </a:prstGeom>
+        </p:spPr>
+      </p:pic>
+      <p:sp>
+        <p:nvSpPr>
+          <p:cNvPr id="7" name="TextBox 6">
+            <a:extLst>
+              <a:ext uri="{FF2B5EF4-FFF2-40B4-BE49-F238E27FC236}">
+                <a16:creationId xmlns:a16="http://schemas.microsoft.com/office/drawing/2014/main" id="{08BE6474-9A5B-4A12-B906-EB2CDF22BCEB}"/>
+              </a:ext>
+            </a:extLst>
+          </p:cNvPr>
+          <p:cNvSpPr txBox="1"/>
+          <p:nvPr/>
+        </p:nvSpPr>
+        <p:spPr>
+          <a:xfrm>
+            <a:off x="457200" y="621268"/>
+            <a:ext cx="6011454" cy="369332"/>
           </a:xfrm>
           <a:prstGeom prst="rect">
             <a:avLst/>
@@ -6461,89 +6548,24 @@
           <a:lstStyle/>
           <a:p>
             <a:r>
-              <a:rPr lang="en-US" dirty="0" err="1"/>
-              <a:t>BlockingQueues</a:t>
-            </a:r>
-            <a:endParaRPr lang="en-US" dirty="0"/>
-          </a:p>
-          <a:p>
-            <a:r>
               <a:rPr lang="en-US" dirty="0"/>
-              <a:t>A Peak calling example with semaphore</a:t>
-            </a:r>
-          </a:p>
-          <a:p>
+              <a:t>Our worker now takes the </a:t>
+            </a:r>
             <a:r>
               <a:rPr lang="en-US" dirty="0" err="1"/>
               <a:t>CountDownLatch</a:t>
             </a:r>
-            <a:endParaRPr lang="en-US" dirty="0"/>
-          </a:p>
-          <a:p>
             <a:r>
               <a:rPr lang="en-US" dirty="0"/>
-              <a:t>Callable, Future, </a:t>
-            </a:r>
-            <a:r>
-              <a:rPr lang="en-US" dirty="0" err="1"/>
-              <a:t>FutureTask</a:t>
-            </a:r>
-            <a:endParaRPr lang="en-US" dirty="0"/>
-          </a:p>
-          <a:p>
-            <a:r>
-              <a:rPr lang="en-US" dirty="0"/>
-              <a:t>Cancellation</a:t>
-            </a:r>
-          </a:p>
-          <a:p>
-            <a:endParaRPr lang="en-US" dirty="0"/>
-          </a:p>
-          <a:p>
-            <a:endParaRPr lang="en-US" dirty="0"/>
-          </a:p>
-          <a:p>
-            <a:endParaRPr lang="en-US" dirty="0"/>
-          </a:p>
-        </p:txBody>
-      </p:sp>
-      <p:cxnSp>
-        <p:nvCxnSpPr>
-          <p:cNvPr id="7" name="Straight Arrow Connector 6"/>
-          <p:cNvCxnSpPr/>
-          <p:nvPr/>
-        </p:nvCxnSpPr>
-        <p:spPr>
-          <a:xfrm rot="10800000">
-            <a:off x="3352800" y="1446211"/>
-            <a:ext cx="533400" cy="1588"/>
-          </a:xfrm>
-          <a:prstGeom prst="straightConnector1">
-            <a:avLst/>
-          </a:prstGeom>
-          <a:ln>
-            <a:tailEnd type="arrow"/>
-          </a:ln>
-        </p:spPr>
-        <p:style>
-          <a:lnRef idx="1">
-            <a:schemeClr val="accent1"/>
-          </a:lnRef>
-          <a:fillRef idx="0">
-            <a:schemeClr val="accent1"/>
-          </a:fillRef>
-          <a:effectRef idx="0">
-            <a:schemeClr val="accent1"/>
-          </a:effectRef>
-          <a:fontRef idx="minor">
-            <a:schemeClr val="tx1"/>
-          </a:fontRef>
-        </p:style>
-      </p:cxnSp>
+              <a:t> in the constructor</a:t>
+            </a:r>
+          </a:p>
+        </p:txBody>
+      </p:sp>
     </p:spTree>
     <p:extLst>
       <p:ext uri="{BB962C8B-B14F-4D97-AF65-F5344CB8AC3E}">
-        <p14:creationId xmlns:p14="http://schemas.microsoft.com/office/powerpoint/2010/main" val="1602623698"/>
+        <p14:creationId xmlns:p14="http://schemas.microsoft.com/office/powerpoint/2010/main" val="1259796715"/>
       </p:ext>
     </p:extLst>
   </p:cSld>
@@ -6572,98 +6594,110 @@
       </p:grpSpPr>
       <p:pic>
         <p:nvPicPr>
-          <p:cNvPr id="3075" name="Picture 3"/>
+          <p:cNvPr id="4" name="Picture 3">
+            <a:extLst>
+              <a:ext uri="{FF2B5EF4-FFF2-40B4-BE49-F238E27FC236}">
+                <a16:creationId xmlns:a16="http://schemas.microsoft.com/office/drawing/2014/main" id="{52A5CAC6-1352-4F5E-BA28-C1671F9C0287}"/>
+              </a:ext>
+            </a:extLst>
+          </p:cNvPr>
           <p:cNvPicPr>
-            <a:picLocks noChangeAspect="1" noChangeArrowheads="1"/>
+            <a:picLocks noChangeAspect="1"/>
           </p:cNvPicPr>
           <p:nvPr/>
         </p:nvPicPr>
         <p:blipFill>
-          <a:blip r:embed="rId3" cstate="print"/>
-          <a:srcRect/>
+          <a:blip r:embed="rId2"/>
           <a:stretch>
             <a:fillRect/>
           </a:stretch>
         </p:blipFill>
-        <p:spPr bwMode="auto">
-          <a:xfrm>
-            <a:off x="152400" y="228600"/>
-            <a:ext cx="8391207" cy="3529012"/>
+        <p:spPr>
+          <a:xfrm>
+            <a:off x="0" y="720035"/>
+            <a:ext cx="9144000" cy="5375965"/>
+          </a:xfrm>
+          <a:prstGeom prst="rect">
+            <a:avLst/>
+          </a:prstGeom>
+        </p:spPr>
+      </p:pic>
+      <p:sp>
+        <p:nvSpPr>
+          <p:cNvPr id="6" name="TextBox 5">
+            <a:extLst>
+              <a:ext uri="{FF2B5EF4-FFF2-40B4-BE49-F238E27FC236}">
+                <a16:creationId xmlns:a16="http://schemas.microsoft.com/office/drawing/2014/main" id="{B364AB07-BA00-4ED2-A5CB-A1003029E297}"/>
+              </a:ext>
+            </a:extLst>
+          </p:cNvPr>
+          <p:cNvSpPr txBox="1"/>
+          <p:nvPr/>
+        </p:nvSpPr>
+        <p:spPr>
+          <a:xfrm>
+            <a:off x="152400" y="152400"/>
+            <a:ext cx="7528151" cy="369332"/>
           </a:xfrm>
           <a:prstGeom prst="rect">
             <a:avLst/>
           </a:prstGeom>
           <a:noFill/>
-          <a:ln w="9525">
-            <a:noFill/>
-            <a:miter lim="800000"/>
-            <a:headEnd/>
-            <a:tailEnd/>
-          </a:ln>
-        </p:spPr>
-      </p:pic>
+        </p:spPr>
+        <p:txBody>
+          <a:bodyPr wrap="none" rtlCol="0">
+            <a:spAutoFit/>
+          </a:bodyPr>
+          <a:lstStyle/>
+          <a:p>
+            <a:r>
+              <a:rPr lang="en-US" dirty="0"/>
+              <a:t>Our main method now calculates the required number of threads </a:t>
+            </a:r>
+            <a:r>
+              <a:rPr lang="en-US"/>
+              <a:t>and initiates</a:t>
+            </a:r>
+            <a:endParaRPr lang="en-US" dirty="0"/>
+          </a:p>
+        </p:txBody>
+      </p:sp>
       <p:pic>
         <p:nvPicPr>
-          <p:cNvPr id="3076" name="Picture 4"/>
+          <p:cNvPr id="5" name="Picture 4">
+            <a:extLst>
+              <a:ext uri="{FF2B5EF4-FFF2-40B4-BE49-F238E27FC236}">
+                <a16:creationId xmlns:a16="http://schemas.microsoft.com/office/drawing/2014/main" id="{11CECAA3-DA58-4F5A-8F9C-5DA7D1EB1CFC}"/>
+              </a:ext>
+            </a:extLst>
+          </p:cNvPr>
           <p:cNvPicPr>
-            <a:picLocks noChangeAspect="1" noChangeArrowheads="1"/>
+            <a:picLocks noChangeAspect="1"/>
           </p:cNvPicPr>
           <p:nvPr/>
         </p:nvPicPr>
         <p:blipFill>
-          <a:blip r:embed="rId4" cstate="print"/>
-          <a:srcRect/>
+          <a:blip r:embed="rId3"/>
           <a:stretch>
             <a:fillRect/>
           </a:stretch>
         </p:blipFill>
-        <p:spPr bwMode="auto">
-          <a:xfrm>
-            <a:off x="76200" y="3886200"/>
-            <a:ext cx="8991600" cy="2790815"/>
-          </a:xfrm>
-          <a:prstGeom prst="rect">
-            <a:avLst/>
-          </a:prstGeom>
-          <a:noFill/>
-          <a:ln w="9525">
-            <a:noFill/>
-            <a:miter lim="800000"/>
-            <a:headEnd/>
-            <a:tailEnd/>
-          </a:ln>
+        <p:spPr>
+          <a:xfrm>
+            <a:off x="5486400" y="6186681"/>
+            <a:ext cx="3290888" cy="595119"/>
+          </a:xfrm>
+          <a:prstGeom prst="rect">
+            <a:avLst/>
+          </a:prstGeom>
         </p:spPr>
       </p:pic>
-      <p:sp>
-        <p:nvSpPr>
-          <p:cNvPr id="4" name="TextBox 3"/>
-          <p:cNvSpPr txBox="1"/>
-          <p:nvPr/>
-        </p:nvSpPr>
-        <p:spPr>
-          <a:xfrm>
-            <a:off x="2743200" y="392668"/>
-            <a:ext cx="4475456" cy="369332"/>
-          </a:xfrm>
-          <a:prstGeom prst="rect">
-            <a:avLst/>
-          </a:prstGeom>
-          <a:noFill/>
-        </p:spPr>
-        <p:txBody>
-          <a:bodyPr wrap="none" rtlCol="0">
-            <a:spAutoFit/>
-          </a:bodyPr>
-          <a:lstStyle/>
-          <a:p>
-            <a:r>
-              <a:rPr lang="en-US" dirty="0"/>
-              <a:t>Future – Holds the results of some calculation</a:t>
-            </a:r>
-          </a:p>
-        </p:txBody>
-      </p:sp>
     </p:spTree>
+    <p:extLst>
+      <p:ext uri="{BB962C8B-B14F-4D97-AF65-F5344CB8AC3E}">
+        <p14:creationId xmlns:p14="http://schemas.microsoft.com/office/powerpoint/2010/main" val="2778583173"/>
+      </p:ext>
+    </p:extLst>
   </p:cSld>
   <p:clrMapOvr>
     <a:masterClrMapping/>
@@ -6868,38 +6902,6 @@
           <a:chExt cx="0" cy="0"/>
         </a:xfrm>
       </p:grpSpPr>
-      <p:pic>
-        <p:nvPicPr>
-          <p:cNvPr id="4098" name="Picture 2"/>
-          <p:cNvPicPr>
-            <a:picLocks noChangeAspect="1" noChangeArrowheads="1"/>
-          </p:cNvPicPr>
-          <p:nvPr/>
-        </p:nvPicPr>
-        <p:blipFill>
-          <a:blip r:embed="rId3" cstate="print"/>
-          <a:srcRect/>
-          <a:stretch>
-            <a:fillRect/>
-          </a:stretch>
-        </p:blipFill>
-        <p:spPr bwMode="auto">
-          <a:xfrm>
-            <a:off x="24099" y="457200"/>
-            <a:ext cx="8967501" cy="3733800"/>
-          </a:xfrm>
-          <a:prstGeom prst="rect">
-            <a:avLst/>
-          </a:prstGeom>
-          <a:noFill/>
-          <a:ln w="9525">
-            <a:noFill/>
-            <a:miter lim="800000"/>
-            <a:headEnd/>
-            <a:tailEnd/>
-          </a:ln>
-        </p:spPr>
-      </p:pic>
       <p:sp>
         <p:nvSpPr>
           <p:cNvPr id="6" name="TextBox 5"/>
@@ -6908,8 +6910,8 @@
         </p:nvSpPr>
         <p:spPr>
           <a:xfrm>
-            <a:off x="457200" y="0"/>
-            <a:ext cx="5871800" cy="369332"/>
+            <a:off x="609600" y="457200"/>
+            <a:ext cx="3889655" cy="2308324"/>
           </a:xfrm>
           <a:prstGeom prst="rect">
             <a:avLst/>
@@ -6923,90 +6925,91 @@
           <a:lstStyle/>
           <a:p>
             <a:r>
+              <a:rPr lang="en-US" dirty="0" err="1"/>
+              <a:t>BlockingQueues</a:t>
+            </a:r>
+            <a:endParaRPr lang="en-US" dirty="0"/>
+          </a:p>
+          <a:p>
+            <a:r>
               <a:rPr lang="en-US" dirty="0"/>
-              <a:t>A </a:t>
+              <a:t>A Peak calling example with semaphore</a:t>
+            </a:r>
+          </a:p>
+          <a:p>
+            <a:r>
+              <a:rPr lang="en-US" dirty="0" err="1"/>
+              <a:t>CountDownLatch</a:t>
+            </a:r>
+            <a:endParaRPr lang="en-US" dirty="0"/>
+          </a:p>
+          <a:p>
+            <a:r>
+              <a:rPr lang="en-US" dirty="0"/>
+              <a:t>Callable, Future, </a:t>
             </a:r>
             <a:r>
               <a:rPr lang="en-US" dirty="0" err="1"/>
               <a:t>FutureTask</a:t>
             </a:r>
+            <a:endParaRPr lang="en-US" dirty="0"/>
+          </a:p>
+          <a:p>
             <a:r>
               <a:rPr lang="en-US" dirty="0"/>
-              <a:t> is an implementation of Future that we can use</a:t>
-            </a:r>
-          </a:p>
-        </p:txBody>
-      </p:sp>
-      <p:sp>
-        <p:nvSpPr>
-          <p:cNvPr id="7" name="TextBox 6"/>
-          <p:cNvSpPr txBox="1"/>
-          <p:nvPr/>
-        </p:nvSpPr>
-        <p:spPr>
-          <a:xfrm>
-            <a:off x="152400" y="4343400"/>
-            <a:ext cx="6271973" cy="369332"/>
-          </a:xfrm>
-          <a:prstGeom prst="rect">
-            <a:avLst/>
-          </a:prstGeom>
-          <a:noFill/>
-        </p:spPr>
-        <p:txBody>
-          <a:bodyPr wrap="none" rtlCol="0">
-            <a:spAutoFit/>
-          </a:bodyPr>
-          <a:lstStyle/>
-          <a:p>
-            <a:r>
-              <a:rPr lang="en-US" dirty="0"/>
-              <a:t>When you construct, you need to pass in a </a:t>
-            </a:r>
-            <a:r>
-              <a:rPr lang="en-US" dirty="0" err="1"/>
-              <a:t>Runnable</a:t>
-            </a:r>
-            <a:r>
-              <a:rPr lang="en-US" dirty="0"/>
-              <a:t> or a Callable</a:t>
-            </a:r>
-          </a:p>
-        </p:txBody>
-      </p:sp>
-      <p:pic>
-        <p:nvPicPr>
-          <p:cNvPr id="4099" name="Picture 3"/>
-          <p:cNvPicPr>
-            <a:picLocks noChangeAspect="1" noChangeArrowheads="1"/>
-          </p:cNvPicPr>
-          <p:nvPr/>
-        </p:nvPicPr>
-        <p:blipFill>
-          <a:blip r:embed="rId4" cstate="print"/>
-          <a:srcRect/>
-          <a:stretch>
-            <a:fillRect/>
-          </a:stretch>
-        </p:blipFill>
-        <p:spPr bwMode="auto">
-          <a:xfrm>
-            <a:off x="76200" y="4876800"/>
-            <a:ext cx="8915400" cy="1258222"/>
-          </a:xfrm>
-          <a:prstGeom prst="rect">
-            <a:avLst/>
-          </a:prstGeom>
-          <a:noFill/>
-          <a:ln w="9525">
-            <a:noFill/>
-            <a:miter lim="800000"/>
-            <a:headEnd/>
-            <a:tailEnd/>
+              <a:t>Cancellation</a:t>
+            </a:r>
+          </a:p>
+          <a:p>
+            <a:endParaRPr lang="en-US" dirty="0"/>
+          </a:p>
+          <a:p>
+            <a:endParaRPr lang="en-US" dirty="0"/>
+          </a:p>
+          <a:p>
+            <a:endParaRPr lang="en-US" dirty="0"/>
+          </a:p>
+        </p:txBody>
+      </p:sp>
+      <p:cxnSp>
+        <p:nvCxnSpPr>
+          <p:cNvPr id="7" name="Straight Arrow Connector 6"/>
+          <p:cNvCxnSpPr/>
+          <p:nvPr/>
+        </p:nvCxnSpPr>
+        <p:spPr>
+          <a:xfrm rot="10800000">
+            <a:off x="3352800" y="1446211"/>
+            <a:ext cx="533400" cy="1588"/>
+          </a:xfrm>
+          <a:prstGeom prst="straightConnector1">
+            <a:avLst/>
+          </a:prstGeom>
+          <a:ln>
+            <a:tailEnd type="arrow"/>
           </a:ln>
         </p:spPr>
-      </p:pic>
+        <p:style>
+          <a:lnRef idx="1">
+            <a:schemeClr val="accent1"/>
+          </a:lnRef>
+          <a:fillRef idx="0">
+            <a:schemeClr val="accent1"/>
+          </a:fillRef>
+          <a:effectRef idx="0">
+            <a:schemeClr val="accent1"/>
+          </a:effectRef>
+          <a:fontRef idx="minor">
+            <a:schemeClr val="tx1"/>
+          </a:fontRef>
+        </p:style>
+      </p:cxnSp>
     </p:spTree>
+    <p:extLst>
+      <p:ext uri="{BB962C8B-B14F-4D97-AF65-F5344CB8AC3E}">
+        <p14:creationId xmlns:p14="http://schemas.microsoft.com/office/powerpoint/2010/main" val="1602623698"/>
+      </p:ext>
+    </p:extLst>
   </p:cSld>
   <p:clrMapOvr>
     <a:masterClrMapping/>
@@ -7031,52 +7034,9 @@
           <a:chExt cx="0" cy="0"/>
         </a:xfrm>
       </p:grpSpPr>
-      <p:sp>
-        <p:nvSpPr>
-          <p:cNvPr id="4" name="TextBox 3"/>
-          <p:cNvSpPr txBox="1"/>
-          <p:nvPr/>
-        </p:nvSpPr>
-        <p:spPr>
-          <a:xfrm>
-            <a:off x="762000" y="228600"/>
-            <a:ext cx="5587876" cy="646331"/>
-          </a:xfrm>
-          <a:prstGeom prst="rect">
-            <a:avLst/>
-          </a:prstGeom>
-          <a:noFill/>
-        </p:spPr>
-        <p:txBody>
-          <a:bodyPr wrap="none" rtlCol="0">
-            <a:spAutoFit/>
-          </a:bodyPr>
-          <a:lstStyle/>
-          <a:p>
-            <a:r>
-              <a:rPr lang="en-US" dirty="0"/>
-              <a:t>A Callable is like a </a:t>
-            </a:r>
-            <a:r>
-              <a:rPr lang="en-US" dirty="0" err="1"/>
-              <a:t>Runnable</a:t>
-            </a:r>
-            <a:r>
-              <a:rPr lang="en-US" dirty="0"/>
-              <a:t>, except it has a return type V </a:t>
-            </a:r>
-          </a:p>
-          <a:p>
-            <a:r>
-              <a:rPr lang="en-US" dirty="0"/>
-              <a:t>(and can throw an Exception, which is very nice)</a:t>
-            </a:r>
-          </a:p>
-        </p:txBody>
-      </p:sp>
       <p:pic>
         <p:nvPicPr>
-          <p:cNvPr id="5122" name="Picture 2"/>
+          <p:cNvPr id="3075" name="Picture 3"/>
           <p:cNvPicPr>
             <a:picLocks noChangeAspect="1" noChangeArrowheads="1"/>
           </p:cNvPicPr>
@@ -7091,8 +7051,8 @@
         </p:blipFill>
         <p:spPr bwMode="auto">
           <a:xfrm>
-            <a:off x="0" y="1219200"/>
-            <a:ext cx="8709660" cy="4038600"/>
+            <a:off x="152400" y="228600"/>
+            <a:ext cx="8391207" cy="3529012"/>
           </a:xfrm>
           <a:prstGeom prst="rect">
             <a:avLst/>
@@ -7106,6 +7066,67 @@
           </a:ln>
         </p:spPr>
       </p:pic>
+      <p:pic>
+        <p:nvPicPr>
+          <p:cNvPr id="3076" name="Picture 4"/>
+          <p:cNvPicPr>
+            <a:picLocks noChangeAspect="1" noChangeArrowheads="1"/>
+          </p:cNvPicPr>
+          <p:nvPr/>
+        </p:nvPicPr>
+        <p:blipFill>
+          <a:blip r:embed="rId4" cstate="print"/>
+          <a:srcRect/>
+          <a:stretch>
+            <a:fillRect/>
+          </a:stretch>
+        </p:blipFill>
+        <p:spPr bwMode="auto">
+          <a:xfrm>
+            <a:off x="76200" y="3886200"/>
+            <a:ext cx="8991600" cy="2790815"/>
+          </a:xfrm>
+          <a:prstGeom prst="rect">
+            <a:avLst/>
+          </a:prstGeom>
+          <a:noFill/>
+          <a:ln w="9525">
+            <a:noFill/>
+            <a:miter lim="800000"/>
+            <a:headEnd/>
+            <a:tailEnd/>
+          </a:ln>
+        </p:spPr>
+      </p:pic>
+      <p:sp>
+        <p:nvSpPr>
+          <p:cNvPr id="4" name="TextBox 3"/>
+          <p:cNvSpPr txBox="1"/>
+          <p:nvPr/>
+        </p:nvSpPr>
+        <p:spPr>
+          <a:xfrm>
+            <a:off x="2743200" y="392668"/>
+            <a:ext cx="4475456" cy="369332"/>
+          </a:xfrm>
+          <a:prstGeom prst="rect">
+            <a:avLst/>
+          </a:prstGeom>
+          <a:noFill/>
+        </p:spPr>
+        <p:txBody>
+          <a:bodyPr wrap="none" rtlCol="0">
+            <a:spAutoFit/>
+          </a:bodyPr>
+          <a:lstStyle/>
+          <a:p>
+            <a:r>
+              <a:rPr lang="en-US" dirty="0"/>
+              <a:t>Future – Holds the results of some calculation</a:t>
+            </a:r>
+          </a:p>
+        </p:txBody>
+      </p:sp>
     </p:spTree>
   </p:cSld>
   <p:clrMapOvr>
@@ -7131,126 +7152,16 @@
           <a:chExt cx="0" cy="0"/>
         </a:xfrm>
       </p:grpSpPr>
-      <p:sp>
-        <p:nvSpPr>
-          <p:cNvPr id="5" name="TextBox 4"/>
-          <p:cNvSpPr txBox="1"/>
-          <p:nvPr/>
-        </p:nvSpPr>
-        <p:spPr>
-          <a:xfrm>
-            <a:off x="5334000" y="304800"/>
-            <a:ext cx="3127010" cy="3970318"/>
-          </a:xfrm>
-          <a:prstGeom prst="rect">
-            <a:avLst/>
-          </a:prstGeom>
-          <a:noFill/>
-        </p:spPr>
-        <p:txBody>
-          <a:bodyPr wrap="none" rtlCol="0">
-            <a:spAutoFit/>
-          </a:bodyPr>
-          <a:lstStyle/>
-          <a:p>
-            <a:r>
-              <a:rPr lang="en-US" dirty="0"/>
-              <a:t>This class calculates GC content</a:t>
-            </a:r>
-          </a:p>
-          <a:p>
-            <a:r>
-              <a:rPr lang="en-US" dirty="0"/>
-              <a:t>in a background thread.</a:t>
-            </a:r>
-          </a:p>
-          <a:p>
-            <a:endParaRPr lang="en-US" dirty="0"/>
-          </a:p>
-          <a:p>
-            <a:r>
-              <a:rPr lang="en-US" dirty="0"/>
-              <a:t>We can either </a:t>
-            </a:r>
-            <a:r>
-              <a:rPr lang="en-US" dirty="0" err="1"/>
-              <a:t>getGContent</a:t>
-            </a:r>
-            <a:r>
-              <a:rPr lang="en-US" dirty="0"/>
-              <a:t>()</a:t>
-            </a:r>
-          </a:p>
-          <a:p>
-            <a:r>
-              <a:rPr lang="en-US" dirty="0"/>
-              <a:t>now ( which will run in the </a:t>
-            </a:r>
-          </a:p>
-          <a:p>
-            <a:r>
-              <a:rPr lang="en-US" dirty="0"/>
-              <a:t>current thread)</a:t>
-            </a:r>
-          </a:p>
-          <a:p>
-            <a:endParaRPr lang="en-US" dirty="0"/>
-          </a:p>
-          <a:p>
-            <a:endParaRPr lang="en-US" dirty="0"/>
-          </a:p>
-          <a:p>
-            <a:r>
-              <a:rPr lang="en-US" dirty="0"/>
-              <a:t>Or get an object that will</a:t>
-            </a:r>
-          </a:p>
-          <a:p>
-            <a:r>
-              <a:rPr lang="en-US" dirty="0"/>
-              <a:t>allow the calculation of GC</a:t>
-            </a:r>
-          </a:p>
-          <a:p>
-            <a:r>
-              <a:rPr lang="en-US" dirty="0"/>
-              <a:t>content to run in a background</a:t>
-            </a:r>
-          </a:p>
-          <a:p>
-            <a:r>
-              <a:rPr lang="en-US" dirty="0"/>
-              <a:t>thread (but invoking </a:t>
-            </a:r>
-          </a:p>
-          <a:p>
-            <a:r>
-              <a:rPr lang="en-US" dirty="0" err="1"/>
-              <a:t>getGCContentAsFuture</a:t>
-            </a:r>
-            <a:r>
-              <a:rPr lang="en-US" dirty="0"/>
-              <a:t>() will</a:t>
-            </a:r>
-          </a:p>
-          <a:p>
-            <a:r>
-              <a:rPr lang="en-US" dirty="0"/>
-              <a:t>return instantly).</a:t>
-            </a:r>
-          </a:p>
-        </p:txBody>
-      </p:sp>
       <p:pic>
         <p:nvPicPr>
-          <p:cNvPr id="1027" name="Picture 3"/>
+          <p:cNvPr id="4098" name="Picture 2"/>
           <p:cNvPicPr>
             <a:picLocks noChangeAspect="1" noChangeArrowheads="1"/>
           </p:cNvPicPr>
           <p:nvPr/>
         </p:nvPicPr>
         <p:blipFill>
-          <a:blip r:embed="rId2" cstate="print"/>
+          <a:blip r:embed="rId3" cstate="print"/>
           <a:srcRect/>
           <a:stretch>
             <a:fillRect/>
@@ -7258,8 +7169,114 @@
         </p:blipFill>
         <p:spPr bwMode="auto">
           <a:xfrm>
-            <a:off x="304800" y="152399"/>
-            <a:ext cx="4724400" cy="6568069"/>
+            <a:off x="24099" y="457200"/>
+            <a:ext cx="8967501" cy="3733800"/>
+          </a:xfrm>
+          <a:prstGeom prst="rect">
+            <a:avLst/>
+          </a:prstGeom>
+          <a:noFill/>
+          <a:ln w="9525">
+            <a:noFill/>
+            <a:miter lim="800000"/>
+            <a:headEnd/>
+            <a:tailEnd/>
+          </a:ln>
+        </p:spPr>
+      </p:pic>
+      <p:sp>
+        <p:nvSpPr>
+          <p:cNvPr id="6" name="TextBox 5"/>
+          <p:cNvSpPr txBox="1"/>
+          <p:nvPr/>
+        </p:nvSpPr>
+        <p:spPr>
+          <a:xfrm>
+            <a:off x="457200" y="0"/>
+            <a:ext cx="5871800" cy="369332"/>
+          </a:xfrm>
+          <a:prstGeom prst="rect">
+            <a:avLst/>
+          </a:prstGeom>
+          <a:noFill/>
+        </p:spPr>
+        <p:txBody>
+          <a:bodyPr wrap="none" rtlCol="0">
+            <a:spAutoFit/>
+          </a:bodyPr>
+          <a:lstStyle/>
+          <a:p>
+            <a:r>
+              <a:rPr lang="en-US" dirty="0"/>
+              <a:t>A </a:t>
+            </a:r>
+            <a:r>
+              <a:rPr lang="en-US" dirty="0" err="1"/>
+              <a:t>FutureTask</a:t>
+            </a:r>
+            <a:r>
+              <a:rPr lang="en-US" dirty="0"/>
+              <a:t> is an implementation of Future that we can use</a:t>
+            </a:r>
+          </a:p>
+        </p:txBody>
+      </p:sp>
+      <p:sp>
+        <p:nvSpPr>
+          <p:cNvPr id="7" name="TextBox 6"/>
+          <p:cNvSpPr txBox="1"/>
+          <p:nvPr/>
+        </p:nvSpPr>
+        <p:spPr>
+          <a:xfrm>
+            <a:off x="152400" y="4343400"/>
+            <a:ext cx="6271973" cy="369332"/>
+          </a:xfrm>
+          <a:prstGeom prst="rect">
+            <a:avLst/>
+          </a:prstGeom>
+          <a:noFill/>
+        </p:spPr>
+        <p:txBody>
+          <a:bodyPr wrap="none" rtlCol="0">
+            <a:spAutoFit/>
+          </a:bodyPr>
+          <a:lstStyle/>
+          <a:p>
+            <a:r>
+              <a:rPr lang="en-US" dirty="0"/>
+              <a:t>When you construct, you need to pass in a </a:t>
+            </a:r>
+            <a:r>
+              <a:rPr lang="en-US" dirty="0" err="1"/>
+              <a:t>Runnable</a:t>
+            </a:r>
+            <a:r>
+              <a:rPr lang="en-US" dirty="0"/>
+              <a:t> or a Callable</a:t>
+            </a:r>
+          </a:p>
+        </p:txBody>
+      </p:sp>
+      <p:pic>
+        <p:nvPicPr>
+          <p:cNvPr id="4099" name="Picture 3"/>
+          <p:cNvPicPr>
+            <a:picLocks noChangeAspect="1" noChangeArrowheads="1"/>
+          </p:cNvPicPr>
+          <p:nvPr/>
+        </p:nvPicPr>
+        <p:blipFill>
+          <a:blip r:embed="rId4" cstate="print"/>
+          <a:srcRect/>
+          <a:stretch>
+            <a:fillRect/>
+          </a:stretch>
+        </p:blipFill>
+        <p:spPr bwMode="auto">
+          <a:xfrm>
+            <a:off x="76200" y="4876800"/>
+            <a:ext cx="8915400" cy="1258222"/>
           </a:xfrm>
           <a:prstGeom prst="rect">
             <a:avLst/>
@@ -7298,70 +7315,52 @@
           <a:chExt cx="0" cy="0"/>
         </a:xfrm>
       </p:grpSpPr>
+      <p:sp>
+        <p:nvSpPr>
+          <p:cNvPr id="4" name="TextBox 3"/>
+          <p:cNvSpPr txBox="1"/>
+          <p:nvPr/>
+        </p:nvSpPr>
+        <p:spPr>
+          <a:xfrm>
+            <a:off x="762000" y="228600"/>
+            <a:ext cx="5587876" cy="646331"/>
+          </a:xfrm>
+          <a:prstGeom prst="rect">
+            <a:avLst/>
+          </a:prstGeom>
+          <a:noFill/>
+        </p:spPr>
+        <p:txBody>
+          <a:bodyPr wrap="none" rtlCol="0">
+            <a:spAutoFit/>
+          </a:bodyPr>
+          <a:lstStyle/>
+          <a:p>
+            <a:r>
+              <a:rPr lang="en-US" dirty="0"/>
+              <a:t>A Callable is like a </a:t>
+            </a:r>
+            <a:r>
+              <a:rPr lang="en-US" dirty="0" err="1"/>
+              <a:t>Runnable</a:t>
+            </a:r>
+            <a:r>
+              <a:rPr lang="en-US" dirty="0"/>
+              <a:t>, except it has a return type V </a:t>
+            </a:r>
+          </a:p>
+          <a:p>
+            <a:r>
+              <a:rPr lang="en-US" dirty="0"/>
+              <a:t>(and can throw an Exception, which is very nice)</a:t>
+            </a:r>
+          </a:p>
+        </p:txBody>
+      </p:sp>
       <p:pic>
         <p:nvPicPr>
-          <p:cNvPr id="2051" name="Picture 3"/>
-          <p:cNvPicPr>
-            <a:picLocks noChangeAspect="1" noChangeArrowheads="1"/>
-          </p:cNvPicPr>
-          <p:nvPr/>
-        </p:nvPicPr>
-        <p:blipFill>
-          <a:blip r:embed="rId2" cstate="print"/>
-          <a:srcRect/>
-          <a:stretch>
-            <a:fillRect/>
-          </a:stretch>
-        </p:blipFill>
-        <p:spPr bwMode="auto">
-          <a:xfrm>
-            <a:off x="457200" y="1600200"/>
-            <a:ext cx="8012906" cy="2667000"/>
-          </a:xfrm>
-          <a:prstGeom prst="rect">
-            <a:avLst/>
-          </a:prstGeom>
-          <a:noFill/>
-          <a:ln w="9525">
-            <a:noFill/>
-            <a:miter lim="800000"/>
-            <a:headEnd/>
-            <a:tailEnd/>
-          </a:ln>
-        </p:spPr>
-      </p:pic>
-      <p:sp>
-        <p:nvSpPr>
-          <p:cNvPr id="6" name="TextBox 5"/>
-          <p:cNvSpPr txBox="1"/>
-          <p:nvPr/>
-        </p:nvSpPr>
-        <p:spPr>
-          <a:xfrm flipH="1">
-            <a:off x="1143000" y="457200"/>
-            <a:ext cx="7315200" cy="369332"/>
-          </a:xfrm>
-          <a:prstGeom prst="rect">
-            <a:avLst/>
-          </a:prstGeom>
-          <a:noFill/>
-        </p:spPr>
-        <p:txBody>
-          <a:bodyPr wrap="square" rtlCol="0">
-            <a:spAutoFit/>
-          </a:bodyPr>
-          <a:lstStyle/>
-          <a:p>
-            <a:r>
-              <a:rPr lang="en-US" dirty="0"/>
-              <a:t>In this method, we spawn a calculation in  a background thread…</a:t>
-            </a:r>
-          </a:p>
-        </p:txBody>
-      </p:sp>
-      <p:pic>
-        <p:nvPicPr>
-          <p:cNvPr id="2052" name="Picture 4"/>
+          <p:cNvPr id="5122" name="Picture 2"/>
           <p:cNvPicPr>
             <a:picLocks noChangeAspect="1" noChangeArrowheads="1"/>
           </p:cNvPicPr>
@@ -7376,8 +7375,8 @@
         </p:blipFill>
         <p:spPr bwMode="auto">
           <a:xfrm>
-            <a:off x="4724400" y="3810000"/>
-            <a:ext cx="2584938" cy="457200"/>
+            <a:off x="0" y="1219200"/>
+            <a:ext cx="8709660" cy="4038600"/>
           </a:xfrm>
           <a:prstGeom prst="rect">
             <a:avLst/>
@@ -7418,14 +7417,14 @@
       </p:grpSpPr>
       <p:sp>
         <p:nvSpPr>
-          <p:cNvPr id="6" name="TextBox 5"/>
+          <p:cNvPr id="5" name="TextBox 4"/>
           <p:cNvSpPr txBox="1"/>
           <p:nvPr/>
         </p:nvSpPr>
         <p:spPr>
           <a:xfrm>
-            <a:off x="609600" y="457200"/>
-            <a:ext cx="3889655" cy="2308324"/>
+            <a:off x="5334000" y="304800"/>
+            <a:ext cx="3127010" cy="3970318"/>
           </a:xfrm>
           <a:prstGeom prst="rect">
             <a:avLst/>
@@ -7439,85 +7438,125 @@
           <a:lstStyle/>
           <a:p>
             <a:r>
+              <a:rPr lang="en-US" dirty="0"/>
+              <a:t>This class calculates GC content</a:t>
+            </a:r>
+          </a:p>
+          <a:p>
+            <a:r>
+              <a:rPr lang="en-US" dirty="0"/>
+              <a:t>in a background thread.</a:t>
+            </a:r>
+          </a:p>
+          <a:p>
+            <a:endParaRPr lang="en-US" dirty="0"/>
+          </a:p>
+          <a:p>
+            <a:r>
+              <a:rPr lang="en-US" dirty="0"/>
+              <a:t>We can either </a:t>
+            </a:r>
+            <a:r>
               <a:rPr lang="en-US" dirty="0" err="1"/>
-              <a:t>BlockingQueues</a:t>
-            </a:r>
+              <a:t>getGContent</a:t>
+            </a:r>
+            <a:r>
+              <a:rPr lang="en-US" dirty="0"/>
+              <a:t>()</a:t>
+            </a:r>
+          </a:p>
+          <a:p>
+            <a:r>
+              <a:rPr lang="en-US" dirty="0"/>
+              <a:t>now ( which will run in the </a:t>
+            </a:r>
+          </a:p>
+          <a:p>
+            <a:r>
+              <a:rPr lang="en-US" dirty="0"/>
+              <a:t>current thread)</a:t>
+            </a:r>
+          </a:p>
+          <a:p>
             <a:endParaRPr lang="en-US" dirty="0"/>
           </a:p>
           <a:p>
+            <a:endParaRPr lang="en-US" dirty="0"/>
+          </a:p>
+          <a:p>
             <a:r>
               <a:rPr lang="en-US" dirty="0"/>
-              <a:t>A Peak calling example with semaphore</a:t>
+              <a:t>Or get an object that will</a:t>
+            </a:r>
+          </a:p>
+          <a:p>
+            <a:r>
+              <a:rPr lang="en-US" dirty="0"/>
+              <a:t>allow the calculation of GC</a:t>
+            </a:r>
+          </a:p>
+          <a:p>
+            <a:r>
+              <a:rPr lang="en-US" dirty="0"/>
+              <a:t>content to run in a background</a:t>
+            </a:r>
+          </a:p>
+          <a:p>
+            <a:r>
+              <a:rPr lang="en-US" dirty="0"/>
+              <a:t>thread (but invoking </a:t>
             </a:r>
           </a:p>
           <a:p>
             <a:r>
               <a:rPr lang="en-US" dirty="0" err="1"/>
-              <a:t>CountDownLatch</a:t>
-            </a:r>
-            <a:endParaRPr lang="en-US" dirty="0"/>
-          </a:p>
-          <a:p>
+              <a:t>getGCContentAsFuture</a:t>
+            </a:r>
             <a:r>
               <a:rPr lang="en-US" dirty="0"/>
-              <a:t>Callable, Future, </a:t>
-            </a:r>
-            <a:r>
-              <a:rPr lang="en-US" dirty="0" err="1"/>
-              <a:t>FutureTask</a:t>
-            </a:r>
-            <a:endParaRPr lang="en-US" dirty="0"/>
+              <a:t>() will</a:t>
+            </a:r>
           </a:p>
           <a:p>
             <a:r>
               <a:rPr lang="en-US" dirty="0"/>
-              <a:t>Cancellation</a:t>
-            </a:r>
-          </a:p>
-          <a:p>
-            <a:endParaRPr lang="en-US" dirty="0"/>
-          </a:p>
-          <a:p>
-            <a:endParaRPr lang="en-US" dirty="0"/>
-          </a:p>
-          <a:p>
-            <a:endParaRPr lang="en-US" dirty="0"/>
-          </a:p>
-        </p:txBody>
-      </p:sp>
-      <p:cxnSp>
-        <p:nvCxnSpPr>
-          <p:cNvPr id="7" name="Straight Arrow Connector 6"/>
-          <p:cNvCxnSpPr/>
-          <p:nvPr/>
-        </p:nvCxnSpPr>
-        <p:spPr>
-          <a:xfrm rot="10800000">
-            <a:off x="1905000" y="1751011"/>
-            <a:ext cx="533400" cy="1588"/>
-          </a:xfrm>
-          <a:prstGeom prst="straightConnector1">
-            <a:avLst/>
-          </a:prstGeom>
-          <a:ln>
-            <a:tailEnd type="arrow"/>
+              <a:t>return instantly).</a:t>
+            </a:r>
+          </a:p>
+        </p:txBody>
+      </p:sp>
+      <p:pic>
+        <p:nvPicPr>
+          <p:cNvPr id="1027" name="Picture 3"/>
+          <p:cNvPicPr>
+            <a:picLocks noChangeAspect="1" noChangeArrowheads="1"/>
+          </p:cNvPicPr>
+          <p:nvPr/>
+        </p:nvPicPr>
+        <p:blipFill>
+          <a:blip r:embed="rId2" cstate="print"/>
+          <a:srcRect/>
+          <a:stretch>
+            <a:fillRect/>
+          </a:stretch>
+        </p:blipFill>
+        <p:spPr bwMode="auto">
+          <a:xfrm>
+            <a:off x="304800" y="152399"/>
+            <a:ext cx="4724400" cy="6568069"/>
+          </a:xfrm>
+          <a:prstGeom prst="rect">
+            <a:avLst/>
+          </a:prstGeom>
+          <a:noFill/>
+          <a:ln w="9525">
+            <a:noFill/>
+            <a:miter lim="800000"/>
+            <a:headEnd/>
+            <a:tailEnd/>
           </a:ln>
         </p:spPr>
-        <p:style>
-          <a:lnRef idx="1">
-            <a:schemeClr val="accent1"/>
-          </a:lnRef>
-          <a:fillRef idx="0">
-            <a:schemeClr val="accent1"/>
-          </a:fillRef>
-          <a:effectRef idx="0">
-            <a:schemeClr val="accent1"/>
-          </a:effectRef>
-          <a:fontRef idx="minor">
-            <a:schemeClr val="tx1"/>
-          </a:fontRef>
-        </p:style>
-      </p:cxnSp>
+      </p:pic>
     </p:spTree>
   </p:cSld>
   <p:clrMapOvr>
@@ -7545,7 +7584,7 @@
       </p:grpSpPr>
       <p:pic>
         <p:nvPicPr>
-          <p:cNvPr id="3074" name="Picture 2"/>
+          <p:cNvPr id="2051" name="Picture 3"/>
           <p:cNvPicPr>
             <a:picLocks noChangeAspect="1" noChangeArrowheads="1"/>
           </p:cNvPicPr>
@@ -7560,8 +7599,8 @@
         </p:blipFill>
         <p:spPr bwMode="auto">
           <a:xfrm>
-            <a:off x="276225" y="1914525"/>
-            <a:ext cx="8591550" cy="3028950"/>
+            <a:off x="457200" y="1600200"/>
+            <a:ext cx="8012906" cy="2667000"/>
           </a:xfrm>
           <a:prstGeom prst="rect">
             <a:avLst/>
@@ -7577,14 +7616,14 @@
       </p:pic>
       <p:sp>
         <p:nvSpPr>
-          <p:cNvPr id="5" name="TextBox 4"/>
+          <p:cNvPr id="6" name="TextBox 5"/>
           <p:cNvSpPr txBox="1"/>
           <p:nvPr/>
         </p:nvSpPr>
         <p:spPr>
-          <a:xfrm>
-            <a:off x="381000" y="990600"/>
-            <a:ext cx="8172109" cy="646331"/>
+          <a:xfrm flipH="1">
+            <a:off x="1143000" y="457200"/>
+            <a:ext cx="7315200" cy="369332"/>
           </a:xfrm>
           <a:prstGeom prst="rect">
             <a:avLst/>
@@ -7592,24 +7631,50 @@
           <a:noFill/>
         </p:spPr>
         <p:txBody>
-          <a:bodyPr wrap="none" rtlCol="0">
+          <a:bodyPr wrap="square" rtlCol="0">
             <a:spAutoFit/>
           </a:bodyPr>
           <a:lstStyle/>
           <a:p>
             <a:r>
               <a:rPr lang="en-US" dirty="0"/>
-              <a:t>Future also supports cancellation, but this is dependent upon the co-operation of the</a:t>
-            </a:r>
-          </a:p>
-          <a:p>
-            <a:r>
-              <a:rPr lang="en-US" dirty="0"/>
-              <a:t>running threads…</a:t>
-            </a:r>
-          </a:p>
-        </p:txBody>
-      </p:sp>
+              <a:t>In this method, we spawn a calculation in  a background thread…</a:t>
+            </a:r>
+          </a:p>
+        </p:txBody>
+      </p:sp>
+      <p:pic>
+        <p:nvPicPr>
+          <p:cNvPr id="2052" name="Picture 4"/>
+          <p:cNvPicPr>
+            <a:picLocks noChangeAspect="1" noChangeArrowheads="1"/>
+          </p:cNvPicPr>
+          <p:nvPr/>
+        </p:nvPicPr>
+        <p:blipFill>
+          <a:blip r:embed="rId3" cstate="print"/>
+          <a:srcRect/>
+          <a:stretch>
+            <a:fillRect/>
+          </a:stretch>
+        </p:blipFill>
+        <p:spPr bwMode="auto">
+          <a:xfrm>
+            <a:off x="4724400" y="3810000"/>
+            <a:ext cx="2584938" cy="457200"/>
+          </a:xfrm>
+          <a:prstGeom prst="rect">
+            <a:avLst/>
+          </a:prstGeom>
+          <a:noFill/>
+          <a:ln w="9525">
+            <a:noFill/>
+            <a:miter lim="800000"/>
+            <a:headEnd/>
+            <a:tailEnd/>
+          </a:ln>
+        </p:spPr>
+      </p:pic>
     </p:spTree>
   </p:cSld>
   <p:clrMapOvr>
@@ -7635,110 +7700,108 @@
           <a:chExt cx="0" cy="0"/>
         </a:xfrm>
       </p:grpSpPr>
-      <p:pic>
-        <p:nvPicPr>
-          <p:cNvPr id="1026" name="Picture 2"/>
-          <p:cNvPicPr>
-            <a:picLocks noChangeAspect="1" noChangeArrowheads="1"/>
-          </p:cNvPicPr>
-          <p:nvPr/>
-        </p:nvPicPr>
-        <p:blipFill>
-          <a:blip r:embed="rId2" cstate="print"/>
-          <a:srcRect/>
-          <a:stretch>
-            <a:fillRect/>
-          </a:stretch>
-        </p:blipFill>
-        <p:spPr bwMode="auto">
-          <a:xfrm>
-            <a:off x="314325" y="2047875"/>
-            <a:ext cx="8515350" cy="2762250"/>
+      <p:sp>
+        <p:nvSpPr>
+          <p:cNvPr id="6" name="TextBox 5"/>
+          <p:cNvSpPr txBox="1"/>
+          <p:nvPr/>
+        </p:nvSpPr>
+        <p:spPr>
+          <a:xfrm>
+            <a:off x="609600" y="457200"/>
+            <a:ext cx="3889655" cy="2308324"/>
           </a:xfrm>
           <a:prstGeom prst="rect">
             <a:avLst/>
           </a:prstGeom>
           <a:noFill/>
-          <a:ln w="9525">
-            <a:noFill/>
-            <a:miter lim="800000"/>
-            <a:headEnd/>
-            <a:tailEnd/>
-          </a:ln>
-        </p:spPr>
-      </p:pic>
-      <p:sp>
-        <p:nvSpPr>
-          <p:cNvPr id="3" name="TextBox 2"/>
-          <p:cNvSpPr txBox="1"/>
-          <p:nvPr/>
-        </p:nvSpPr>
-        <p:spPr>
-          <a:xfrm>
-            <a:off x="457200" y="218182"/>
-            <a:ext cx="7620000" cy="1323439"/>
-          </a:xfrm>
-          <a:prstGeom prst="rect">
-            <a:avLst/>
-          </a:prstGeom>
-          <a:noFill/>
-        </p:spPr>
-        <p:txBody>
-          <a:bodyPr wrap="square" rtlCol="0">
+        </p:spPr>
+        <p:txBody>
+          <a:bodyPr wrap="none" rtlCol="0">
             <a:spAutoFit/>
           </a:bodyPr>
           <a:lstStyle/>
           <a:p>
             <a:r>
-              <a:rPr lang="en-US" sz="1600" dirty="0" err="1">
-                <a:latin typeface="Arial" pitchFamily="34" charset="0"/>
-                <a:cs typeface="Arial" pitchFamily="34" charset="0"/>
-              </a:rPr>
-              <a:t>Thread.sleep</a:t>
-            </a:r>
-            <a:r>
-              <a:rPr lang="en-US" sz="1600" dirty="0">
-                <a:latin typeface="Arial" pitchFamily="34" charset="0"/>
-                <a:cs typeface="Arial" pitchFamily="34" charset="0"/>
-              </a:rPr>
-              <a:t> and nearly all other Java blocking methods support cancellation.</a:t>
-            </a:r>
-          </a:p>
-          <a:p>
-            <a:r>
-              <a:rPr lang="en-US" sz="1600" dirty="0">
-                <a:latin typeface="Arial" pitchFamily="34" charset="0"/>
-                <a:cs typeface="Arial" pitchFamily="34" charset="0"/>
-              </a:rPr>
-              <a:t>If your code is working on something, it is up to you to check for cancellation </a:t>
-            </a:r>
-          </a:p>
-          <a:p>
-            <a:r>
-              <a:rPr lang="en-US" sz="1600" dirty="0">
-                <a:latin typeface="Arial" pitchFamily="34" charset="0"/>
-                <a:cs typeface="Arial" pitchFamily="34" charset="0"/>
-              </a:rPr>
-              <a:t>(which means checking for interruption).</a:t>
-            </a:r>
-          </a:p>
-          <a:p>
-            <a:endParaRPr lang="en-US" sz="1600" dirty="0">
-              <a:latin typeface="Arial" pitchFamily="34" charset="0"/>
-              <a:cs typeface="Arial" pitchFamily="34" charset="0"/>
-            </a:endParaRPr>
-          </a:p>
-          <a:p>
-            <a:r>
-              <a:rPr lang="en-US" sz="1600" dirty="0">
-                <a:latin typeface="Arial" pitchFamily="34" charset="0"/>
-                <a:cs typeface="Arial" pitchFamily="34" charset="0"/>
-              </a:rPr>
-              <a:t>More on this on Chapter 7.</a:t>
-            </a:r>
-          </a:p>
-        </p:txBody>
-      </p:sp>
+              <a:rPr lang="en-US" dirty="0" err="1"/>
+              <a:t>BlockingQueues</a:t>
+            </a:r>
+            <a:endParaRPr lang="en-US" dirty="0"/>
+          </a:p>
+          <a:p>
+            <a:r>
+              <a:rPr lang="en-US" dirty="0"/>
+              <a:t>A Peak calling example with semaphore</a:t>
+            </a:r>
+          </a:p>
+          <a:p>
+            <a:r>
+              <a:rPr lang="en-US" dirty="0" err="1"/>
+              <a:t>CountDownLatch</a:t>
+            </a:r>
+            <a:endParaRPr lang="en-US" dirty="0"/>
+          </a:p>
+          <a:p>
+            <a:r>
+              <a:rPr lang="en-US" dirty="0"/>
+              <a:t>Callable, Future, </a:t>
+            </a:r>
+            <a:r>
+              <a:rPr lang="en-US" dirty="0" err="1"/>
+              <a:t>FutureTask</a:t>
+            </a:r>
+            <a:endParaRPr lang="en-US" dirty="0"/>
+          </a:p>
+          <a:p>
+            <a:r>
+              <a:rPr lang="en-US" dirty="0"/>
+              <a:t>Cancellation</a:t>
+            </a:r>
+          </a:p>
+          <a:p>
+            <a:endParaRPr lang="en-US" dirty="0"/>
+          </a:p>
+          <a:p>
+            <a:endParaRPr lang="en-US" dirty="0"/>
+          </a:p>
+          <a:p>
+            <a:endParaRPr lang="en-US" dirty="0"/>
+          </a:p>
+        </p:txBody>
+      </p:sp>
+      <p:cxnSp>
+        <p:nvCxnSpPr>
+          <p:cNvPr id="7" name="Straight Arrow Connector 6"/>
+          <p:cNvCxnSpPr/>
+          <p:nvPr/>
+        </p:nvCxnSpPr>
+        <p:spPr>
+          <a:xfrm rot="10800000">
+            <a:off x="1905000" y="1751011"/>
+            <a:ext cx="533400" cy="1588"/>
+          </a:xfrm>
+          <a:prstGeom prst="straightConnector1">
+            <a:avLst/>
+          </a:prstGeom>
+          <a:ln>
+            <a:tailEnd type="arrow"/>
+          </a:ln>
+        </p:spPr>
+        <p:style>
+          <a:lnRef idx="1">
+            <a:schemeClr val="accent1"/>
+          </a:lnRef>
+          <a:fillRef idx="0">
+            <a:schemeClr val="accent1"/>
+          </a:fillRef>
+          <a:effectRef idx="0">
+            <a:schemeClr val="accent1"/>
+          </a:effectRef>
+          <a:fontRef idx="minor">
+            <a:schemeClr val="tx1"/>
+          </a:fontRef>
+        </p:style>
+      </p:cxnSp>
     </p:spTree>
   </p:cSld>
   <p:clrMapOvr>
@@ -7766,7 +7829,7 @@
       </p:grpSpPr>
       <p:pic>
         <p:nvPicPr>
-          <p:cNvPr id="1026" name="Picture 2"/>
+          <p:cNvPr id="3074" name="Picture 2"/>
           <p:cNvPicPr>
             <a:picLocks noChangeAspect="1" noChangeArrowheads="1"/>
           </p:cNvPicPr>
@@ -7781,8 +7844,8 @@
         </p:blipFill>
         <p:spPr bwMode="auto">
           <a:xfrm>
-            <a:off x="76200" y="152400"/>
-            <a:ext cx="5381625" cy="6448425"/>
+            <a:off x="276225" y="1914525"/>
+            <a:ext cx="8591550" cy="3028950"/>
           </a:xfrm>
           <a:prstGeom prst="rect">
             <a:avLst/>
@@ -7796,48 +7859,16 @@
           </a:ln>
         </p:spPr>
       </p:pic>
-      <p:pic>
-        <p:nvPicPr>
-          <p:cNvPr id="1027" name="Picture 3"/>
-          <p:cNvPicPr>
-            <a:picLocks noChangeAspect="1" noChangeArrowheads="1"/>
-          </p:cNvPicPr>
-          <p:nvPr/>
-        </p:nvPicPr>
-        <p:blipFill>
-          <a:blip r:embed="rId3" cstate="print"/>
-          <a:srcRect/>
-          <a:stretch>
-            <a:fillRect/>
-          </a:stretch>
-        </p:blipFill>
-        <p:spPr bwMode="auto">
-          <a:xfrm>
-            <a:off x="4191000" y="4343400"/>
-            <a:ext cx="4724400" cy="1685549"/>
-          </a:xfrm>
-          <a:prstGeom prst="rect">
-            <a:avLst/>
-          </a:prstGeom>
-          <a:noFill/>
-          <a:ln w="9525">
-            <a:noFill/>
-            <a:miter lim="800000"/>
-            <a:headEnd/>
-            <a:tailEnd/>
-          </a:ln>
-        </p:spPr>
-      </p:pic>
-      <p:sp>
-        <p:nvSpPr>
-          <p:cNvPr id="7" name="TextBox 6"/>
+      <p:sp>
+        <p:nvSpPr>
+          <p:cNvPr id="5" name="TextBox 4"/>
           <p:cNvSpPr txBox="1"/>
           <p:nvPr/>
         </p:nvSpPr>
         <p:spPr>
           <a:xfrm>
-            <a:off x="4343400" y="1600200"/>
-            <a:ext cx="4838184" cy="1077218"/>
+            <a:off x="381000" y="990600"/>
+            <a:ext cx="8172109" cy="646331"/>
           </a:xfrm>
           <a:prstGeom prst="rect">
             <a:avLst/>
@@ -7851,135 +7882,18 @@
           <a:lstStyle/>
           <a:p>
             <a:r>
-              <a:rPr lang="en-US" sz="1600" dirty="0">
-                <a:latin typeface="Arial" pitchFamily="34" charset="0"/>
-                <a:cs typeface="Arial" pitchFamily="34" charset="0"/>
-              </a:rPr>
-              <a:t>Calling cancel causes an Interruption flag to be set.</a:t>
-            </a:r>
-          </a:p>
-          <a:p>
-            <a:r>
-              <a:rPr lang="en-US" sz="1600" dirty="0" err="1">
-                <a:latin typeface="Arial" pitchFamily="34" charset="0"/>
-                <a:cs typeface="Arial" pitchFamily="34" charset="0"/>
-              </a:rPr>
-              <a:t>Thread.sleep</a:t>
-            </a:r>
-            <a:r>
-              <a:rPr lang="en-US" sz="1600" dirty="0">
-                <a:latin typeface="Arial" pitchFamily="34" charset="0"/>
-                <a:cs typeface="Arial" pitchFamily="34" charset="0"/>
-              </a:rPr>
-              <a:t>(..) checks that interruption flag and</a:t>
-            </a:r>
-          </a:p>
-          <a:p>
-            <a:r>
-              <a:rPr lang="en-US" sz="1600" dirty="0">
-                <a:latin typeface="Arial" pitchFamily="34" charset="0"/>
-                <a:cs typeface="Arial" pitchFamily="34" charset="0"/>
-              </a:rPr>
-              <a:t>If it is set throws </a:t>
-            </a:r>
-            <a:r>
-              <a:rPr lang="en-US" sz="1600" dirty="0" err="1">
-                <a:latin typeface="Arial" pitchFamily="34" charset="0"/>
-                <a:cs typeface="Arial" pitchFamily="34" charset="0"/>
-              </a:rPr>
-              <a:t>InterruptedException</a:t>
-            </a:r>
-            <a:r>
-              <a:rPr lang="en-US" sz="1600" dirty="0">
-                <a:latin typeface="Arial" pitchFamily="34" charset="0"/>
-                <a:cs typeface="Arial" pitchFamily="34" charset="0"/>
-              </a:rPr>
-              <a:t>.</a:t>
-            </a:r>
-          </a:p>
-          <a:p>
-            <a:endParaRPr lang="en-US" sz="1600" dirty="0">
-              <a:latin typeface="Arial" pitchFamily="34" charset="0"/>
-              <a:cs typeface="Arial" pitchFamily="34" charset="0"/>
-            </a:endParaRPr>
-          </a:p>
-        </p:txBody>
-      </p:sp>
-      <p:sp>
-        <p:nvSpPr>
-          <p:cNvPr id="8" name="Rectangle 7"/>
-          <p:cNvSpPr/>
-          <p:nvPr/>
-        </p:nvSpPr>
-        <p:spPr>
-          <a:xfrm>
-            <a:off x="3581400" y="6172200"/>
-            <a:ext cx="5562600" cy="338554"/>
-          </a:xfrm>
-          <a:prstGeom prst="rect">
-            <a:avLst/>
-          </a:prstGeom>
-        </p:spPr>
-        <p:txBody>
-          <a:bodyPr wrap="square">
-            <a:spAutoFit/>
-          </a:bodyPr>
-          <a:lstStyle/>
-          <a:p>
-            <a:r>
-              <a:rPr lang="en-US" sz="1600" dirty="0">
-                <a:latin typeface="Arial" pitchFamily="34" charset="0"/>
-                <a:cs typeface="Arial" pitchFamily="34" charset="0"/>
-              </a:rPr>
-              <a:t>Calling get() after cancel, throws a </a:t>
-            </a:r>
-            <a:r>
-              <a:rPr lang="en-US" sz="1600" dirty="0" err="1">
-                <a:latin typeface="Arial" pitchFamily="34" charset="0"/>
-                <a:cs typeface="Arial" pitchFamily="34" charset="0"/>
-              </a:rPr>
-              <a:t>CancellationException</a:t>
-            </a:r>
-            <a:endParaRPr lang="en-US" sz="1600" dirty="0">
-              <a:latin typeface="Arial" pitchFamily="34" charset="0"/>
-              <a:cs typeface="Arial" pitchFamily="34" charset="0"/>
-            </a:endParaRPr>
-          </a:p>
-        </p:txBody>
-      </p:sp>
-      <p:cxnSp>
-        <p:nvCxnSpPr>
-          <p:cNvPr id="12" name="Straight Arrow Connector 11"/>
-          <p:cNvCxnSpPr/>
-          <p:nvPr/>
-        </p:nvCxnSpPr>
-        <p:spPr>
-          <a:xfrm rot="10800000">
-            <a:off x="3048000" y="6248400"/>
-            <a:ext cx="533400" cy="76200"/>
-          </a:xfrm>
-          <a:prstGeom prst="straightConnector1">
-            <a:avLst/>
-          </a:prstGeom>
-          <a:ln>
-            <a:tailEnd type="arrow"/>
-          </a:ln>
-        </p:spPr>
-        <p:style>
-          <a:lnRef idx="1">
-            <a:schemeClr val="accent1"/>
-          </a:lnRef>
-          <a:fillRef idx="0">
-            <a:schemeClr val="accent1"/>
-          </a:fillRef>
-          <a:effectRef idx="0">
-            <a:schemeClr val="accent1"/>
-          </a:effectRef>
-          <a:fontRef idx="minor">
-            <a:schemeClr val="tx1"/>
-          </a:fontRef>
-        </p:style>
-      </p:cxnSp>
+              <a:rPr lang="en-US" dirty="0"/>
+              <a:t>Future also supports cancellation, but this is dependent upon the co-operation of the</a:t>
+            </a:r>
+          </a:p>
+          <a:p>
+            <a:r>
+              <a:rPr lang="en-US" dirty="0"/>
+              <a:t>running threads…</a:t>
+            </a:r>
+          </a:p>
+        </p:txBody>
+      </p:sp>
     </p:spTree>
   </p:cSld>
   <p:clrMapOvr>
@@ -8007,7 +7921,7 @@
       </p:grpSpPr>
       <p:pic>
         <p:nvPicPr>
-          <p:cNvPr id="4098" name="Picture 2"/>
+          <p:cNvPr id="1026" name="Picture 2"/>
           <p:cNvPicPr>
             <a:picLocks noChangeAspect="1" noChangeArrowheads="1"/>
           </p:cNvPicPr>
@@ -8022,8 +7936,8 @@
         </p:blipFill>
         <p:spPr bwMode="auto">
           <a:xfrm>
-            <a:off x="1066800" y="2057400"/>
-            <a:ext cx="6911738" cy="2819400"/>
+            <a:off x="314325" y="2047875"/>
+            <a:ext cx="8515350" cy="2762250"/>
           </a:xfrm>
           <a:prstGeom prst="rect">
             <a:avLst/>
@@ -8037,6 +7951,78 @@
           </a:ln>
         </p:spPr>
       </p:pic>
+      <p:sp>
+        <p:nvSpPr>
+          <p:cNvPr id="3" name="TextBox 2"/>
+          <p:cNvSpPr txBox="1"/>
+          <p:nvPr/>
+        </p:nvSpPr>
+        <p:spPr>
+          <a:xfrm>
+            <a:off x="457200" y="218182"/>
+            <a:ext cx="7620000" cy="1323439"/>
+          </a:xfrm>
+          <a:prstGeom prst="rect">
+            <a:avLst/>
+          </a:prstGeom>
+          <a:noFill/>
+        </p:spPr>
+        <p:txBody>
+          <a:bodyPr wrap="square" rtlCol="0">
+            <a:spAutoFit/>
+          </a:bodyPr>
+          <a:lstStyle/>
+          <a:p>
+            <a:r>
+              <a:rPr lang="en-US" sz="1600" dirty="0" err="1">
+                <a:latin typeface="Arial" pitchFamily="34" charset="0"/>
+                <a:cs typeface="Arial" pitchFamily="34" charset="0"/>
+              </a:rPr>
+              <a:t>Thread.sleep</a:t>
+            </a:r>
+            <a:r>
+              <a:rPr lang="en-US" sz="1600" dirty="0">
+                <a:latin typeface="Arial" pitchFamily="34" charset="0"/>
+                <a:cs typeface="Arial" pitchFamily="34" charset="0"/>
+              </a:rPr>
+              <a:t> and nearly all other Java blocking methods support cancellation.</a:t>
+            </a:r>
+          </a:p>
+          <a:p>
+            <a:r>
+              <a:rPr lang="en-US" sz="1600" dirty="0">
+                <a:latin typeface="Arial" pitchFamily="34" charset="0"/>
+                <a:cs typeface="Arial" pitchFamily="34" charset="0"/>
+              </a:rPr>
+              <a:t>If your code is working on something, it is up to you to check for cancellation </a:t>
+            </a:r>
+          </a:p>
+          <a:p>
+            <a:r>
+              <a:rPr lang="en-US" sz="1600" dirty="0">
+                <a:latin typeface="Arial" pitchFamily="34" charset="0"/>
+                <a:cs typeface="Arial" pitchFamily="34" charset="0"/>
+              </a:rPr>
+              <a:t>(which means checking for interruption).</a:t>
+            </a:r>
+          </a:p>
+          <a:p>
+            <a:endParaRPr lang="en-US" sz="1600" dirty="0">
+              <a:latin typeface="Arial" pitchFamily="34" charset="0"/>
+              <a:cs typeface="Arial" pitchFamily="34" charset="0"/>
+            </a:endParaRPr>
+          </a:p>
+          <a:p>
+            <a:r>
+              <a:rPr lang="en-US" sz="1600" dirty="0">
+                <a:latin typeface="Arial" pitchFamily="34" charset="0"/>
+                <a:cs typeface="Arial" pitchFamily="34" charset="0"/>
+              </a:rPr>
+              <a:t>More on this on Chapter 7.</a:t>
+            </a:r>
+          </a:p>
+        </p:txBody>
+      </p:sp>
     </p:spTree>
   </p:cSld>
   <p:clrMapOvr>
@@ -8064,7 +8050,7 @@
       </p:grpSpPr>
       <p:pic>
         <p:nvPicPr>
-          <p:cNvPr id="2050" name="Picture 2"/>
+          <p:cNvPr id="1026" name="Picture 2"/>
           <p:cNvPicPr>
             <a:picLocks noChangeAspect="1" noChangeArrowheads="1"/>
           </p:cNvPicPr>
@@ -8079,8 +8065,8 @@
         </p:blipFill>
         <p:spPr bwMode="auto">
           <a:xfrm>
-            <a:off x="228600" y="76200"/>
-            <a:ext cx="5773994" cy="6629400"/>
+            <a:off x="76200" y="152400"/>
+            <a:ext cx="5381625" cy="6448425"/>
           </a:xfrm>
           <a:prstGeom prst="rect">
             <a:avLst/>
@@ -8094,16 +8080,48 @@
           </a:ln>
         </p:spPr>
       </p:pic>
-      <p:sp>
-        <p:nvSpPr>
-          <p:cNvPr id="5" name="TextBox 4"/>
+      <p:pic>
+        <p:nvPicPr>
+          <p:cNvPr id="1027" name="Picture 3"/>
+          <p:cNvPicPr>
+            <a:picLocks noChangeAspect="1" noChangeArrowheads="1"/>
+          </p:cNvPicPr>
+          <p:nvPr/>
+        </p:nvPicPr>
+        <p:blipFill>
+          <a:blip r:embed="rId3" cstate="print"/>
+          <a:srcRect/>
+          <a:stretch>
+            <a:fillRect/>
+          </a:stretch>
+        </p:blipFill>
+        <p:spPr bwMode="auto">
+          <a:xfrm>
+            <a:off x="4191000" y="4343400"/>
+            <a:ext cx="4724400" cy="1685549"/>
+          </a:xfrm>
+          <a:prstGeom prst="rect">
+            <a:avLst/>
+          </a:prstGeom>
+          <a:noFill/>
+          <a:ln w="9525">
+            <a:noFill/>
+            <a:miter lim="800000"/>
+            <a:headEnd/>
+            <a:tailEnd/>
+          </a:ln>
+        </p:spPr>
+      </p:pic>
+      <p:sp>
+        <p:nvSpPr>
+          <p:cNvPr id="7" name="TextBox 6"/>
           <p:cNvSpPr txBox="1"/>
           <p:nvPr/>
         </p:nvSpPr>
         <p:spPr>
           <a:xfrm>
-            <a:off x="5029200" y="381000"/>
-            <a:ext cx="4004966" cy="1200329"/>
+            <a:off x="4343400" y="1600200"/>
+            <a:ext cx="4838184" cy="1077218"/>
           </a:xfrm>
           <a:prstGeom prst="rect">
             <a:avLst/>
@@ -8111,36 +8129,118 @@
           <a:noFill/>
         </p:spPr>
         <p:txBody>
-          <a:bodyPr wrap="square" rtlCol="0">
+          <a:bodyPr wrap="none" rtlCol="0">
             <a:spAutoFit/>
           </a:bodyPr>
           <a:lstStyle/>
           <a:p>
             <a:r>
-              <a:rPr lang="en-US" dirty="0"/>
-              <a:t>If you are not using one of Java’s  blocking methods (like </a:t>
-            </a:r>
-            <a:r>
-              <a:rPr lang="en-US" dirty="0" err="1"/>
+              <a:rPr lang="en-US" sz="1600" dirty="0">
+                <a:latin typeface="Arial" pitchFamily="34" charset="0"/>
+                <a:cs typeface="Arial" pitchFamily="34" charset="0"/>
+              </a:rPr>
+              <a:t>Calling cancel causes an Interruption flag to be set.</a:t>
+            </a:r>
+          </a:p>
+          <a:p>
+            <a:r>
+              <a:rPr lang="en-US" sz="1600" dirty="0" err="1">
+                <a:latin typeface="Arial" pitchFamily="34" charset="0"/>
+                <a:cs typeface="Arial" pitchFamily="34" charset="0"/>
+              </a:rPr>
               <a:t>Thread.sleep</a:t>
             </a:r>
             <a:r>
-              <a:rPr lang="en-US" dirty="0"/>
-              <a:t>()) that supports interruption, it is up to you to check for cancellation.</a:t>
-            </a:r>
+              <a:rPr lang="en-US" sz="1600" dirty="0">
+                <a:latin typeface="Arial" pitchFamily="34" charset="0"/>
+                <a:cs typeface="Arial" pitchFamily="34" charset="0"/>
+              </a:rPr>
+              <a:t>(..) checks that interruption flag and</a:t>
+            </a:r>
+          </a:p>
+          <a:p>
+            <a:r>
+              <a:rPr lang="en-US" sz="1600" dirty="0">
+                <a:latin typeface="Arial" pitchFamily="34" charset="0"/>
+                <a:cs typeface="Arial" pitchFamily="34" charset="0"/>
+              </a:rPr>
+              <a:t>If it is set throws </a:t>
+            </a:r>
+            <a:r>
+              <a:rPr lang="en-US" sz="1600" dirty="0" err="1">
+                <a:latin typeface="Arial" pitchFamily="34" charset="0"/>
+                <a:cs typeface="Arial" pitchFamily="34" charset="0"/>
+              </a:rPr>
+              <a:t>InterruptedException</a:t>
+            </a:r>
+            <a:r>
+              <a:rPr lang="en-US" sz="1600" dirty="0">
+                <a:latin typeface="Arial" pitchFamily="34" charset="0"/>
+                <a:cs typeface="Arial" pitchFamily="34" charset="0"/>
+              </a:rPr>
+              <a:t>.</a:t>
+            </a:r>
+          </a:p>
+          <a:p>
+            <a:endParaRPr lang="en-US" sz="1600" dirty="0">
+              <a:latin typeface="Arial" pitchFamily="34" charset="0"/>
+              <a:cs typeface="Arial" pitchFamily="34" charset="0"/>
+            </a:endParaRPr>
+          </a:p>
+        </p:txBody>
+      </p:sp>
+      <p:sp>
+        <p:nvSpPr>
+          <p:cNvPr id="8" name="Rectangle 7"/>
+          <p:cNvSpPr/>
+          <p:nvPr/>
+        </p:nvSpPr>
+        <p:spPr>
+          <a:xfrm>
+            <a:off x="3581400" y="6172200"/>
+            <a:ext cx="5562600" cy="338554"/>
+          </a:xfrm>
+          <a:prstGeom prst="rect">
+            <a:avLst/>
+          </a:prstGeom>
+        </p:spPr>
+        <p:txBody>
+          <a:bodyPr wrap="square">
+            <a:spAutoFit/>
+          </a:bodyPr>
+          <a:lstStyle/>
+          <a:p>
+            <a:r>
+              <a:rPr lang="en-US" sz="1600" dirty="0">
+                <a:latin typeface="Arial" pitchFamily="34" charset="0"/>
+                <a:cs typeface="Arial" pitchFamily="34" charset="0"/>
+              </a:rPr>
+              <a:t>Calling get() after cancel, throws a </a:t>
+            </a:r>
+            <a:r>
+              <a:rPr lang="en-US" sz="1600" dirty="0" err="1">
+                <a:latin typeface="Arial" pitchFamily="34" charset="0"/>
+                <a:cs typeface="Arial" pitchFamily="34" charset="0"/>
+              </a:rPr>
+              <a:t>CancellationException</a:t>
+            </a:r>
+            <a:endParaRPr lang="en-US" sz="1600" dirty="0">
+              <a:latin typeface="Arial" pitchFamily="34" charset="0"/>
+              <a:cs typeface="Arial" pitchFamily="34" charset="0"/>
+            </a:endParaRPr>
           </a:p>
         </p:txBody>
       </p:sp>
       <p:cxnSp>
         <p:nvCxnSpPr>
-          <p:cNvPr id="7" name="Straight Arrow Connector 6"/>
+          <p:cNvPr id="12" name="Straight Arrow Connector 11"/>
           <p:cNvCxnSpPr/>
           <p:nvPr/>
         </p:nvCxnSpPr>
         <p:spPr>
           <a:xfrm rot="10800000">
-            <a:off x="4038600" y="2133600"/>
-            <a:ext cx="609600" cy="1588"/>
+            <a:off x="3048000" y="6248400"/>
+            <a:ext cx="533400" cy="76200"/>
           </a:xfrm>
           <a:prstGeom prst="straightConnector1">
             <a:avLst/>
@@ -8164,162 +8264,6 @@
           </a:fontRef>
         </p:style>
       </p:cxnSp>
-      <p:sp>
-        <p:nvSpPr>
-          <p:cNvPr id="9" name="TextBox 8"/>
-          <p:cNvSpPr txBox="1"/>
-          <p:nvPr/>
-        </p:nvSpPr>
-        <p:spPr>
-          <a:xfrm>
-            <a:off x="4572000" y="1916668"/>
-            <a:ext cx="3142463" cy="369332"/>
-          </a:xfrm>
-          <a:prstGeom prst="rect">
-            <a:avLst/>
-          </a:prstGeom>
-          <a:noFill/>
-        </p:spPr>
-        <p:txBody>
-          <a:bodyPr wrap="none" rtlCol="0">
-            <a:spAutoFit/>
-          </a:bodyPr>
-          <a:lstStyle/>
-          <a:p>
-            <a:r>
-              <a:rPr lang="en-US" dirty="0"/>
-              <a:t>We don’t check for cancellation</a:t>
-            </a:r>
-          </a:p>
-        </p:txBody>
-      </p:sp>
-      <p:pic>
-        <p:nvPicPr>
-          <p:cNvPr id="2051" name="Picture 3"/>
-          <p:cNvPicPr>
-            <a:picLocks noChangeAspect="1" noChangeArrowheads="1"/>
-          </p:cNvPicPr>
-          <p:nvPr/>
-        </p:nvPicPr>
-        <p:blipFill>
-          <a:blip r:embed="rId3" cstate="print"/>
-          <a:srcRect/>
-          <a:stretch>
-            <a:fillRect/>
-          </a:stretch>
-        </p:blipFill>
-        <p:spPr bwMode="auto">
-          <a:xfrm>
-            <a:off x="3993614" y="4267200"/>
-            <a:ext cx="5150386" cy="1524000"/>
-          </a:xfrm>
-          <a:prstGeom prst="rect">
-            <a:avLst/>
-          </a:prstGeom>
-          <a:noFill/>
-          <a:ln w="9525">
-            <a:noFill/>
-            <a:miter lim="800000"/>
-            <a:headEnd/>
-            <a:tailEnd/>
-          </a:ln>
-        </p:spPr>
-      </p:pic>
-      <p:sp>
-        <p:nvSpPr>
-          <p:cNvPr id="11" name="TextBox 10"/>
-          <p:cNvSpPr txBox="1"/>
-          <p:nvPr/>
-        </p:nvSpPr>
-        <p:spPr>
-          <a:xfrm>
-            <a:off x="4114800" y="3962400"/>
-            <a:ext cx="4673011" cy="369332"/>
-          </a:xfrm>
-          <a:prstGeom prst="rect">
-            <a:avLst/>
-          </a:prstGeom>
-          <a:noFill/>
-        </p:spPr>
-        <p:txBody>
-          <a:bodyPr wrap="none" rtlCol="0">
-            <a:spAutoFit/>
-          </a:bodyPr>
-          <a:lstStyle/>
-          <a:p>
-            <a:r>
-              <a:rPr lang="en-US" dirty="0"/>
-              <a:t>Our thread continued to work after cancellation</a:t>
-            </a:r>
-          </a:p>
-        </p:txBody>
-      </p:sp>
-      <p:cxnSp>
-        <p:nvCxnSpPr>
-          <p:cNvPr id="13" name="Straight Arrow Connector 12"/>
-          <p:cNvCxnSpPr/>
-          <p:nvPr/>
-        </p:nvCxnSpPr>
-        <p:spPr>
-          <a:xfrm rot="10800000">
-            <a:off x="3505200" y="6324600"/>
-            <a:ext cx="685800" cy="1588"/>
-          </a:xfrm>
-          <a:prstGeom prst="straightConnector1">
-            <a:avLst/>
-          </a:prstGeom>
-          <a:ln>
-            <a:tailEnd type="arrow"/>
-          </a:ln>
-        </p:spPr>
-        <p:style>
-          <a:lnRef idx="1">
-            <a:schemeClr val="accent1"/>
-          </a:lnRef>
-          <a:fillRef idx="0">
-            <a:schemeClr val="accent1"/>
-          </a:fillRef>
-          <a:effectRef idx="0">
-            <a:schemeClr val="accent1"/>
-          </a:effectRef>
-          <a:fontRef idx="minor">
-            <a:schemeClr val="tx1"/>
-          </a:fontRef>
-        </p:style>
-      </p:cxnSp>
-      <p:sp>
-        <p:nvSpPr>
-          <p:cNvPr id="14" name="TextBox 13"/>
-          <p:cNvSpPr txBox="1"/>
-          <p:nvPr/>
-        </p:nvSpPr>
-        <p:spPr>
-          <a:xfrm>
-            <a:off x="4191000" y="6172200"/>
-            <a:ext cx="1688732" cy="369332"/>
-          </a:xfrm>
-          <a:prstGeom prst="rect">
-            <a:avLst/>
-          </a:prstGeom>
-          <a:noFill/>
-        </p:spPr>
-        <p:txBody>
-          <a:bodyPr wrap="none" rtlCol="0">
-            <a:spAutoFit/>
-          </a:bodyPr>
-          <a:lstStyle/>
-          <a:p>
-            <a:r>
-              <a:rPr lang="en-US" dirty="0"/>
-              <a:t>get </a:t>
-            </a:r>
-            <a:r>
-              <a:rPr lang="en-US"/>
-              <a:t>still  throws!</a:t>
-            </a:r>
-          </a:p>
-        </p:txBody>
-      </p:sp>
     </p:spTree>
   </p:cSld>
   <p:clrMapOvr>
@@ -8664,7 +8608,7 @@
       </p:grpSpPr>
       <p:pic>
         <p:nvPicPr>
-          <p:cNvPr id="1027" name="Picture 3"/>
+          <p:cNvPr id="4098" name="Picture 2"/>
           <p:cNvPicPr>
             <a:picLocks noChangeAspect="1" noChangeArrowheads="1"/>
           </p:cNvPicPr>
@@ -8679,8 +8623,8 @@
         </p:blipFill>
         <p:spPr bwMode="auto">
           <a:xfrm>
-            <a:off x="457200" y="304800"/>
-            <a:ext cx="5112774" cy="6400800"/>
+            <a:off x="1066800" y="2057400"/>
+            <a:ext cx="6911738" cy="2819400"/>
           </a:xfrm>
           <a:prstGeom prst="rect">
             <a:avLst/>
@@ -8694,129 +8638,6 @@
           </a:ln>
         </p:spPr>
       </p:pic>
-      <p:cxnSp>
-        <p:nvCxnSpPr>
-          <p:cNvPr id="5" name="Straight Arrow Connector 4"/>
-          <p:cNvCxnSpPr/>
-          <p:nvPr/>
-        </p:nvCxnSpPr>
-        <p:spPr>
-          <a:xfrm rot="10800000">
-            <a:off x="3886200" y="2132011"/>
-            <a:ext cx="838200" cy="1588"/>
-          </a:xfrm>
-          <a:prstGeom prst="straightConnector1">
-            <a:avLst/>
-          </a:prstGeom>
-          <a:ln>
-            <a:tailEnd type="arrow"/>
-          </a:ln>
-        </p:spPr>
-        <p:style>
-          <a:lnRef idx="1">
-            <a:schemeClr val="accent1"/>
-          </a:lnRef>
-          <a:fillRef idx="0">
-            <a:schemeClr val="accent1"/>
-          </a:fillRef>
-          <a:effectRef idx="0">
-            <a:schemeClr val="accent1"/>
-          </a:effectRef>
-          <a:fontRef idx="minor">
-            <a:schemeClr val="tx1"/>
-          </a:fontRef>
-        </p:style>
-      </p:cxnSp>
-      <p:sp>
-        <p:nvSpPr>
-          <p:cNvPr id="6" name="TextBox 5"/>
-          <p:cNvSpPr txBox="1"/>
-          <p:nvPr/>
-        </p:nvSpPr>
-        <p:spPr>
-          <a:xfrm>
-            <a:off x="5410200" y="533400"/>
-            <a:ext cx="2791598" cy="369332"/>
-          </a:xfrm>
-          <a:prstGeom prst="rect">
-            <a:avLst/>
-          </a:prstGeom>
-          <a:noFill/>
-        </p:spPr>
-        <p:txBody>
-          <a:bodyPr wrap="none" rtlCol="0">
-            <a:spAutoFit/>
-          </a:bodyPr>
-          <a:lstStyle/>
-          <a:p>
-            <a:r>
-              <a:rPr lang="en-US" dirty="0"/>
-              <a:t>Our cancellation now works</a:t>
-            </a:r>
-          </a:p>
-        </p:txBody>
-      </p:sp>
-      <p:pic>
-        <p:nvPicPr>
-          <p:cNvPr id="1028" name="Picture 4"/>
-          <p:cNvPicPr>
-            <a:picLocks noChangeAspect="1" noChangeArrowheads="1"/>
-          </p:cNvPicPr>
-          <p:nvPr/>
-        </p:nvPicPr>
-        <p:blipFill>
-          <a:blip r:embed="rId3" cstate="print"/>
-          <a:srcRect/>
-          <a:stretch>
-            <a:fillRect/>
-          </a:stretch>
-        </p:blipFill>
-        <p:spPr bwMode="auto">
-          <a:xfrm>
-            <a:off x="3810000" y="4419600"/>
-            <a:ext cx="5124450" cy="1480594"/>
-          </a:xfrm>
-          <a:prstGeom prst="rect">
-            <a:avLst/>
-          </a:prstGeom>
-          <a:noFill/>
-          <a:ln w="9525">
-            <a:noFill/>
-            <a:miter lim="800000"/>
-            <a:headEnd/>
-            <a:tailEnd/>
-          </a:ln>
-        </p:spPr>
-      </p:pic>
-      <p:sp>
-        <p:nvSpPr>
-          <p:cNvPr id="8" name="TextBox 7"/>
-          <p:cNvSpPr txBox="1"/>
-          <p:nvPr/>
-        </p:nvSpPr>
-        <p:spPr>
-          <a:xfrm>
-            <a:off x="4114800" y="5943600"/>
-            <a:ext cx="4800600" cy="646331"/>
-          </a:xfrm>
-          <a:prstGeom prst="rect">
-            <a:avLst/>
-          </a:prstGeom>
-          <a:noFill/>
-        </p:spPr>
-        <p:txBody>
-          <a:bodyPr wrap="square" rtlCol="0">
-            <a:spAutoFit/>
-          </a:bodyPr>
-          <a:lstStyle/>
-          <a:p>
-            <a:r>
-              <a:rPr lang="en-US" dirty="0"/>
-              <a:t>The thread is successfully cancelled.  “end work” is not reached</a:t>
-            </a:r>
-          </a:p>
-        </p:txBody>
-      </p:sp>
     </p:spTree>
   </p:cSld>
   <p:clrMapOvr>
@@ -8844,7 +8665,7 @@
       </p:grpSpPr>
       <p:pic>
         <p:nvPicPr>
-          <p:cNvPr id="3074" name="Picture 2"/>
+          <p:cNvPr id="2050" name="Picture 2"/>
           <p:cNvPicPr>
             <a:picLocks noChangeAspect="1" noChangeArrowheads="1"/>
           </p:cNvPicPr>
@@ -8859,8 +8680,8 @@
         </p:blipFill>
         <p:spPr bwMode="auto">
           <a:xfrm>
-            <a:off x="228600" y="0"/>
-            <a:ext cx="4791075" cy="4000500"/>
+            <a:off x="228600" y="76200"/>
+            <a:ext cx="5773994" cy="6629400"/>
           </a:xfrm>
           <a:prstGeom prst="rect">
             <a:avLst/>
@@ -8874,90 +8695,52 @@
           </a:ln>
         </p:spPr>
       </p:pic>
-      <p:pic>
-        <p:nvPicPr>
-          <p:cNvPr id="3075" name="Picture 3"/>
-          <p:cNvPicPr>
-            <a:picLocks noChangeAspect="1" noChangeArrowheads="1"/>
-          </p:cNvPicPr>
-          <p:nvPr/>
-        </p:nvPicPr>
-        <p:blipFill>
-          <a:blip r:embed="rId3" cstate="print"/>
-          <a:srcRect/>
-          <a:stretch>
-            <a:fillRect/>
-          </a:stretch>
-        </p:blipFill>
-        <p:spPr bwMode="auto">
-          <a:xfrm>
-            <a:off x="457200" y="4191000"/>
-            <a:ext cx="3947448" cy="2438400"/>
+      <p:sp>
+        <p:nvSpPr>
+          <p:cNvPr id="5" name="TextBox 4"/>
+          <p:cNvSpPr txBox="1"/>
+          <p:nvPr/>
+        </p:nvSpPr>
+        <p:spPr>
+          <a:xfrm>
+            <a:off x="5029200" y="381000"/>
+            <a:ext cx="4004966" cy="1200329"/>
           </a:xfrm>
           <a:prstGeom prst="rect">
             <a:avLst/>
           </a:prstGeom>
           <a:noFill/>
-          <a:ln w="9525">
-            <a:noFill/>
-            <a:miter lim="800000"/>
-            <a:headEnd/>
-            <a:tailEnd/>
-          </a:ln>
-        </p:spPr>
-      </p:pic>
-      <p:sp>
-        <p:nvSpPr>
-          <p:cNvPr id="7" name="TextBox 6"/>
-          <p:cNvSpPr txBox="1"/>
-          <p:nvPr/>
-        </p:nvSpPr>
-        <p:spPr>
-          <a:xfrm>
-            <a:off x="4800600" y="762000"/>
-            <a:ext cx="3834961" cy="646331"/>
-          </a:xfrm>
-          <a:prstGeom prst="rect">
-            <a:avLst/>
-          </a:prstGeom>
-          <a:noFill/>
-        </p:spPr>
-        <p:txBody>
-          <a:bodyPr wrap="none" rtlCol="0">
+        </p:spPr>
+        <p:txBody>
+          <a:bodyPr wrap="square" rtlCol="0">
             <a:spAutoFit/>
           </a:bodyPr>
           <a:lstStyle/>
           <a:p>
             <a:r>
               <a:rPr lang="en-US" dirty="0"/>
-              <a:t>If we throw a normal</a:t>
-            </a:r>
-          </a:p>
-          <a:p>
+              <a:t>If you are not using one of Java’s  blocking methods (like </a:t>
+            </a:r>
+            <a:r>
+              <a:rPr lang="en-US" dirty="0" err="1"/>
+              <a:t>Thread.sleep</a:t>
+            </a:r>
             <a:r>
               <a:rPr lang="en-US" dirty="0"/>
-              <a:t>Exception (not </a:t>
-            </a:r>
-            <a:r>
-              <a:rPr lang="en-US" dirty="0" err="1"/>
-              <a:t>InterruptedException</a:t>
-            </a:r>
-            <a:r>
-              <a:rPr lang="en-US" dirty="0"/>
-              <a:t>)…</a:t>
+              <a:t>()) that supports interruption, it is up to you to check for cancellation.</a:t>
             </a:r>
           </a:p>
         </p:txBody>
       </p:sp>
       <p:cxnSp>
         <p:nvCxnSpPr>
-          <p:cNvPr id="9" name="Straight Arrow Connector 8"/>
+          <p:cNvPr id="7" name="Straight Arrow Connector 6"/>
           <p:cNvCxnSpPr/>
           <p:nvPr/>
         </p:nvCxnSpPr>
         <p:spPr>
           <a:xfrm rot="10800000">
-            <a:off x="2971800" y="6400800"/>
+            <a:off x="4038600" y="2133600"/>
             <a:ext cx="609600" cy="1588"/>
           </a:xfrm>
           <a:prstGeom prst="straightConnector1">
@@ -8984,6 +8767,507 @@
       </p:cxnSp>
       <p:sp>
         <p:nvSpPr>
+          <p:cNvPr id="9" name="TextBox 8"/>
+          <p:cNvSpPr txBox="1"/>
+          <p:nvPr/>
+        </p:nvSpPr>
+        <p:spPr>
+          <a:xfrm>
+            <a:off x="4572000" y="1916668"/>
+            <a:ext cx="3142463" cy="369332"/>
+          </a:xfrm>
+          <a:prstGeom prst="rect">
+            <a:avLst/>
+          </a:prstGeom>
+          <a:noFill/>
+        </p:spPr>
+        <p:txBody>
+          <a:bodyPr wrap="none" rtlCol="0">
+            <a:spAutoFit/>
+          </a:bodyPr>
+          <a:lstStyle/>
+          <a:p>
+            <a:r>
+              <a:rPr lang="en-US" dirty="0"/>
+              <a:t>We don’t check for cancellation</a:t>
+            </a:r>
+          </a:p>
+        </p:txBody>
+      </p:sp>
+      <p:pic>
+        <p:nvPicPr>
+          <p:cNvPr id="2051" name="Picture 3"/>
+          <p:cNvPicPr>
+            <a:picLocks noChangeAspect="1" noChangeArrowheads="1"/>
+          </p:cNvPicPr>
+          <p:nvPr/>
+        </p:nvPicPr>
+        <p:blipFill>
+          <a:blip r:embed="rId3" cstate="print"/>
+          <a:srcRect/>
+          <a:stretch>
+            <a:fillRect/>
+          </a:stretch>
+        </p:blipFill>
+        <p:spPr bwMode="auto">
+          <a:xfrm>
+            <a:off x="3993614" y="4267200"/>
+            <a:ext cx="5150386" cy="1524000"/>
+          </a:xfrm>
+          <a:prstGeom prst="rect">
+            <a:avLst/>
+          </a:prstGeom>
+          <a:noFill/>
+          <a:ln w="9525">
+            <a:noFill/>
+            <a:miter lim="800000"/>
+            <a:headEnd/>
+            <a:tailEnd/>
+          </a:ln>
+        </p:spPr>
+      </p:pic>
+      <p:sp>
+        <p:nvSpPr>
+          <p:cNvPr id="11" name="TextBox 10"/>
+          <p:cNvSpPr txBox="1"/>
+          <p:nvPr/>
+        </p:nvSpPr>
+        <p:spPr>
+          <a:xfrm>
+            <a:off x="4114800" y="3962400"/>
+            <a:ext cx="4673011" cy="369332"/>
+          </a:xfrm>
+          <a:prstGeom prst="rect">
+            <a:avLst/>
+          </a:prstGeom>
+          <a:noFill/>
+        </p:spPr>
+        <p:txBody>
+          <a:bodyPr wrap="none" rtlCol="0">
+            <a:spAutoFit/>
+          </a:bodyPr>
+          <a:lstStyle/>
+          <a:p>
+            <a:r>
+              <a:rPr lang="en-US" dirty="0"/>
+              <a:t>Our thread continued to work after cancellation</a:t>
+            </a:r>
+          </a:p>
+        </p:txBody>
+      </p:sp>
+      <p:cxnSp>
+        <p:nvCxnSpPr>
+          <p:cNvPr id="13" name="Straight Arrow Connector 12"/>
+          <p:cNvCxnSpPr/>
+          <p:nvPr/>
+        </p:nvCxnSpPr>
+        <p:spPr>
+          <a:xfrm rot="10800000">
+            <a:off x="3505200" y="6324600"/>
+            <a:ext cx="685800" cy="1588"/>
+          </a:xfrm>
+          <a:prstGeom prst="straightConnector1">
+            <a:avLst/>
+          </a:prstGeom>
+          <a:ln>
+            <a:tailEnd type="arrow"/>
+          </a:ln>
+        </p:spPr>
+        <p:style>
+          <a:lnRef idx="1">
+            <a:schemeClr val="accent1"/>
+          </a:lnRef>
+          <a:fillRef idx="0">
+            <a:schemeClr val="accent1"/>
+          </a:fillRef>
+          <a:effectRef idx="0">
+            <a:schemeClr val="accent1"/>
+          </a:effectRef>
+          <a:fontRef idx="minor">
+            <a:schemeClr val="tx1"/>
+          </a:fontRef>
+        </p:style>
+      </p:cxnSp>
+      <p:sp>
+        <p:nvSpPr>
+          <p:cNvPr id="14" name="TextBox 13"/>
+          <p:cNvSpPr txBox="1"/>
+          <p:nvPr/>
+        </p:nvSpPr>
+        <p:spPr>
+          <a:xfrm>
+            <a:off x="4191000" y="6172200"/>
+            <a:ext cx="1688732" cy="369332"/>
+          </a:xfrm>
+          <a:prstGeom prst="rect">
+            <a:avLst/>
+          </a:prstGeom>
+          <a:noFill/>
+        </p:spPr>
+        <p:txBody>
+          <a:bodyPr wrap="none" rtlCol="0">
+            <a:spAutoFit/>
+          </a:bodyPr>
+          <a:lstStyle/>
+          <a:p>
+            <a:r>
+              <a:rPr lang="en-US" dirty="0"/>
+              <a:t>get </a:t>
+            </a:r>
+            <a:r>
+              <a:rPr lang="en-US"/>
+              <a:t>still  throws!</a:t>
+            </a:r>
+          </a:p>
+        </p:txBody>
+      </p:sp>
+    </p:spTree>
+  </p:cSld>
+  <p:clrMapOvr>
+    <a:masterClrMapping/>
+  </p:clrMapOvr>
+</p:sld>
+</file>
+
+<file path=ppt/slides/slide42.xml><?xml version="1.0" encoding="utf-8"?>
+<p:sld xmlns:a="http://schemas.openxmlformats.org/drawingml/2006/main" xmlns:r="http://schemas.openxmlformats.org/officeDocument/2006/relationships" xmlns:p="http://schemas.openxmlformats.org/presentationml/2006/main">
+  <p:cSld>
+    <p:spTree>
+      <p:nvGrpSpPr>
+        <p:cNvPr id="1" name=""/>
+        <p:cNvGrpSpPr/>
+        <p:nvPr/>
+      </p:nvGrpSpPr>
+      <p:grpSpPr>
+        <a:xfrm>
+          <a:off x="0" y="0"/>
+          <a:ext cx="0" cy="0"/>
+          <a:chOff x="0" y="0"/>
+          <a:chExt cx="0" cy="0"/>
+        </a:xfrm>
+      </p:grpSpPr>
+      <p:pic>
+        <p:nvPicPr>
+          <p:cNvPr id="1027" name="Picture 3"/>
+          <p:cNvPicPr>
+            <a:picLocks noChangeAspect="1" noChangeArrowheads="1"/>
+          </p:cNvPicPr>
+          <p:nvPr/>
+        </p:nvPicPr>
+        <p:blipFill>
+          <a:blip r:embed="rId2" cstate="print"/>
+          <a:srcRect/>
+          <a:stretch>
+            <a:fillRect/>
+          </a:stretch>
+        </p:blipFill>
+        <p:spPr bwMode="auto">
+          <a:xfrm>
+            <a:off x="457200" y="304800"/>
+            <a:ext cx="5112774" cy="6400800"/>
+          </a:xfrm>
+          <a:prstGeom prst="rect">
+            <a:avLst/>
+          </a:prstGeom>
+          <a:noFill/>
+          <a:ln w="9525">
+            <a:noFill/>
+            <a:miter lim="800000"/>
+            <a:headEnd/>
+            <a:tailEnd/>
+          </a:ln>
+        </p:spPr>
+      </p:pic>
+      <p:cxnSp>
+        <p:nvCxnSpPr>
+          <p:cNvPr id="5" name="Straight Arrow Connector 4"/>
+          <p:cNvCxnSpPr/>
+          <p:nvPr/>
+        </p:nvCxnSpPr>
+        <p:spPr>
+          <a:xfrm rot="10800000">
+            <a:off x="3886200" y="2132011"/>
+            <a:ext cx="838200" cy="1588"/>
+          </a:xfrm>
+          <a:prstGeom prst="straightConnector1">
+            <a:avLst/>
+          </a:prstGeom>
+          <a:ln>
+            <a:tailEnd type="arrow"/>
+          </a:ln>
+        </p:spPr>
+        <p:style>
+          <a:lnRef idx="1">
+            <a:schemeClr val="accent1"/>
+          </a:lnRef>
+          <a:fillRef idx="0">
+            <a:schemeClr val="accent1"/>
+          </a:fillRef>
+          <a:effectRef idx="0">
+            <a:schemeClr val="accent1"/>
+          </a:effectRef>
+          <a:fontRef idx="minor">
+            <a:schemeClr val="tx1"/>
+          </a:fontRef>
+        </p:style>
+      </p:cxnSp>
+      <p:sp>
+        <p:nvSpPr>
+          <p:cNvPr id="6" name="TextBox 5"/>
+          <p:cNvSpPr txBox="1"/>
+          <p:nvPr/>
+        </p:nvSpPr>
+        <p:spPr>
+          <a:xfrm>
+            <a:off x="5410200" y="533400"/>
+            <a:ext cx="2791598" cy="369332"/>
+          </a:xfrm>
+          <a:prstGeom prst="rect">
+            <a:avLst/>
+          </a:prstGeom>
+          <a:noFill/>
+        </p:spPr>
+        <p:txBody>
+          <a:bodyPr wrap="none" rtlCol="0">
+            <a:spAutoFit/>
+          </a:bodyPr>
+          <a:lstStyle/>
+          <a:p>
+            <a:r>
+              <a:rPr lang="en-US" dirty="0"/>
+              <a:t>Our cancellation now works</a:t>
+            </a:r>
+          </a:p>
+        </p:txBody>
+      </p:sp>
+      <p:pic>
+        <p:nvPicPr>
+          <p:cNvPr id="1028" name="Picture 4"/>
+          <p:cNvPicPr>
+            <a:picLocks noChangeAspect="1" noChangeArrowheads="1"/>
+          </p:cNvPicPr>
+          <p:nvPr/>
+        </p:nvPicPr>
+        <p:blipFill>
+          <a:blip r:embed="rId3" cstate="print"/>
+          <a:srcRect/>
+          <a:stretch>
+            <a:fillRect/>
+          </a:stretch>
+        </p:blipFill>
+        <p:spPr bwMode="auto">
+          <a:xfrm>
+            <a:off x="3810000" y="4419600"/>
+            <a:ext cx="5124450" cy="1480594"/>
+          </a:xfrm>
+          <a:prstGeom prst="rect">
+            <a:avLst/>
+          </a:prstGeom>
+          <a:noFill/>
+          <a:ln w="9525">
+            <a:noFill/>
+            <a:miter lim="800000"/>
+            <a:headEnd/>
+            <a:tailEnd/>
+          </a:ln>
+        </p:spPr>
+      </p:pic>
+      <p:sp>
+        <p:nvSpPr>
+          <p:cNvPr id="8" name="TextBox 7"/>
+          <p:cNvSpPr txBox="1"/>
+          <p:nvPr/>
+        </p:nvSpPr>
+        <p:spPr>
+          <a:xfrm>
+            <a:off x="4114800" y="5943600"/>
+            <a:ext cx="4800600" cy="646331"/>
+          </a:xfrm>
+          <a:prstGeom prst="rect">
+            <a:avLst/>
+          </a:prstGeom>
+          <a:noFill/>
+        </p:spPr>
+        <p:txBody>
+          <a:bodyPr wrap="square" rtlCol="0">
+            <a:spAutoFit/>
+          </a:bodyPr>
+          <a:lstStyle/>
+          <a:p>
+            <a:r>
+              <a:rPr lang="en-US" dirty="0"/>
+              <a:t>The thread is successfully cancelled.  “end work” is not reached</a:t>
+            </a:r>
+          </a:p>
+        </p:txBody>
+      </p:sp>
+    </p:spTree>
+  </p:cSld>
+  <p:clrMapOvr>
+    <a:masterClrMapping/>
+  </p:clrMapOvr>
+</p:sld>
+</file>
+
+<file path=ppt/slides/slide43.xml><?xml version="1.0" encoding="utf-8"?>
+<p:sld xmlns:a="http://schemas.openxmlformats.org/drawingml/2006/main" xmlns:r="http://schemas.openxmlformats.org/officeDocument/2006/relationships" xmlns:p="http://schemas.openxmlformats.org/presentationml/2006/main">
+  <p:cSld>
+    <p:spTree>
+      <p:nvGrpSpPr>
+        <p:cNvPr id="1" name=""/>
+        <p:cNvGrpSpPr/>
+        <p:nvPr/>
+      </p:nvGrpSpPr>
+      <p:grpSpPr>
+        <a:xfrm>
+          <a:off x="0" y="0"/>
+          <a:ext cx="0" cy="0"/>
+          <a:chOff x="0" y="0"/>
+          <a:chExt cx="0" cy="0"/>
+        </a:xfrm>
+      </p:grpSpPr>
+      <p:pic>
+        <p:nvPicPr>
+          <p:cNvPr id="3074" name="Picture 2"/>
+          <p:cNvPicPr>
+            <a:picLocks noChangeAspect="1" noChangeArrowheads="1"/>
+          </p:cNvPicPr>
+          <p:nvPr/>
+        </p:nvPicPr>
+        <p:blipFill>
+          <a:blip r:embed="rId2" cstate="print"/>
+          <a:srcRect/>
+          <a:stretch>
+            <a:fillRect/>
+          </a:stretch>
+        </p:blipFill>
+        <p:spPr bwMode="auto">
+          <a:xfrm>
+            <a:off x="228600" y="0"/>
+            <a:ext cx="4791075" cy="4000500"/>
+          </a:xfrm>
+          <a:prstGeom prst="rect">
+            <a:avLst/>
+          </a:prstGeom>
+          <a:noFill/>
+          <a:ln w="9525">
+            <a:noFill/>
+            <a:miter lim="800000"/>
+            <a:headEnd/>
+            <a:tailEnd/>
+          </a:ln>
+        </p:spPr>
+      </p:pic>
+      <p:pic>
+        <p:nvPicPr>
+          <p:cNvPr id="3075" name="Picture 3"/>
+          <p:cNvPicPr>
+            <a:picLocks noChangeAspect="1" noChangeArrowheads="1"/>
+          </p:cNvPicPr>
+          <p:nvPr/>
+        </p:nvPicPr>
+        <p:blipFill>
+          <a:blip r:embed="rId3" cstate="print"/>
+          <a:srcRect/>
+          <a:stretch>
+            <a:fillRect/>
+          </a:stretch>
+        </p:blipFill>
+        <p:spPr bwMode="auto">
+          <a:xfrm>
+            <a:off x="457200" y="4191000"/>
+            <a:ext cx="3947448" cy="2438400"/>
+          </a:xfrm>
+          <a:prstGeom prst="rect">
+            <a:avLst/>
+          </a:prstGeom>
+          <a:noFill/>
+          <a:ln w="9525">
+            <a:noFill/>
+            <a:miter lim="800000"/>
+            <a:headEnd/>
+            <a:tailEnd/>
+          </a:ln>
+        </p:spPr>
+      </p:pic>
+      <p:sp>
+        <p:nvSpPr>
+          <p:cNvPr id="7" name="TextBox 6"/>
+          <p:cNvSpPr txBox="1"/>
+          <p:nvPr/>
+        </p:nvSpPr>
+        <p:spPr>
+          <a:xfrm>
+            <a:off x="4800600" y="762000"/>
+            <a:ext cx="3834961" cy="646331"/>
+          </a:xfrm>
+          <a:prstGeom prst="rect">
+            <a:avLst/>
+          </a:prstGeom>
+          <a:noFill/>
+        </p:spPr>
+        <p:txBody>
+          <a:bodyPr wrap="none" rtlCol="0">
+            <a:spAutoFit/>
+          </a:bodyPr>
+          <a:lstStyle/>
+          <a:p>
+            <a:r>
+              <a:rPr lang="en-US" dirty="0"/>
+              <a:t>If we throw a normal</a:t>
+            </a:r>
+          </a:p>
+          <a:p>
+            <a:r>
+              <a:rPr lang="en-US" dirty="0"/>
+              <a:t>Exception (not </a:t>
+            </a:r>
+            <a:r>
+              <a:rPr lang="en-US" dirty="0" err="1"/>
+              <a:t>InterruptedException</a:t>
+            </a:r>
+            <a:r>
+              <a:rPr lang="en-US" dirty="0"/>
+              <a:t>)…</a:t>
+            </a:r>
+          </a:p>
+        </p:txBody>
+      </p:sp>
+      <p:cxnSp>
+        <p:nvCxnSpPr>
+          <p:cNvPr id="9" name="Straight Arrow Connector 8"/>
+          <p:cNvCxnSpPr/>
+          <p:nvPr/>
+        </p:nvCxnSpPr>
+        <p:spPr>
+          <a:xfrm rot="10800000">
+            <a:off x="2971800" y="6400800"/>
+            <a:ext cx="609600" cy="1588"/>
+          </a:xfrm>
+          <a:prstGeom prst="straightConnector1">
+            <a:avLst/>
+          </a:prstGeom>
+          <a:ln>
+            <a:tailEnd type="arrow"/>
+          </a:ln>
+        </p:spPr>
+        <p:style>
+          <a:lnRef idx="1">
+            <a:schemeClr val="accent1"/>
+          </a:lnRef>
+          <a:fillRef idx="0">
+            <a:schemeClr val="accent1"/>
+          </a:fillRef>
+          <a:effectRef idx="0">
+            <a:schemeClr val="accent1"/>
+          </a:effectRef>
+          <a:fontRef idx="minor">
+            <a:schemeClr val="tx1"/>
+          </a:fontRef>
+        </p:style>
+      </p:cxnSp>
+      <p:sp>
+        <p:nvSpPr>
           <p:cNvPr id="10" name="TextBox 9"/>
           <p:cNvSpPr txBox="1"/>
           <p:nvPr/>
@@ -9056,7 +9340,7 @@
 </p:sld>
 </file>
 
-<file path=ppt/slides/slide42.xml><?xml version="1.0" encoding="utf-8"?>
+<file path=ppt/slides/slide44.xml><?xml version="1.0" encoding="utf-8"?>
 <p:sld xmlns:a="http://schemas.openxmlformats.org/drawingml/2006/main" xmlns:r="http://schemas.openxmlformats.org/officeDocument/2006/relationships" xmlns:p="http://schemas.openxmlformats.org/presentationml/2006/main">
   <p:cSld>
     <p:spTree>

</xml_diff>

<commit_message>
lectures 17 - 19 plus HTML
</commit_message>
<xml_diff>
--- a/classes/prog2017/Prog3-Lecture17.pptx
+++ b/classes/prog2017/Prog3-Lecture17.pptx
@@ -5,7 +5,7 @@
     <p:sldMasterId id="2147483648" r:id="rId1"/>
   </p:sldMasterIdLst>
   <p:notesMasterIdLst>
-    <p:notesMasterId r:id="rId46"/>
+    <p:notesMasterId r:id="rId48"/>
   </p:notesMasterIdLst>
   <p:sldIdLst>
     <p:sldId id="339" r:id="rId2"/>
@@ -43,15 +43,17 @@
     <p:sldId id="275" r:id="rId34"/>
     <p:sldId id="311" r:id="rId35"/>
     <p:sldId id="312" r:id="rId36"/>
-    <p:sldId id="321" r:id="rId37"/>
-    <p:sldId id="313" r:id="rId38"/>
-    <p:sldId id="314" r:id="rId39"/>
-    <p:sldId id="315" r:id="rId40"/>
-    <p:sldId id="320" r:id="rId41"/>
-    <p:sldId id="318" r:id="rId42"/>
-    <p:sldId id="316" r:id="rId43"/>
-    <p:sldId id="319" r:id="rId44"/>
-    <p:sldId id="332" r:id="rId45"/>
+    <p:sldId id="342" r:id="rId37"/>
+    <p:sldId id="343" r:id="rId38"/>
+    <p:sldId id="321" r:id="rId39"/>
+    <p:sldId id="313" r:id="rId40"/>
+    <p:sldId id="314" r:id="rId41"/>
+    <p:sldId id="315" r:id="rId42"/>
+    <p:sldId id="320" r:id="rId43"/>
+    <p:sldId id="318" r:id="rId44"/>
+    <p:sldId id="316" r:id="rId45"/>
+    <p:sldId id="319" r:id="rId46"/>
+    <p:sldId id="332" r:id="rId47"/>
   </p:sldIdLst>
   <p:sldSz cx="9144000" cy="6858000" type="screen4x3"/>
   <p:notesSz cx="6858000" cy="9144000"/>
@@ -256,7 +258,7 @@
             <a:fld id="{D58794C4-1EC2-4677-9397-D08FD83000DB}" type="datetimeFigureOut">
               <a:rPr lang="en-US" smtClean="0"/>
               <a:pPr/>
-              <a:t>10/28/2017</a:t>
+              <a:t>10/29/2017</a:t>
             </a:fld>
             <a:endParaRPr lang="en-US"/>
           </a:p>
@@ -1054,7 +1056,7 @@
             <a:fld id="{1D8BD707-D9CF-40AE-B4C6-C98DA3205C09}" type="datetimeFigureOut">
               <a:rPr lang="en-US" smtClean="0"/>
               <a:pPr/>
-              <a:t>10/28/2017</a:t>
+              <a:t>10/29/2017</a:t>
             </a:fld>
             <a:endParaRPr lang="en-US"/>
           </a:p>
@@ -1219,7 +1221,7 @@
             <a:fld id="{1D8BD707-D9CF-40AE-B4C6-C98DA3205C09}" type="datetimeFigureOut">
               <a:rPr lang="en-US" smtClean="0"/>
               <a:pPr/>
-              <a:t>10/28/2017</a:t>
+              <a:t>10/29/2017</a:t>
             </a:fld>
             <a:endParaRPr lang="en-US"/>
           </a:p>
@@ -1394,7 +1396,7 @@
             <a:fld id="{1D8BD707-D9CF-40AE-B4C6-C98DA3205C09}" type="datetimeFigureOut">
               <a:rPr lang="en-US" smtClean="0"/>
               <a:pPr/>
-              <a:t>10/28/2017</a:t>
+              <a:t>10/29/2017</a:t>
             </a:fld>
             <a:endParaRPr lang="en-US"/>
           </a:p>
@@ -1559,7 +1561,7 @@
             <a:fld id="{1D8BD707-D9CF-40AE-B4C6-C98DA3205C09}" type="datetimeFigureOut">
               <a:rPr lang="en-US" smtClean="0"/>
               <a:pPr/>
-              <a:t>10/28/2017</a:t>
+              <a:t>10/29/2017</a:t>
             </a:fld>
             <a:endParaRPr lang="en-US"/>
           </a:p>
@@ -1801,7 +1803,7 @@
             <a:fld id="{1D8BD707-D9CF-40AE-B4C6-C98DA3205C09}" type="datetimeFigureOut">
               <a:rPr lang="en-US" smtClean="0"/>
               <a:pPr/>
-              <a:t>10/28/2017</a:t>
+              <a:t>10/29/2017</a:t>
             </a:fld>
             <a:endParaRPr lang="en-US"/>
           </a:p>
@@ -2083,7 +2085,7 @@
             <a:fld id="{1D8BD707-D9CF-40AE-B4C6-C98DA3205C09}" type="datetimeFigureOut">
               <a:rPr lang="en-US" smtClean="0"/>
               <a:pPr/>
-              <a:t>10/28/2017</a:t>
+              <a:t>10/29/2017</a:t>
             </a:fld>
             <a:endParaRPr lang="en-US"/>
           </a:p>
@@ -2499,7 +2501,7 @@
             <a:fld id="{1D8BD707-D9CF-40AE-B4C6-C98DA3205C09}" type="datetimeFigureOut">
               <a:rPr lang="en-US" smtClean="0"/>
               <a:pPr/>
-              <a:t>10/28/2017</a:t>
+              <a:t>10/29/2017</a:t>
             </a:fld>
             <a:endParaRPr lang="en-US"/>
           </a:p>
@@ -2613,7 +2615,7 @@
             <a:fld id="{1D8BD707-D9CF-40AE-B4C6-C98DA3205C09}" type="datetimeFigureOut">
               <a:rPr lang="en-US" smtClean="0"/>
               <a:pPr/>
-              <a:t>10/28/2017</a:t>
+              <a:t>10/29/2017</a:t>
             </a:fld>
             <a:endParaRPr lang="en-US"/>
           </a:p>
@@ -2705,7 +2707,7 @@
             <a:fld id="{1D8BD707-D9CF-40AE-B4C6-C98DA3205C09}" type="datetimeFigureOut">
               <a:rPr lang="en-US" smtClean="0"/>
               <a:pPr/>
-              <a:t>10/28/2017</a:t>
+              <a:t>10/29/2017</a:t>
             </a:fld>
             <a:endParaRPr lang="en-US"/>
           </a:p>
@@ -2977,7 +2979,7 @@
             <a:fld id="{1D8BD707-D9CF-40AE-B4C6-C98DA3205C09}" type="datetimeFigureOut">
               <a:rPr lang="en-US" smtClean="0"/>
               <a:pPr/>
-              <a:t>10/28/2017</a:t>
+              <a:t>10/29/2017</a:t>
             </a:fld>
             <a:endParaRPr lang="en-US"/>
           </a:p>
@@ -3226,7 +3228,7 @@
             <a:fld id="{1D8BD707-D9CF-40AE-B4C6-C98DA3205C09}" type="datetimeFigureOut">
               <a:rPr lang="en-US" smtClean="0"/>
               <a:pPr/>
-              <a:t>10/28/2017</a:t>
+              <a:t>10/29/2017</a:t>
             </a:fld>
             <a:endParaRPr lang="en-US"/>
           </a:p>
@@ -3434,7 +3436,7 @@
             <a:fld id="{1D8BD707-D9CF-40AE-B4C6-C98DA3205C09}" type="datetimeFigureOut">
               <a:rPr lang="en-US" smtClean="0"/>
               <a:pPr/>
-              <a:t>10/28/2017</a:t>
+              <a:t>10/29/2017</a:t>
             </a:fld>
             <a:endParaRPr lang="en-US"/>
           </a:p>
@@ -5816,6 +5818,40 @@
           </a:prstGeom>
         </p:spPr>
       </p:pic>
+      <p:sp>
+        <p:nvSpPr>
+          <p:cNvPr id="2" name="Rectangle 1">
+            <a:extLst>
+              <a:ext uri="{FF2B5EF4-FFF2-40B4-BE49-F238E27FC236}">
+                <a16:creationId xmlns:a16="http://schemas.microsoft.com/office/drawing/2014/main" id="{B3F020B8-B45F-4A98-8093-E4042E3D046F}"/>
+              </a:ext>
+            </a:extLst>
+          </p:cNvPr>
+          <p:cNvSpPr/>
+          <p:nvPr/>
+        </p:nvSpPr>
+        <p:spPr>
+          <a:xfrm>
+            <a:off x="533400" y="6520190"/>
+            <a:ext cx="9296400" cy="261610"/>
+          </a:xfrm>
+          <a:prstGeom prst="rect">
+            <a:avLst/>
+          </a:prstGeom>
+        </p:spPr>
+        <p:txBody>
+          <a:bodyPr wrap="square">
+            <a:spAutoFit/>
+          </a:bodyPr>
+          <a:lstStyle/>
+          <a:p>
+            <a:r>
+              <a:rPr lang="en-US" sz="1100" dirty="0"/>
+              <a:t>https://github.com/afodor/metagenomicsTools/blob/master/src/classExamples/semaphoreAndBlockingQueues/GatherAllGCBlockingQueue.java</a:t>
+            </a:r>
+          </a:p>
+        </p:txBody>
+      </p:sp>
     </p:spTree>
     <p:extLst>
       <p:ext uri="{BB962C8B-B14F-4D97-AF65-F5344CB8AC3E}">
@@ -6378,7 +6414,7 @@
         </p:blipFill>
         <p:spPr>
           <a:xfrm>
-            <a:off x="238544" y="685800"/>
+            <a:off x="238544" y="533400"/>
             <a:ext cx="5934075" cy="6076950"/>
           </a:xfrm>
           <a:prstGeom prst="rect">
@@ -6402,7 +6438,7 @@
         </p:blipFill>
         <p:spPr>
           <a:xfrm>
-            <a:off x="5486400" y="4495800"/>
+            <a:off x="5486400" y="4267200"/>
             <a:ext cx="2590800" cy="1209675"/>
           </a:xfrm>
           <a:prstGeom prst="rect">
@@ -6511,7 +6547,7 @@
         </p:blipFill>
         <p:spPr>
           <a:xfrm>
-            <a:off x="0" y="1026593"/>
+            <a:off x="0" y="1066800"/>
             <a:ext cx="9144000" cy="5069407"/>
           </a:xfrm>
           <a:prstGeom prst="rect">
@@ -6558,6 +6594,40 @@
             <a:r>
               <a:rPr lang="en-US" dirty="0"/>
               <a:t> in the constructor</a:t>
+            </a:r>
+          </a:p>
+        </p:txBody>
+      </p:sp>
+      <p:sp>
+        <p:nvSpPr>
+          <p:cNvPr id="5" name="Rectangle 4">
+            <a:extLst>
+              <a:ext uri="{FF2B5EF4-FFF2-40B4-BE49-F238E27FC236}">
+                <a16:creationId xmlns:a16="http://schemas.microsoft.com/office/drawing/2014/main" id="{412EB4A1-52F0-4FFA-AC22-763881E561EC}"/>
+              </a:ext>
+            </a:extLst>
+          </p:cNvPr>
+          <p:cNvSpPr/>
+          <p:nvPr/>
+        </p:nvSpPr>
+        <p:spPr>
+          <a:xfrm>
+            <a:off x="609600" y="6553200"/>
+            <a:ext cx="9296400" cy="261610"/>
+          </a:xfrm>
+          <a:prstGeom prst="rect">
+            <a:avLst/>
+          </a:prstGeom>
+        </p:spPr>
+        <p:txBody>
+          <a:bodyPr wrap="square">
+            <a:spAutoFit/>
+          </a:bodyPr>
+          <a:lstStyle/>
+          <a:p>
+            <a:r>
+              <a:rPr lang="en-US" sz="1100" dirty="0"/>
+              <a:t>https://github.com/afodor/metagenomicsTools/blob/master/src/classExamples/semaphoreAndBlockingQueues/GatherAllCSSCountdownLatch.java</a:t>
             </a:r>
           </a:p>
         </p:txBody>
@@ -6692,6 +6762,80 @@
           </a:prstGeom>
         </p:spPr>
       </p:pic>
+      <p:sp>
+        <p:nvSpPr>
+          <p:cNvPr id="2" name="TextBox 1">
+            <a:extLst>
+              <a:ext uri="{FF2B5EF4-FFF2-40B4-BE49-F238E27FC236}">
+                <a16:creationId xmlns:a16="http://schemas.microsoft.com/office/drawing/2014/main" id="{8832098D-75F4-4434-9A21-CB570D46E323}"/>
+              </a:ext>
+            </a:extLst>
+          </p:cNvPr>
+          <p:cNvSpPr txBox="1"/>
+          <p:nvPr/>
+        </p:nvSpPr>
+        <p:spPr>
+          <a:xfrm>
+            <a:off x="1524000" y="6248400"/>
+            <a:ext cx="2738378" cy="369332"/>
+          </a:xfrm>
+          <a:prstGeom prst="rect">
+            <a:avLst/>
+          </a:prstGeom>
+          <a:noFill/>
+        </p:spPr>
+        <p:txBody>
+          <a:bodyPr wrap="none" rtlCol="0">
+            <a:spAutoFit/>
+          </a:bodyPr>
+          <a:lstStyle/>
+          <a:p>
+            <a:r>
+              <a:rPr lang="en-US" dirty="0"/>
+              <a:t>This works surprisingly well</a:t>
+            </a:r>
+          </a:p>
+        </p:txBody>
+      </p:sp>
+      <p:cxnSp>
+        <p:nvCxnSpPr>
+          <p:cNvPr id="7" name="Straight Arrow Connector 6">
+            <a:extLst>
+              <a:ext uri="{FF2B5EF4-FFF2-40B4-BE49-F238E27FC236}">
+                <a16:creationId xmlns:a16="http://schemas.microsoft.com/office/drawing/2014/main" id="{2F491AFC-710E-4A9A-98B4-B2DA006DB71A}"/>
+              </a:ext>
+            </a:extLst>
+          </p:cNvPr>
+          <p:cNvCxnSpPr/>
+          <p:nvPr/>
+        </p:nvCxnSpPr>
+        <p:spPr>
+          <a:xfrm>
+            <a:off x="4495800" y="6400800"/>
+            <a:ext cx="914400" cy="0"/>
+          </a:xfrm>
+          <a:prstGeom prst="straightConnector1">
+            <a:avLst/>
+          </a:prstGeom>
+          <a:ln>
+            <a:tailEnd type="triangle"/>
+          </a:ln>
+        </p:spPr>
+        <p:style>
+          <a:lnRef idx="1">
+            <a:schemeClr val="accent1"/>
+          </a:lnRef>
+          <a:fillRef idx="0">
+            <a:schemeClr val="accent1"/>
+          </a:fillRef>
+          <a:effectRef idx="0">
+            <a:schemeClr val="accent1"/>
+          </a:effectRef>
+          <a:fontRef idx="minor">
+            <a:schemeClr val="tx1"/>
+          </a:fontRef>
+        </p:style>
+      </p:cxnSp>
     </p:spTree>
     <p:extLst>
       <p:ext uri="{BB962C8B-B14F-4D97-AF65-F5344CB8AC3E}">
@@ -6864,7 +7008,7 @@
         </p:blipFill>
         <p:spPr>
           <a:xfrm>
-            <a:off x="3429000" y="5734478"/>
+            <a:off x="3429000" y="5486400"/>
             <a:ext cx="4629150" cy="990600"/>
           </a:xfrm>
           <a:prstGeom prst="rect">
@@ -6872,6 +7016,40 @@
           </a:prstGeom>
         </p:spPr>
       </p:pic>
+      <p:sp>
+        <p:nvSpPr>
+          <p:cNvPr id="2" name="Rectangle 1">
+            <a:extLst>
+              <a:ext uri="{FF2B5EF4-FFF2-40B4-BE49-F238E27FC236}">
+                <a16:creationId xmlns:a16="http://schemas.microsoft.com/office/drawing/2014/main" id="{BD313CCC-03F9-47FE-99A9-6CC1E6EE01C1}"/>
+              </a:ext>
+            </a:extLst>
+          </p:cNvPr>
+          <p:cNvSpPr/>
+          <p:nvPr/>
+        </p:nvSpPr>
+        <p:spPr>
+          <a:xfrm>
+            <a:off x="76200" y="6553200"/>
+            <a:ext cx="11353800" cy="276999"/>
+          </a:xfrm>
+          <a:prstGeom prst="rect">
+            <a:avLst/>
+          </a:prstGeom>
+        </p:spPr>
+        <p:txBody>
+          <a:bodyPr wrap="square">
+            <a:spAutoFit/>
+          </a:bodyPr>
+          <a:lstStyle/>
+          <a:p>
+            <a:r>
+              <a:rPr lang="en-US" sz="1200" dirty="0"/>
+              <a:t>https://github.com/afodor/metagenomicsTools/blob/master/src/classExamples/semaphoreAndBlockingQueues/GatherAllGCSingleThread.java</a:t>
+            </a:r>
+          </a:p>
+        </p:txBody>
+      </p:sp>
     </p:spTree>
     <p:extLst>
       <p:ext uri="{BB962C8B-B14F-4D97-AF65-F5344CB8AC3E}">
@@ -7702,14 +7880,20 @@
       </p:grpSpPr>
       <p:sp>
         <p:nvSpPr>
-          <p:cNvPr id="6" name="TextBox 5"/>
+          <p:cNvPr id="2" name="TextBox 1">
+            <a:extLst>
+              <a:ext uri="{FF2B5EF4-FFF2-40B4-BE49-F238E27FC236}">
+                <a16:creationId xmlns:a16="http://schemas.microsoft.com/office/drawing/2014/main" id="{BAE4B862-F0AC-4B5B-9B07-91A54ADEEF89}"/>
+              </a:ext>
+            </a:extLst>
+          </p:cNvPr>
           <p:cNvSpPr txBox="1"/>
           <p:nvPr/>
         </p:nvSpPr>
         <p:spPr>
           <a:xfrm>
-            <a:off x="609600" y="457200"/>
-            <a:ext cx="3889655" cy="2308324"/>
+            <a:off x="76200" y="39469"/>
+            <a:ext cx="8881599" cy="646331"/>
           </a:xfrm>
           <a:prstGeom prst="rect">
             <a:avLst/>
@@ -7723,86 +7907,139 @@
           <a:lstStyle/>
           <a:p>
             <a:r>
-              <a:rPr lang="en-US" dirty="0" err="1"/>
-              <a:t>BlockingQueues</a:t>
-            </a:r>
-            <a:endParaRPr lang="en-US" dirty="0"/>
-          </a:p>
-          <a:p>
-            <a:r>
               <a:rPr lang="en-US" dirty="0"/>
-              <a:t>A Peak calling example with semaphore</a:t>
-            </a:r>
-          </a:p>
-          <a:p>
-            <a:r>
-              <a:rPr lang="en-US" dirty="0" err="1"/>
-              <a:t>CountDownLatch</a:t>
-            </a:r>
-            <a:endParaRPr lang="en-US" dirty="0"/>
-          </a:p>
-          <a:p>
-            <a:r>
-              <a:rPr lang="en-US" dirty="0"/>
-              <a:t>Callable, Future, </a:t>
+              <a:t>We can combine semaphore and </a:t>
             </a:r>
             <a:r>
               <a:rPr lang="en-US" dirty="0" err="1"/>
               <a:t>FutureTask</a:t>
             </a:r>
-            <a:endParaRPr lang="en-US" dirty="0"/>
-          </a:p>
-          <a:p>
             <a:r>
               <a:rPr lang="en-US" dirty="0"/>
-              <a:t>Cancellation</a:t>
-            </a:r>
-          </a:p>
-          <a:p>
-            <a:endParaRPr lang="en-US" dirty="0"/>
-          </a:p>
-          <a:p>
-            <a:endParaRPr lang="en-US" dirty="0"/>
-          </a:p>
-          <a:p>
-            <a:endParaRPr lang="en-US" dirty="0"/>
-          </a:p>
-        </p:txBody>
-      </p:sp>
-      <p:cxnSp>
-        <p:nvCxnSpPr>
-          <p:cNvPr id="7" name="Straight Arrow Connector 6"/>
-          <p:cNvCxnSpPr/>
-          <p:nvPr/>
-        </p:nvCxnSpPr>
-        <p:spPr>
-          <a:xfrm rot="10800000">
-            <a:off x="1905000" y="1751011"/>
-            <a:ext cx="533400" cy="1588"/>
-          </a:xfrm>
-          <a:prstGeom prst="straightConnector1">
-            <a:avLst/>
-          </a:prstGeom>
-          <a:ln>
-            <a:tailEnd type="arrow"/>
-          </a:ln>
-        </p:spPr>
-        <p:style>
-          <a:lnRef idx="1">
-            <a:schemeClr val="accent1"/>
-          </a:lnRef>
-          <a:fillRef idx="0">
-            <a:schemeClr val="accent1"/>
-          </a:fillRef>
-          <a:effectRef idx="0">
-            <a:schemeClr val="accent1"/>
-          </a:effectRef>
-          <a:fontRef idx="minor">
-            <a:schemeClr val="tx1"/>
-          </a:fontRef>
-        </p:style>
-      </p:cxnSp>
+              <a:t> to reduce the number of locks we need to make</a:t>
+            </a:r>
+          </a:p>
+          <a:p>
+            <a:r>
+              <a:rPr lang="en-US" dirty="0"/>
+              <a:t>on the synchronized list</a:t>
+            </a:r>
+          </a:p>
+        </p:txBody>
+      </p:sp>
+      <p:pic>
+        <p:nvPicPr>
+          <p:cNvPr id="3" name="Picture 2">
+            <a:extLst>
+              <a:ext uri="{FF2B5EF4-FFF2-40B4-BE49-F238E27FC236}">
+                <a16:creationId xmlns:a16="http://schemas.microsoft.com/office/drawing/2014/main" id="{9EEFF2ED-61EB-42CB-AE52-068D984C2AA4}"/>
+              </a:ext>
+            </a:extLst>
+          </p:cNvPr>
+          <p:cNvPicPr>
+            <a:picLocks noChangeAspect="1"/>
+          </p:cNvPicPr>
+          <p:nvPr/>
+        </p:nvPicPr>
+        <p:blipFill>
+          <a:blip r:embed="rId2"/>
+          <a:stretch>
+            <a:fillRect/>
+          </a:stretch>
+        </p:blipFill>
+        <p:spPr>
+          <a:xfrm>
+            <a:off x="76200" y="1511895"/>
+            <a:ext cx="8763000" cy="4126905"/>
+          </a:xfrm>
+          <a:prstGeom prst="rect">
+            <a:avLst/>
+          </a:prstGeom>
+        </p:spPr>
+      </p:pic>
+      <p:sp>
+        <p:nvSpPr>
+          <p:cNvPr id="4" name="TextBox 3">
+            <a:extLst>
+              <a:ext uri="{FF2B5EF4-FFF2-40B4-BE49-F238E27FC236}">
+                <a16:creationId xmlns:a16="http://schemas.microsoft.com/office/drawing/2014/main" id="{A17DC798-59E1-4A7F-BC40-4BB11181667D}"/>
+              </a:ext>
+            </a:extLst>
+          </p:cNvPr>
+          <p:cNvSpPr txBox="1"/>
+          <p:nvPr/>
+        </p:nvSpPr>
+        <p:spPr>
+          <a:xfrm>
+            <a:off x="609600" y="838200"/>
+            <a:ext cx="5867400" cy="646331"/>
+          </a:xfrm>
+          <a:prstGeom prst="rect">
+            <a:avLst/>
+          </a:prstGeom>
+          <a:noFill/>
+        </p:spPr>
+        <p:txBody>
+          <a:bodyPr wrap="square" rtlCol="0">
+            <a:spAutoFit/>
+          </a:bodyPr>
+          <a:lstStyle/>
+          <a:p>
+            <a:r>
+              <a:rPr lang="en-US" dirty="0"/>
+              <a:t>Our worker gets replaced with a function that returns a </a:t>
+            </a:r>
+            <a:r>
+              <a:rPr lang="en-US" dirty="0" err="1"/>
+              <a:t>FutureTask</a:t>
+            </a:r>
+            <a:r>
+              <a:rPr lang="en-US" dirty="0"/>
+              <a:t> </a:t>
+            </a:r>
+          </a:p>
+        </p:txBody>
+      </p:sp>
+      <p:sp>
+        <p:nvSpPr>
+          <p:cNvPr id="5" name="Rectangle 4">
+            <a:extLst>
+              <a:ext uri="{FF2B5EF4-FFF2-40B4-BE49-F238E27FC236}">
+                <a16:creationId xmlns:a16="http://schemas.microsoft.com/office/drawing/2014/main" id="{48255D82-CC6B-427C-8B19-B088F7A83828}"/>
+              </a:ext>
+            </a:extLst>
+          </p:cNvPr>
+          <p:cNvSpPr/>
+          <p:nvPr/>
+        </p:nvSpPr>
+        <p:spPr>
+          <a:xfrm>
+            <a:off x="304800" y="6248400"/>
+            <a:ext cx="9296400" cy="261610"/>
+          </a:xfrm>
+          <a:prstGeom prst="rect">
+            <a:avLst/>
+          </a:prstGeom>
+        </p:spPr>
+        <p:txBody>
+          <a:bodyPr wrap="square">
+            <a:spAutoFit/>
+          </a:bodyPr>
+          <a:lstStyle/>
+          <a:p>
+            <a:r>
+              <a:rPr lang="en-US" sz="1100" dirty="0"/>
+              <a:t>https://github.com/afodor/metagenomicsTools/blob/master/src/classExamples/semaphoreAndBlockingQueues/GatherAllCSSSemaphoreAndFutureTask.java</a:t>
+            </a:r>
+          </a:p>
+        </p:txBody>
+      </p:sp>
     </p:spTree>
+    <p:extLst>
+      <p:ext uri="{BB962C8B-B14F-4D97-AF65-F5344CB8AC3E}">
+        <p14:creationId xmlns:p14="http://schemas.microsoft.com/office/powerpoint/2010/main" val="3372350020"/>
+      </p:ext>
+    </p:extLst>
   </p:cSld>
   <p:clrMapOvr>
     <a:masterClrMapping/>
@@ -7829,46 +8066,50 @@
       </p:grpSpPr>
       <p:pic>
         <p:nvPicPr>
-          <p:cNvPr id="3074" name="Picture 2"/>
+          <p:cNvPr id="4" name="Picture 3">
+            <a:extLst>
+              <a:ext uri="{FF2B5EF4-FFF2-40B4-BE49-F238E27FC236}">
+                <a16:creationId xmlns:a16="http://schemas.microsoft.com/office/drawing/2014/main" id="{649D0A10-413B-49C7-9783-3C514BC6C929}"/>
+              </a:ext>
+            </a:extLst>
+          </p:cNvPr>
           <p:cNvPicPr>
-            <a:picLocks noChangeAspect="1" noChangeArrowheads="1"/>
+            <a:picLocks noChangeAspect="1"/>
           </p:cNvPicPr>
           <p:nvPr/>
         </p:nvPicPr>
         <p:blipFill>
-          <a:blip r:embed="rId2" cstate="print"/>
-          <a:srcRect/>
+          <a:blip r:embed="rId2"/>
           <a:stretch>
             <a:fillRect/>
           </a:stretch>
         </p:blipFill>
-        <p:spPr bwMode="auto">
-          <a:xfrm>
-            <a:off x="276225" y="1914525"/>
-            <a:ext cx="8591550" cy="3028950"/>
-          </a:xfrm>
-          <a:prstGeom prst="rect">
-            <a:avLst/>
-          </a:prstGeom>
-          <a:noFill/>
-          <a:ln w="9525">
-            <a:noFill/>
-            <a:miter lim="800000"/>
-            <a:headEnd/>
-            <a:tailEnd/>
-          </a:ln>
+        <p:spPr>
+          <a:xfrm>
+            <a:off x="0" y="473716"/>
+            <a:ext cx="9144000" cy="4860284"/>
+          </a:xfrm>
+          <a:prstGeom prst="rect">
+            <a:avLst/>
+          </a:prstGeom>
         </p:spPr>
       </p:pic>
       <p:sp>
         <p:nvSpPr>
-          <p:cNvPr id="5" name="TextBox 4"/>
+          <p:cNvPr id="5" name="TextBox 4">
+            <a:extLst>
+              <a:ext uri="{FF2B5EF4-FFF2-40B4-BE49-F238E27FC236}">
+                <a16:creationId xmlns:a16="http://schemas.microsoft.com/office/drawing/2014/main" id="{7811CF5C-B410-41A5-8AB2-0A7A1CA164E1}"/>
+              </a:ext>
+            </a:extLst>
+          </p:cNvPr>
           <p:cNvSpPr txBox="1"/>
           <p:nvPr/>
         </p:nvSpPr>
         <p:spPr>
           <a:xfrm>
-            <a:off x="381000" y="990600"/>
-            <a:ext cx="8172109" cy="646331"/>
+            <a:off x="228600" y="0"/>
+            <a:ext cx="5095113" cy="369332"/>
           </a:xfrm>
           <a:prstGeom prst="rect">
             <a:avLst/>
@@ -7883,18 +8124,108 @@
           <a:p>
             <a:r>
               <a:rPr lang="en-US" dirty="0"/>
-              <a:t>Future also supports cancellation, but this is dependent upon the co-operation of the</a:t>
-            </a:r>
-          </a:p>
-          <a:p>
+              <a:t>Our main method calls these </a:t>
+            </a:r>
+            <a:r>
+              <a:rPr lang="en-US" dirty="0" err="1"/>
+              <a:t>FutureTasks</a:t>
+            </a:r>
             <a:r>
               <a:rPr lang="en-US" dirty="0"/>
-              <a:t>running threads…</a:t>
+              <a:t> 4 at a time</a:t>
+            </a:r>
+          </a:p>
+        </p:txBody>
+      </p:sp>
+      <p:pic>
+        <p:nvPicPr>
+          <p:cNvPr id="6" name="Picture 5">
+            <a:extLst>
+              <a:ext uri="{FF2B5EF4-FFF2-40B4-BE49-F238E27FC236}">
+                <a16:creationId xmlns:a16="http://schemas.microsoft.com/office/drawing/2014/main" id="{343F1D87-AE33-44CF-B63A-CA65FD48E164}"/>
+              </a:ext>
+            </a:extLst>
+          </p:cNvPr>
+          <p:cNvPicPr>
+            <a:picLocks noChangeAspect="1"/>
+          </p:cNvPicPr>
+          <p:nvPr/>
+        </p:nvPicPr>
+        <p:blipFill>
+          <a:blip r:embed="rId3"/>
+          <a:stretch>
+            <a:fillRect/>
+          </a:stretch>
+        </p:blipFill>
+        <p:spPr>
+          <a:xfrm>
+            <a:off x="4948237" y="5562600"/>
+            <a:ext cx="3128963" cy="742893"/>
+          </a:xfrm>
+          <a:prstGeom prst="rect">
+            <a:avLst/>
+          </a:prstGeom>
+        </p:spPr>
+      </p:pic>
+      <p:sp>
+        <p:nvSpPr>
+          <p:cNvPr id="7" name="TextBox 6">
+            <a:extLst>
+              <a:ext uri="{FF2B5EF4-FFF2-40B4-BE49-F238E27FC236}">
+                <a16:creationId xmlns:a16="http://schemas.microsoft.com/office/drawing/2014/main" id="{5B3AE324-0540-4625-A595-2E850CD6E31D}"/>
+              </a:ext>
+            </a:extLst>
+          </p:cNvPr>
+          <p:cNvSpPr txBox="1"/>
+          <p:nvPr/>
+        </p:nvSpPr>
+        <p:spPr>
+          <a:xfrm>
+            <a:off x="152400" y="5562600"/>
+            <a:ext cx="4613122" cy="1200329"/>
+          </a:xfrm>
+          <a:prstGeom prst="rect">
+            <a:avLst/>
+          </a:prstGeom>
+          <a:noFill/>
+        </p:spPr>
+        <p:txBody>
+          <a:bodyPr wrap="none" rtlCol="0">
+            <a:spAutoFit/>
+          </a:bodyPr>
+          <a:lstStyle/>
+          <a:p>
+            <a:r>
+              <a:rPr lang="en-US" dirty="0"/>
+              <a:t>This approach yields comparable performance</a:t>
+            </a:r>
+          </a:p>
+          <a:p>
+            <a:r>
+              <a:rPr lang="en-US" dirty="0"/>
+              <a:t>to our other multi-threaded approaches</a:t>
+            </a:r>
+          </a:p>
+          <a:p>
+            <a:r>
+              <a:rPr lang="en-US" dirty="0"/>
+              <a:t>(maybe just a bit better with not having to grab</a:t>
+            </a:r>
+          </a:p>
+          <a:p>
+            <a:r>
+              <a:rPr lang="en-US" dirty="0"/>
+              <a:t>&gt; 1 million locks)</a:t>
             </a:r>
           </a:p>
         </p:txBody>
       </p:sp>
     </p:spTree>
+    <p:extLst>
+      <p:ext uri="{BB962C8B-B14F-4D97-AF65-F5344CB8AC3E}">
+        <p14:creationId xmlns:p14="http://schemas.microsoft.com/office/powerpoint/2010/main" val="1450719252"/>
+      </p:ext>
+    </p:extLst>
   </p:cSld>
   <p:clrMapOvr>
     <a:masterClrMapping/>
@@ -7919,110 +8250,108 @@
           <a:chExt cx="0" cy="0"/>
         </a:xfrm>
       </p:grpSpPr>
-      <p:pic>
-        <p:nvPicPr>
-          <p:cNvPr id="1026" name="Picture 2"/>
-          <p:cNvPicPr>
-            <a:picLocks noChangeAspect="1" noChangeArrowheads="1"/>
-          </p:cNvPicPr>
-          <p:nvPr/>
-        </p:nvPicPr>
-        <p:blipFill>
-          <a:blip r:embed="rId2" cstate="print"/>
-          <a:srcRect/>
-          <a:stretch>
-            <a:fillRect/>
-          </a:stretch>
-        </p:blipFill>
-        <p:spPr bwMode="auto">
-          <a:xfrm>
-            <a:off x="314325" y="2047875"/>
-            <a:ext cx="8515350" cy="2762250"/>
+      <p:sp>
+        <p:nvSpPr>
+          <p:cNvPr id="6" name="TextBox 5"/>
+          <p:cNvSpPr txBox="1"/>
+          <p:nvPr/>
+        </p:nvSpPr>
+        <p:spPr>
+          <a:xfrm>
+            <a:off x="609600" y="457200"/>
+            <a:ext cx="3889655" cy="2308324"/>
           </a:xfrm>
           <a:prstGeom prst="rect">
             <a:avLst/>
           </a:prstGeom>
           <a:noFill/>
-          <a:ln w="9525">
-            <a:noFill/>
-            <a:miter lim="800000"/>
-            <a:headEnd/>
-            <a:tailEnd/>
-          </a:ln>
-        </p:spPr>
-      </p:pic>
-      <p:sp>
-        <p:nvSpPr>
-          <p:cNvPr id="3" name="TextBox 2"/>
-          <p:cNvSpPr txBox="1"/>
-          <p:nvPr/>
-        </p:nvSpPr>
-        <p:spPr>
-          <a:xfrm>
-            <a:off x="457200" y="218182"/>
-            <a:ext cx="7620000" cy="1323439"/>
-          </a:xfrm>
-          <a:prstGeom prst="rect">
-            <a:avLst/>
-          </a:prstGeom>
-          <a:noFill/>
-        </p:spPr>
-        <p:txBody>
-          <a:bodyPr wrap="square" rtlCol="0">
+        </p:spPr>
+        <p:txBody>
+          <a:bodyPr wrap="none" rtlCol="0">
             <a:spAutoFit/>
           </a:bodyPr>
           <a:lstStyle/>
           <a:p>
             <a:r>
-              <a:rPr lang="en-US" sz="1600" dirty="0" err="1">
-                <a:latin typeface="Arial" pitchFamily="34" charset="0"/>
-                <a:cs typeface="Arial" pitchFamily="34" charset="0"/>
-              </a:rPr>
-              <a:t>Thread.sleep</a:t>
-            </a:r>
-            <a:r>
-              <a:rPr lang="en-US" sz="1600" dirty="0">
-                <a:latin typeface="Arial" pitchFamily="34" charset="0"/>
-                <a:cs typeface="Arial" pitchFamily="34" charset="0"/>
-              </a:rPr>
-              <a:t> and nearly all other Java blocking methods support cancellation.</a:t>
-            </a:r>
-          </a:p>
-          <a:p>
-            <a:r>
-              <a:rPr lang="en-US" sz="1600" dirty="0">
-                <a:latin typeface="Arial" pitchFamily="34" charset="0"/>
-                <a:cs typeface="Arial" pitchFamily="34" charset="0"/>
-              </a:rPr>
-              <a:t>If your code is working on something, it is up to you to check for cancellation </a:t>
-            </a:r>
-          </a:p>
-          <a:p>
-            <a:r>
-              <a:rPr lang="en-US" sz="1600" dirty="0">
-                <a:latin typeface="Arial" pitchFamily="34" charset="0"/>
-                <a:cs typeface="Arial" pitchFamily="34" charset="0"/>
-              </a:rPr>
-              <a:t>(which means checking for interruption).</a:t>
-            </a:r>
-          </a:p>
-          <a:p>
-            <a:endParaRPr lang="en-US" sz="1600" dirty="0">
-              <a:latin typeface="Arial" pitchFamily="34" charset="0"/>
-              <a:cs typeface="Arial" pitchFamily="34" charset="0"/>
-            </a:endParaRPr>
-          </a:p>
-          <a:p>
-            <a:r>
-              <a:rPr lang="en-US" sz="1600" dirty="0">
-                <a:latin typeface="Arial" pitchFamily="34" charset="0"/>
-                <a:cs typeface="Arial" pitchFamily="34" charset="0"/>
-              </a:rPr>
-              <a:t>More on this on Chapter 7.</a:t>
-            </a:r>
-          </a:p>
-        </p:txBody>
-      </p:sp>
+              <a:rPr lang="en-US" dirty="0" err="1"/>
+              <a:t>BlockingQueues</a:t>
+            </a:r>
+            <a:endParaRPr lang="en-US" dirty="0"/>
+          </a:p>
+          <a:p>
+            <a:r>
+              <a:rPr lang="en-US" dirty="0"/>
+              <a:t>A Peak calling example with semaphore</a:t>
+            </a:r>
+          </a:p>
+          <a:p>
+            <a:r>
+              <a:rPr lang="en-US" dirty="0" err="1"/>
+              <a:t>CountDownLatch</a:t>
+            </a:r>
+            <a:endParaRPr lang="en-US" dirty="0"/>
+          </a:p>
+          <a:p>
+            <a:r>
+              <a:rPr lang="en-US" dirty="0"/>
+              <a:t>Callable, Future, </a:t>
+            </a:r>
+            <a:r>
+              <a:rPr lang="en-US" dirty="0" err="1"/>
+              <a:t>FutureTask</a:t>
+            </a:r>
+            <a:endParaRPr lang="en-US" dirty="0"/>
+          </a:p>
+          <a:p>
+            <a:r>
+              <a:rPr lang="en-US" dirty="0"/>
+              <a:t>Cancellation</a:t>
+            </a:r>
+          </a:p>
+          <a:p>
+            <a:endParaRPr lang="en-US" dirty="0"/>
+          </a:p>
+          <a:p>
+            <a:endParaRPr lang="en-US" dirty="0"/>
+          </a:p>
+          <a:p>
+            <a:endParaRPr lang="en-US" dirty="0"/>
+          </a:p>
+        </p:txBody>
+      </p:sp>
+      <p:cxnSp>
+        <p:nvCxnSpPr>
+          <p:cNvPr id="7" name="Straight Arrow Connector 6"/>
+          <p:cNvCxnSpPr/>
+          <p:nvPr/>
+        </p:nvCxnSpPr>
+        <p:spPr>
+          <a:xfrm rot="10800000">
+            <a:off x="1905000" y="1751011"/>
+            <a:ext cx="533400" cy="1588"/>
+          </a:xfrm>
+          <a:prstGeom prst="straightConnector1">
+            <a:avLst/>
+          </a:prstGeom>
+          <a:ln>
+            <a:tailEnd type="arrow"/>
+          </a:ln>
+        </p:spPr>
+        <p:style>
+          <a:lnRef idx="1">
+            <a:schemeClr val="accent1"/>
+          </a:lnRef>
+          <a:fillRef idx="0">
+            <a:schemeClr val="accent1"/>
+          </a:fillRef>
+          <a:effectRef idx="0">
+            <a:schemeClr val="accent1"/>
+          </a:effectRef>
+          <a:fontRef idx="minor">
+            <a:schemeClr val="tx1"/>
+          </a:fontRef>
+        </p:style>
+      </p:cxnSp>
     </p:spTree>
   </p:cSld>
   <p:clrMapOvr>
@@ -8050,7 +8379,7 @@
       </p:grpSpPr>
       <p:pic>
         <p:nvPicPr>
-          <p:cNvPr id="1026" name="Picture 2"/>
+          <p:cNvPr id="3074" name="Picture 2"/>
           <p:cNvPicPr>
             <a:picLocks noChangeAspect="1" noChangeArrowheads="1"/>
           </p:cNvPicPr>
@@ -8065,8 +8394,8 @@
         </p:blipFill>
         <p:spPr bwMode="auto">
           <a:xfrm>
-            <a:off x="76200" y="152400"/>
-            <a:ext cx="5381625" cy="6448425"/>
+            <a:off x="276225" y="1914525"/>
+            <a:ext cx="8591550" cy="3028950"/>
           </a:xfrm>
           <a:prstGeom prst="rect">
             <a:avLst/>
@@ -8080,48 +8409,16 @@
           </a:ln>
         </p:spPr>
       </p:pic>
-      <p:pic>
-        <p:nvPicPr>
-          <p:cNvPr id="1027" name="Picture 3"/>
-          <p:cNvPicPr>
-            <a:picLocks noChangeAspect="1" noChangeArrowheads="1"/>
-          </p:cNvPicPr>
-          <p:nvPr/>
-        </p:nvPicPr>
-        <p:blipFill>
-          <a:blip r:embed="rId3" cstate="print"/>
-          <a:srcRect/>
-          <a:stretch>
-            <a:fillRect/>
-          </a:stretch>
-        </p:blipFill>
-        <p:spPr bwMode="auto">
-          <a:xfrm>
-            <a:off x="4191000" y="4343400"/>
-            <a:ext cx="4724400" cy="1685549"/>
-          </a:xfrm>
-          <a:prstGeom prst="rect">
-            <a:avLst/>
-          </a:prstGeom>
-          <a:noFill/>
-          <a:ln w="9525">
-            <a:noFill/>
-            <a:miter lim="800000"/>
-            <a:headEnd/>
-            <a:tailEnd/>
-          </a:ln>
-        </p:spPr>
-      </p:pic>
-      <p:sp>
-        <p:nvSpPr>
-          <p:cNvPr id="7" name="TextBox 6"/>
+      <p:sp>
+        <p:nvSpPr>
+          <p:cNvPr id="5" name="TextBox 4"/>
           <p:cNvSpPr txBox="1"/>
           <p:nvPr/>
         </p:nvSpPr>
         <p:spPr>
           <a:xfrm>
-            <a:off x="4343400" y="1600200"/>
-            <a:ext cx="4838184" cy="1077218"/>
+            <a:off x="381000" y="990600"/>
+            <a:ext cx="8172109" cy="646331"/>
           </a:xfrm>
           <a:prstGeom prst="rect">
             <a:avLst/>
@@ -8135,135 +8432,18 @@
           <a:lstStyle/>
           <a:p>
             <a:r>
-              <a:rPr lang="en-US" sz="1600" dirty="0">
-                <a:latin typeface="Arial" pitchFamily="34" charset="0"/>
-                <a:cs typeface="Arial" pitchFamily="34" charset="0"/>
-              </a:rPr>
-              <a:t>Calling cancel causes an Interruption flag to be set.</a:t>
-            </a:r>
-          </a:p>
-          <a:p>
-            <a:r>
-              <a:rPr lang="en-US" sz="1600" dirty="0" err="1">
-                <a:latin typeface="Arial" pitchFamily="34" charset="0"/>
-                <a:cs typeface="Arial" pitchFamily="34" charset="0"/>
-              </a:rPr>
-              <a:t>Thread.sleep</a:t>
-            </a:r>
-            <a:r>
-              <a:rPr lang="en-US" sz="1600" dirty="0">
-                <a:latin typeface="Arial" pitchFamily="34" charset="0"/>
-                <a:cs typeface="Arial" pitchFamily="34" charset="0"/>
-              </a:rPr>
-              <a:t>(..) checks that interruption flag and</a:t>
-            </a:r>
-          </a:p>
-          <a:p>
-            <a:r>
-              <a:rPr lang="en-US" sz="1600" dirty="0">
-                <a:latin typeface="Arial" pitchFamily="34" charset="0"/>
-                <a:cs typeface="Arial" pitchFamily="34" charset="0"/>
-              </a:rPr>
-              <a:t>If it is set throws </a:t>
-            </a:r>
-            <a:r>
-              <a:rPr lang="en-US" sz="1600" dirty="0" err="1">
-                <a:latin typeface="Arial" pitchFamily="34" charset="0"/>
-                <a:cs typeface="Arial" pitchFamily="34" charset="0"/>
-              </a:rPr>
-              <a:t>InterruptedException</a:t>
-            </a:r>
-            <a:r>
-              <a:rPr lang="en-US" sz="1600" dirty="0">
-                <a:latin typeface="Arial" pitchFamily="34" charset="0"/>
-                <a:cs typeface="Arial" pitchFamily="34" charset="0"/>
-              </a:rPr>
-              <a:t>.</a:t>
-            </a:r>
-          </a:p>
-          <a:p>
-            <a:endParaRPr lang="en-US" sz="1600" dirty="0">
-              <a:latin typeface="Arial" pitchFamily="34" charset="0"/>
-              <a:cs typeface="Arial" pitchFamily="34" charset="0"/>
-            </a:endParaRPr>
-          </a:p>
-        </p:txBody>
-      </p:sp>
-      <p:sp>
-        <p:nvSpPr>
-          <p:cNvPr id="8" name="Rectangle 7"/>
-          <p:cNvSpPr/>
-          <p:nvPr/>
-        </p:nvSpPr>
-        <p:spPr>
-          <a:xfrm>
-            <a:off x="3581400" y="6172200"/>
-            <a:ext cx="5562600" cy="338554"/>
-          </a:xfrm>
-          <a:prstGeom prst="rect">
-            <a:avLst/>
-          </a:prstGeom>
-        </p:spPr>
-        <p:txBody>
-          <a:bodyPr wrap="square">
-            <a:spAutoFit/>
-          </a:bodyPr>
-          <a:lstStyle/>
-          <a:p>
-            <a:r>
-              <a:rPr lang="en-US" sz="1600" dirty="0">
-                <a:latin typeface="Arial" pitchFamily="34" charset="0"/>
-                <a:cs typeface="Arial" pitchFamily="34" charset="0"/>
-              </a:rPr>
-              <a:t>Calling get() after cancel, throws a </a:t>
-            </a:r>
-            <a:r>
-              <a:rPr lang="en-US" sz="1600" dirty="0" err="1">
-                <a:latin typeface="Arial" pitchFamily="34" charset="0"/>
-                <a:cs typeface="Arial" pitchFamily="34" charset="0"/>
-              </a:rPr>
-              <a:t>CancellationException</a:t>
-            </a:r>
-            <a:endParaRPr lang="en-US" sz="1600" dirty="0">
-              <a:latin typeface="Arial" pitchFamily="34" charset="0"/>
-              <a:cs typeface="Arial" pitchFamily="34" charset="0"/>
-            </a:endParaRPr>
-          </a:p>
-        </p:txBody>
-      </p:sp>
-      <p:cxnSp>
-        <p:nvCxnSpPr>
-          <p:cNvPr id="12" name="Straight Arrow Connector 11"/>
-          <p:cNvCxnSpPr/>
-          <p:nvPr/>
-        </p:nvCxnSpPr>
-        <p:spPr>
-          <a:xfrm rot="10800000">
-            <a:off x="3048000" y="6248400"/>
-            <a:ext cx="533400" cy="76200"/>
-          </a:xfrm>
-          <a:prstGeom prst="straightConnector1">
-            <a:avLst/>
-          </a:prstGeom>
-          <a:ln>
-            <a:tailEnd type="arrow"/>
-          </a:ln>
-        </p:spPr>
-        <p:style>
-          <a:lnRef idx="1">
-            <a:schemeClr val="accent1"/>
-          </a:lnRef>
-          <a:fillRef idx="0">
-            <a:schemeClr val="accent1"/>
-          </a:fillRef>
-          <a:effectRef idx="0">
-            <a:schemeClr val="accent1"/>
-          </a:effectRef>
-          <a:fontRef idx="minor">
-            <a:schemeClr val="tx1"/>
-          </a:fontRef>
-        </p:style>
-      </p:cxnSp>
+              <a:rPr lang="en-US" dirty="0"/>
+              <a:t>Future also supports cancellation, but this is dependent upon the co-operation of the</a:t>
+            </a:r>
+          </a:p>
+          <a:p>
+            <a:r>
+              <a:rPr lang="en-US" dirty="0"/>
+              <a:t>running threads…</a:t>
+            </a:r>
+          </a:p>
+        </p:txBody>
+      </p:sp>
     </p:spTree>
   </p:cSld>
   <p:clrMapOvr>
@@ -8572,6 +8752,40 @@
                 <a:latin typeface="Arial" panose="020B0604020202020204" pitchFamily="34" charset="0"/>
               </a:rPr>
               <a:t>threads</a:t>
+            </a:r>
+          </a:p>
+        </p:txBody>
+      </p:sp>
+      <p:sp>
+        <p:nvSpPr>
+          <p:cNvPr id="2" name="Rectangle 1">
+            <a:extLst>
+              <a:ext uri="{FF2B5EF4-FFF2-40B4-BE49-F238E27FC236}">
+                <a16:creationId xmlns:a16="http://schemas.microsoft.com/office/drawing/2014/main" id="{32E4B29C-11EC-4A8E-9D05-A46245194335}"/>
+              </a:ext>
+            </a:extLst>
+          </p:cNvPr>
+          <p:cNvSpPr/>
+          <p:nvPr/>
+        </p:nvSpPr>
+        <p:spPr>
+          <a:xfrm>
+            <a:off x="381000" y="6672590"/>
+            <a:ext cx="9296400" cy="261610"/>
+          </a:xfrm>
+          <a:prstGeom prst="rect">
+            <a:avLst/>
+          </a:prstGeom>
+        </p:spPr>
+        <p:txBody>
+          <a:bodyPr wrap="square">
+            <a:spAutoFit/>
+          </a:bodyPr>
+          <a:lstStyle/>
+          <a:p>
+            <a:r>
+              <a:rPr lang="en-US" sz="1100" dirty="0"/>
+              <a:t>https://github.com/afodor/metagenomicsTools/blob/master/src/classExamples/semaphoreAndBlockingQueues/GatherAllCSSSimpleSemaphore.java</a:t>
             </a:r>
           </a:p>
         </p:txBody>
@@ -8608,7 +8822,7 @@
       </p:grpSpPr>
       <p:pic>
         <p:nvPicPr>
-          <p:cNvPr id="4098" name="Picture 2"/>
+          <p:cNvPr id="1026" name="Picture 2"/>
           <p:cNvPicPr>
             <a:picLocks noChangeAspect="1" noChangeArrowheads="1"/>
           </p:cNvPicPr>
@@ -8623,8 +8837,8 @@
         </p:blipFill>
         <p:spPr bwMode="auto">
           <a:xfrm>
-            <a:off x="1066800" y="2057400"/>
-            <a:ext cx="6911738" cy="2819400"/>
+            <a:off x="314325" y="2047875"/>
+            <a:ext cx="8515350" cy="2762250"/>
           </a:xfrm>
           <a:prstGeom prst="rect">
             <a:avLst/>
@@ -8638,6 +8852,78 @@
           </a:ln>
         </p:spPr>
       </p:pic>
+      <p:sp>
+        <p:nvSpPr>
+          <p:cNvPr id="3" name="TextBox 2"/>
+          <p:cNvSpPr txBox="1"/>
+          <p:nvPr/>
+        </p:nvSpPr>
+        <p:spPr>
+          <a:xfrm>
+            <a:off x="457200" y="218182"/>
+            <a:ext cx="7620000" cy="1323439"/>
+          </a:xfrm>
+          <a:prstGeom prst="rect">
+            <a:avLst/>
+          </a:prstGeom>
+          <a:noFill/>
+        </p:spPr>
+        <p:txBody>
+          <a:bodyPr wrap="square" rtlCol="0">
+            <a:spAutoFit/>
+          </a:bodyPr>
+          <a:lstStyle/>
+          <a:p>
+            <a:r>
+              <a:rPr lang="en-US" sz="1600" dirty="0" err="1">
+                <a:latin typeface="Arial" pitchFamily="34" charset="0"/>
+                <a:cs typeface="Arial" pitchFamily="34" charset="0"/>
+              </a:rPr>
+              <a:t>Thread.sleep</a:t>
+            </a:r>
+            <a:r>
+              <a:rPr lang="en-US" sz="1600" dirty="0">
+                <a:latin typeface="Arial" pitchFamily="34" charset="0"/>
+                <a:cs typeface="Arial" pitchFamily="34" charset="0"/>
+              </a:rPr>
+              <a:t> and nearly all other Java blocking methods support cancellation.</a:t>
+            </a:r>
+          </a:p>
+          <a:p>
+            <a:r>
+              <a:rPr lang="en-US" sz="1600" dirty="0">
+                <a:latin typeface="Arial" pitchFamily="34" charset="0"/>
+                <a:cs typeface="Arial" pitchFamily="34" charset="0"/>
+              </a:rPr>
+              <a:t>If your code is working on something, it is up to you to check for cancellation </a:t>
+            </a:r>
+          </a:p>
+          <a:p>
+            <a:r>
+              <a:rPr lang="en-US" sz="1600" dirty="0">
+                <a:latin typeface="Arial" pitchFamily="34" charset="0"/>
+                <a:cs typeface="Arial" pitchFamily="34" charset="0"/>
+              </a:rPr>
+              <a:t>(which means checking for interruption).</a:t>
+            </a:r>
+          </a:p>
+          <a:p>
+            <a:endParaRPr lang="en-US" sz="1600" dirty="0">
+              <a:latin typeface="Arial" pitchFamily="34" charset="0"/>
+              <a:cs typeface="Arial" pitchFamily="34" charset="0"/>
+            </a:endParaRPr>
+          </a:p>
+          <a:p>
+            <a:r>
+              <a:rPr lang="en-US" sz="1600" dirty="0">
+                <a:latin typeface="Arial" pitchFamily="34" charset="0"/>
+                <a:cs typeface="Arial" pitchFamily="34" charset="0"/>
+              </a:rPr>
+              <a:t>More on this on Chapter 7.</a:t>
+            </a:r>
+          </a:p>
+        </p:txBody>
+      </p:sp>
     </p:spTree>
   </p:cSld>
   <p:clrMapOvr>
@@ -8665,7 +8951,7 @@
       </p:grpSpPr>
       <p:pic>
         <p:nvPicPr>
-          <p:cNvPr id="2050" name="Picture 2"/>
+          <p:cNvPr id="1026" name="Picture 2"/>
           <p:cNvPicPr>
             <a:picLocks noChangeAspect="1" noChangeArrowheads="1"/>
           </p:cNvPicPr>
@@ -8680,8 +8966,8 @@
         </p:blipFill>
         <p:spPr bwMode="auto">
           <a:xfrm>
-            <a:off x="228600" y="76200"/>
-            <a:ext cx="5773994" cy="6629400"/>
+            <a:off x="76200" y="152400"/>
+            <a:ext cx="5381625" cy="6448425"/>
           </a:xfrm>
           <a:prstGeom prst="rect">
             <a:avLst/>
@@ -8695,16 +8981,48 @@
           </a:ln>
         </p:spPr>
       </p:pic>
-      <p:sp>
-        <p:nvSpPr>
-          <p:cNvPr id="5" name="TextBox 4"/>
+      <p:pic>
+        <p:nvPicPr>
+          <p:cNvPr id="1027" name="Picture 3"/>
+          <p:cNvPicPr>
+            <a:picLocks noChangeAspect="1" noChangeArrowheads="1"/>
+          </p:cNvPicPr>
+          <p:nvPr/>
+        </p:nvPicPr>
+        <p:blipFill>
+          <a:blip r:embed="rId3" cstate="print"/>
+          <a:srcRect/>
+          <a:stretch>
+            <a:fillRect/>
+          </a:stretch>
+        </p:blipFill>
+        <p:spPr bwMode="auto">
+          <a:xfrm>
+            <a:off x="4191000" y="4343400"/>
+            <a:ext cx="4724400" cy="1685549"/>
+          </a:xfrm>
+          <a:prstGeom prst="rect">
+            <a:avLst/>
+          </a:prstGeom>
+          <a:noFill/>
+          <a:ln w="9525">
+            <a:noFill/>
+            <a:miter lim="800000"/>
+            <a:headEnd/>
+            <a:tailEnd/>
+          </a:ln>
+        </p:spPr>
+      </p:pic>
+      <p:sp>
+        <p:nvSpPr>
+          <p:cNvPr id="7" name="TextBox 6"/>
           <p:cNvSpPr txBox="1"/>
           <p:nvPr/>
         </p:nvSpPr>
         <p:spPr>
           <a:xfrm>
-            <a:off x="5029200" y="381000"/>
-            <a:ext cx="4004966" cy="1200329"/>
+            <a:off x="4343400" y="1600200"/>
+            <a:ext cx="4838184" cy="1077218"/>
           </a:xfrm>
           <a:prstGeom prst="rect">
             <a:avLst/>
@@ -8712,36 +9030,118 @@
           <a:noFill/>
         </p:spPr>
         <p:txBody>
-          <a:bodyPr wrap="square" rtlCol="0">
+          <a:bodyPr wrap="none" rtlCol="0">
             <a:spAutoFit/>
           </a:bodyPr>
           <a:lstStyle/>
           <a:p>
             <a:r>
-              <a:rPr lang="en-US" dirty="0"/>
-              <a:t>If you are not using one of Java’s  blocking methods (like </a:t>
-            </a:r>
-            <a:r>
-              <a:rPr lang="en-US" dirty="0" err="1"/>
+              <a:rPr lang="en-US" sz="1600" dirty="0">
+                <a:latin typeface="Arial" pitchFamily="34" charset="0"/>
+                <a:cs typeface="Arial" pitchFamily="34" charset="0"/>
+              </a:rPr>
+              <a:t>Calling cancel causes an Interruption flag to be set.</a:t>
+            </a:r>
+          </a:p>
+          <a:p>
+            <a:r>
+              <a:rPr lang="en-US" sz="1600" dirty="0" err="1">
+                <a:latin typeface="Arial" pitchFamily="34" charset="0"/>
+                <a:cs typeface="Arial" pitchFamily="34" charset="0"/>
+              </a:rPr>
               <a:t>Thread.sleep</a:t>
             </a:r>
             <a:r>
-              <a:rPr lang="en-US" dirty="0"/>
-              <a:t>()) that supports interruption, it is up to you to check for cancellation.</a:t>
-            </a:r>
+              <a:rPr lang="en-US" sz="1600" dirty="0">
+                <a:latin typeface="Arial" pitchFamily="34" charset="0"/>
+                <a:cs typeface="Arial" pitchFamily="34" charset="0"/>
+              </a:rPr>
+              <a:t>(..) checks that interruption flag and</a:t>
+            </a:r>
+          </a:p>
+          <a:p>
+            <a:r>
+              <a:rPr lang="en-US" sz="1600" dirty="0">
+                <a:latin typeface="Arial" pitchFamily="34" charset="0"/>
+                <a:cs typeface="Arial" pitchFamily="34" charset="0"/>
+              </a:rPr>
+              <a:t>If it is set throws </a:t>
+            </a:r>
+            <a:r>
+              <a:rPr lang="en-US" sz="1600" dirty="0" err="1">
+                <a:latin typeface="Arial" pitchFamily="34" charset="0"/>
+                <a:cs typeface="Arial" pitchFamily="34" charset="0"/>
+              </a:rPr>
+              <a:t>InterruptedException</a:t>
+            </a:r>
+            <a:r>
+              <a:rPr lang="en-US" sz="1600" dirty="0">
+                <a:latin typeface="Arial" pitchFamily="34" charset="0"/>
+                <a:cs typeface="Arial" pitchFamily="34" charset="0"/>
+              </a:rPr>
+              <a:t>.</a:t>
+            </a:r>
+          </a:p>
+          <a:p>
+            <a:endParaRPr lang="en-US" sz="1600" dirty="0">
+              <a:latin typeface="Arial" pitchFamily="34" charset="0"/>
+              <a:cs typeface="Arial" pitchFamily="34" charset="0"/>
+            </a:endParaRPr>
+          </a:p>
+        </p:txBody>
+      </p:sp>
+      <p:sp>
+        <p:nvSpPr>
+          <p:cNvPr id="8" name="Rectangle 7"/>
+          <p:cNvSpPr/>
+          <p:nvPr/>
+        </p:nvSpPr>
+        <p:spPr>
+          <a:xfrm>
+            <a:off x="3581400" y="6172200"/>
+            <a:ext cx="5562600" cy="338554"/>
+          </a:xfrm>
+          <a:prstGeom prst="rect">
+            <a:avLst/>
+          </a:prstGeom>
+        </p:spPr>
+        <p:txBody>
+          <a:bodyPr wrap="square">
+            <a:spAutoFit/>
+          </a:bodyPr>
+          <a:lstStyle/>
+          <a:p>
+            <a:r>
+              <a:rPr lang="en-US" sz="1600" dirty="0">
+                <a:latin typeface="Arial" pitchFamily="34" charset="0"/>
+                <a:cs typeface="Arial" pitchFamily="34" charset="0"/>
+              </a:rPr>
+              <a:t>Calling get() after cancel, throws a </a:t>
+            </a:r>
+            <a:r>
+              <a:rPr lang="en-US" sz="1600" dirty="0" err="1">
+                <a:latin typeface="Arial" pitchFamily="34" charset="0"/>
+                <a:cs typeface="Arial" pitchFamily="34" charset="0"/>
+              </a:rPr>
+              <a:t>CancellationException</a:t>
+            </a:r>
+            <a:endParaRPr lang="en-US" sz="1600" dirty="0">
+              <a:latin typeface="Arial" pitchFamily="34" charset="0"/>
+              <a:cs typeface="Arial" pitchFamily="34" charset="0"/>
+            </a:endParaRPr>
           </a:p>
         </p:txBody>
       </p:sp>
       <p:cxnSp>
         <p:nvCxnSpPr>
-          <p:cNvPr id="7" name="Straight Arrow Connector 6"/>
+          <p:cNvPr id="12" name="Straight Arrow Connector 11"/>
           <p:cNvCxnSpPr/>
           <p:nvPr/>
         </p:nvCxnSpPr>
         <p:spPr>
           <a:xfrm rot="10800000">
-            <a:off x="4038600" y="2133600"/>
-            <a:ext cx="609600" cy="1588"/>
+            <a:off x="3048000" y="6248400"/>
+            <a:ext cx="533400" cy="76200"/>
           </a:xfrm>
           <a:prstGeom prst="straightConnector1">
             <a:avLst/>
@@ -8765,162 +9165,6 @@
           </a:fontRef>
         </p:style>
       </p:cxnSp>
-      <p:sp>
-        <p:nvSpPr>
-          <p:cNvPr id="9" name="TextBox 8"/>
-          <p:cNvSpPr txBox="1"/>
-          <p:nvPr/>
-        </p:nvSpPr>
-        <p:spPr>
-          <a:xfrm>
-            <a:off x="4572000" y="1916668"/>
-            <a:ext cx="3142463" cy="369332"/>
-          </a:xfrm>
-          <a:prstGeom prst="rect">
-            <a:avLst/>
-          </a:prstGeom>
-          <a:noFill/>
-        </p:spPr>
-        <p:txBody>
-          <a:bodyPr wrap="none" rtlCol="0">
-            <a:spAutoFit/>
-          </a:bodyPr>
-          <a:lstStyle/>
-          <a:p>
-            <a:r>
-              <a:rPr lang="en-US" dirty="0"/>
-              <a:t>We don’t check for cancellation</a:t>
-            </a:r>
-          </a:p>
-        </p:txBody>
-      </p:sp>
-      <p:pic>
-        <p:nvPicPr>
-          <p:cNvPr id="2051" name="Picture 3"/>
-          <p:cNvPicPr>
-            <a:picLocks noChangeAspect="1" noChangeArrowheads="1"/>
-          </p:cNvPicPr>
-          <p:nvPr/>
-        </p:nvPicPr>
-        <p:blipFill>
-          <a:blip r:embed="rId3" cstate="print"/>
-          <a:srcRect/>
-          <a:stretch>
-            <a:fillRect/>
-          </a:stretch>
-        </p:blipFill>
-        <p:spPr bwMode="auto">
-          <a:xfrm>
-            <a:off x="3993614" y="4267200"/>
-            <a:ext cx="5150386" cy="1524000"/>
-          </a:xfrm>
-          <a:prstGeom prst="rect">
-            <a:avLst/>
-          </a:prstGeom>
-          <a:noFill/>
-          <a:ln w="9525">
-            <a:noFill/>
-            <a:miter lim="800000"/>
-            <a:headEnd/>
-            <a:tailEnd/>
-          </a:ln>
-        </p:spPr>
-      </p:pic>
-      <p:sp>
-        <p:nvSpPr>
-          <p:cNvPr id="11" name="TextBox 10"/>
-          <p:cNvSpPr txBox="1"/>
-          <p:nvPr/>
-        </p:nvSpPr>
-        <p:spPr>
-          <a:xfrm>
-            <a:off x="4114800" y="3962400"/>
-            <a:ext cx="4673011" cy="369332"/>
-          </a:xfrm>
-          <a:prstGeom prst="rect">
-            <a:avLst/>
-          </a:prstGeom>
-          <a:noFill/>
-        </p:spPr>
-        <p:txBody>
-          <a:bodyPr wrap="none" rtlCol="0">
-            <a:spAutoFit/>
-          </a:bodyPr>
-          <a:lstStyle/>
-          <a:p>
-            <a:r>
-              <a:rPr lang="en-US" dirty="0"/>
-              <a:t>Our thread continued to work after cancellation</a:t>
-            </a:r>
-          </a:p>
-        </p:txBody>
-      </p:sp>
-      <p:cxnSp>
-        <p:nvCxnSpPr>
-          <p:cNvPr id="13" name="Straight Arrow Connector 12"/>
-          <p:cNvCxnSpPr/>
-          <p:nvPr/>
-        </p:nvCxnSpPr>
-        <p:spPr>
-          <a:xfrm rot="10800000">
-            <a:off x="3505200" y="6324600"/>
-            <a:ext cx="685800" cy="1588"/>
-          </a:xfrm>
-          <a:prstGeom prst="straightConnector1">
-            <a:avLst/>
-          </a:prstGeom>
-          <a:ln>
-            <a:tailEnd type="arrow"/>
-          </a:ln>
-        </p:spPr>
-        <p:style>
-          <a:lnRef idx="1">
-            <a:schemeClr val="accent1"/>
-          </a:lnRef>
-          <a:fillRef idx="0">
-            <a:schemeClr val="accent1"/>
-          </a:fillRef>
-          <a:effectRef idx="0">
-            <a:schemeClr val="accent1"/>
-          </a:effectRef>
-          <a:fontRef idx="minor">
-            <a:schemeClr val="tx1"/>
-          </a:fontRef>
-        </p:style>
-      </p:cxnSp>
-      <p:sp>
-        <p:nvSpPr>
-          <p:cNvPr id="14" name="TextBox 13"/>
-          <p:cNvSpPr txBox="1"/>
-          <p:nvPr/>
-        </p:nvSpPr>
-        <p:spPr>
-          <a:xfrm>
-            <a:off x="4191000" y="6172200"/>
-            <a:ext cx="1688732" cy="369332"/>
-          </a:xfrm>
-          <a:prstGeom prst="rect">
-            <a:avLst/>
-          </a:prstGeom>
-          <a:noFill/>
-        </p:spPr>
-        <p:txBody>
-          <a:bodyPr wrap="none" rtlCol="0">
-            <a:spAutoFit/>
-          </a:bodyPr>
-          <a:lstStyle/>
-          <a:p>
-            <a:r>
-              <a:rPr lang="en-US" dirty="0"/>
-              <a:t>get </a:t>
-            </a:r>
-            <a:r>
-              <a:rPr lang="en-US"/>
-              <a:t>still  throws!</a:t>
-            </a:r>
-          </a:p>
-        </p:txBody>
-      </p:sp>
     </p:spTree>
   </p:cSld>
   <p:clrMapOvr>
@@ -8948,7 +9192,7 @@
       </p:grpSpPr>
       <p:pic>
         <p:nvPicPr>
-          <p:cNvPr id="1027" name="Picture 3"/>
+          <p:cNvPr id="4098" name="Picture 2"/>
           <p:cNvPicPr>
             <a:picLocks noChangeAspect="1" noChangeArrowheads="1"/>
           </p:cNvPicPr>
@@ -8963,8 +9207,8 @@
         </p:blipFill>
         <p:spPr bwMode="auto">
           <a:xfrm>
-            <a:off x="457200" y="304800"/>
-            <a:ext cx="5112774" cy="6400800"/>
+            <a:off x="1066800" y="2057400"/>
+            <a:ext cx="6911738" cy="2819400"/>
           </a:xfrm>
           <a:prstGeom prst="rect">
             <a:avLst/>
@@ -8978,129 +9222,6 @@
           </a:ln>
         </p:spPr>
       </p:pic>
-      <p:cxnSp>
-        <p:nvCxnSpPr>
-          <p:cNvPr id="5" name="Straight Arrow Connector 4"/>
-          <p:cNvCxnSpPr/>
-          <p:nvPr/>
-        </p:nvCxnSpPr>
-        <p:spPr>
-          <a:xfrm rot="10800000">
-            <a:off x="3886200" y="2132011"/>
-            <a:ext cx="838200" cy="1588"/>
-          </a:xfrm>
-          <a:prstGeom prst="straightConnector1">
-            <a:avLst/>
-          </a:prstGeom>
-          <a:ln>
-            <a:tailEnd type="arrow"/>
-          </a:ln>
-        </p:spPr>
-        <p:style>
-          <a:lnRef idx="1">
-            <a:schemeClr val="accent1"/>
-          </a:lnRef>
-          <a:fillRef idx="0">
-            <a:schemeClr val="accent1"/>
-          </a:fillRef>
-          <a:effectRef idx="0">
-            <a:schemeClr val="accent1"/>
-          </a:effectRef>
-          <a:fontRef idx="minor">
-            <a:schemeClr val="tx1"/>
-          </a:fontRef>
-        </p:style>
-      </p:cxnSp>
-      <p:sp>
-        <p:nvSpPr>
-          <p:cNvPr id="6" name="TextBox 5"/>
-          <p:cNvSpPr txBox="1"/>
-          <p:nvPr/>
-        </p:nvSpPr>
-        <p:spPr>
-          <a:xfrm>
-            <a:off x="5410200" y="533400"/>
-            <a:ext cx="2791598" cy="369332"/>
-          </a:xfrm>
-          <a:prstGeom prst="rect">
-            <a:avLst/>
-          </a:prstGeom>
-          <a:noFill/>
-        </p:spPr>
-        <p:txBody>
-          <a:bodyPr wrap="none" rtlCol="0">
-            <a:spAutoFit/>
-          </a:bodyPr>
-          <a:lstStyle/>
-          <a:p>
-            <a:r>
-              <a:rPr lang="en-US" dirty="0"/>
-              <a:t>Our cancellation now works</a:t>
-            </a:r>
-          </a:p>
-        </p:txBody>
-      </p:sp>
-      <p:pic>
-        <p:nvPicPr>
-          <p:cNvPr id="1028" name="Picture 4"/>
-          <p:cNvPicPr>
-            <a:picLocks noChangeAspect="1" noChangeArrowheads="1"/>
-          </p:cNvPicPr>
-          <p:nvPr/>
-        </p:nvPicPr>
-        <p:blipFill>
-          <a:blip r:embed="rId3" cstate="print"/>
-          <a:srcRect/>
-          <a:stretch>
-            <a:fillRect/>
-          </a:stretch>
-        </p:blipFill>
-        <p:spPr bwMode="auto">
-          <a:xfrm>
-            <a:off x="3810000" y="4419600"/>
-            <a:ext cx="5124450" cy="1480594"/>
-          </a:xfrm>
-          <a:prstGeom prst="rect">
-            <a:avLst/>
-          </a:prstGeom>
-          <a:noFill/>
-          <a:ln w="9525">
-            <a:noFill/>
-            <a:miter lim="800000"/>
-            <a:headEnd/>
-            <a:tailEnd/>
-          </a:ln>
-        </p:spPr>
-      </p:pic>
-      <p:sp>
-        <p:nvSpPr>
-          <p:cNvPr id="8" name="TextBox 7"/>
-          <p:cNvSpPr txBox="1"/>
-          <p:nvPr/>
-        </p:nvSpPr>
-        <p:spPr>
-          <a:xfrm>
-            <a:off x="4114800" y="5943600"/>
-            <a:ext cx="4800600" cy="646331"/>
-          </a:xfrm>
-          <a:prstGeom prst="rect">
-            <a:avLst/>
-          </a:prstGeom>
-          <a:noFill/>
-        </p:spPr>
-        <p:txBody>
-          <a:bodyPr wrap="square" rtlCol="0">
-            <a:spAutoFit/>
-          </a:bodyPr>
-          <a:lstStyle/>
-          <a:p>
-            <a:r>
-              <a:rPr lang="en-US" dirty="0"/>
-              <a:t>The thread is successfully cancelled.  “end work” is not reached</a:t>
-            </a:r>
-          </a:p>
-        </p:txBody>
-      </p:sp>
     </p:spTree>
   </p:cSld>
   <p:clrMapOvr>
@@ -9128,7 +9249,7 @@
       </p:grpSpPr>
       <p:pic>
         <p:nvPicPr>
-          <p:cNvPr id="3074" name="Picture 2"/>
+          <p:cNvPr id="2050" name="Picture 2"/>
           <p:cNvPicPr>
             <a:picLocks noChangeAspect="1" noChangeArrowheads="1"/>
           </p:cNvPicPr>
@@ -9143,8 +9264,8 @@
         </p:blipFill>
         <p:spPr bwMode="auto">
           <a:xfrm>
-            <a:off x="228600" y="0"/>
-            <a:ext cx="4791075" cy="4000500"/>
+            <a:off x="228600" y="76200"/>
+            <a:ext cx="5773994" cy="6629400"/>
           </a:xfrm>
           <a:prstGeom prst="rect">
             <a:avLst/>
@@ -9158,90 +9279,52 @@
           </a:ln>
         </p:spPr>
       </p:pic>
-      <p:pic>
-        <p:nvPicPr>
-          <p:cNvPr id="3075" name="Picture 3"/>
-          <p:cNvPicPr>
-            <a:picLocks noChangeAspect="1" noChangeArrowheads="1"/>
-          </p:cNvPicPr>
-          <p:nvPr/>
-        </p:nvPicPr>
-        <p:blipFill>
-          <a:blip r:embed="rId3" cstate="print"/>
-          <a:srcRect/>
-          <a:stretch>
-            <a:fillRect/>
-          </a:stretch>
-        </p:blipFill>
-        <p:spPr bwMode="auto">
-          <a:xfrm>
-            <a:off x="457200" y="4191000"/>
-            <a:ext cx="3947448" cy="2438400"/>
+      <p:sp>
+        <p:nvSpPr>
+          <p:cNvPr id="5" name="TextBox 4"/>
+          <p:cNvSpPr txBox="1"/>
+          <p:nvPr/>
+        </p:nvSpPr>
+        <p:spPr>
+          <a:xfrm>
+            <a:off x="5029200" y="381000"/>
+            <a:ext cx="4004966" cy="1200329"/>
           </a:xfrm>
           <a:prstGeom prst="rect">
             <a:avLst/>
           </a:prstGeom>
           <a:noFill/>
-          <a:ln w="9525">
-            <a:noFill/>
-            <a:miter lim="800000"/>
-            <a:headEnd/>
-            <a:tailEnd/>
-          </a:ln>
-        </p:spPr>
-      </p:pic>
-      <p:sp>
-        <p:nvSpPr>
-          <p:cNvPr id="7" name="TextBox 6"/>
-          <p:cNvSpPr txBox="1"/>
-          <p:nvPr/>
-        </p:nvSpPr>
-        <p:spPr>
-          <a:xfrm>
-            <a:off x="4800600" y="762000"/>
-            <a:ext cx="3834961" cy="646331"/>
-          </a:xfrm>
-          <a:prstGeom prst="rect">
-            <a:avLst/>
-          </a:prstGeom>
-          <a:noFill/>
-        </p:spPr>
-        <p:txBody>
-          <a:bodyPr wrap="none" rtlCol="0">
+        </p:spPr>
+        <p:txBody>
+          <a:bodyPr wrap="square" rtlCol="0">
             <a:spAutoFit/>
           </a:bodyPr>
           <a:lstStyle/>
           <a:p>
             <a:r>
               <a:rPr lang="en-US" dirty="0"/>
-              <a:t>If we throw a normal</a:t>
-            </a:r>
-          </a:p>
-          <a:p>
+              <a:t>If you are not using one of Java’s  blocking methods (like </a:t>
+            </a:r>
+            <a:r>
+              <a:rPr lang="en-US" dirty="0" err="1"/>
+              <a:t>Thread.sleep</a:t>
+            </a:r>
             <a:r>
               <a:rPr lang="en-US" dirty="0"/>
-              <a:t>Exception (not </a:t>
-            </a:r>
-            <a:r>
-              <a:rPr lang="en-US" dirty="0" err="1"/>
-              <a:t>InterruptedException</a:t>
-            </a:r>
-            <a:r>
-              <a:rPr lang="en-US" dirty="0"/>
-              <a:t>)…</a:t>
+              <a:t>()) that supports interruption, it is up to you to check for cancellation.</a:t>
             </a:r>
           </a:p>
         </p:txBody>
       </p:sp>
       <p:cxnSp>
         <p:nvCxnSpPr>
-          <p:cNvPr id="9" name="Straight Arrow Connector 8"/>
+          <p:cNvPr id="7" name="Straight Arrow Connector 6"/>
           <p:cNvCxnSpPr/>
           <p:nvPr/>
         </p:nvCxnSpPr>
         <p:spPr>
           <a:xfrm rot="10800000">
-            <a:off x="2971800" y="6400800"/>
+            <a:off x="4038600" y="2133600"/>
             <a:ext cx="609600" cy="1588"/>
           </a:xfrm>
           <a:prstGeom prst="straightConnector1">
@@ -9268,6 +9351,507 @@
       </p:cxnSp>
       <p:sp>
         <p:nvSpPr>
+          <p:cNvPr id="9" name="TextBox 8"/>
+          <p:cNvSpPr txBox="1"/>
+          <p:nvPr/>
+        </p:nvSpPr>
+        <p:spPr>
+          <a:xfrm>
+            <a:off x="4572000" y="1916668"/>
+            <a:ext cx="3142463" cy="369332"/>
+          </a:xfrm>
+          <a:prstGeom prst="rect">
+            <a:avLst/>
+          </a:prstGeom>
+          <a:noFill/>
+        </p:spPr>
+        <p:txBody>
+          <a:bodyPr wrap="none" rtlCol="0">
+            <a:spAutoFit/>
+          </a:bodyPr>
+          <a:lstStyle/>
+          <a:p>
+            <a:r>
+              <a:rPr lang="en-US" dirty="0"/>
+              <a:t>We don’t check for cancellation</a:t>
+            </a:r>
+          </a:p>
+        </p:txBody>
+      </p:sp>
+      <p:pic>
+        <p:nvPicPr>
+          <p:cNvPr id="2051" name="Picture 3"/>
+          <p:cNvPicPr>
+            <a:picLocks noChangeAspect="1" noChangeArrowheads="1"/>
+          </p:cNvPicPr>
+          <p:nvPr/>
+        </p:nvPicPr>
+        <p:blipFill>
+          <a:blip r:embed="rId3" cstate="print"/>
+          <a:srcRect/>
+          <a:stretch>
+            <a:fillRect/>
+          </a:stretch>
+        </p:blipFill>
+        <p:spPr bwMode="auto">
+          <a:xfrm>
+            <a:off x="3993614" y="4267200"/>
+            <a:ext cx="5150386" cy="1524000"/>
+          </a:xfrm>
+          <a:prstGeom prst="rect">
+            <a:avLst/>
+          </a:prstGeom>
+          <a:noFill/>
+          <a:ln w="9525">
+            <a:noFill/>
+            <a:miter lim="800000"/>
+            <a:headEnd/>
+            <a:tailEnd/>
+          </a:ln>
+        </p:spPr>
+      </p:pic>
+      <p:sp>
+        <p:nvSpPr>
+          <p:cNvPr id="11" name="TextBox 10"/>
+          <p:cNvSpPr txBox="1"/>
+          <p:nvPr/>
+        </p:nvSpPr>
+        <p:spPr>
+          <a:xfrm>
+            <a:off x="4114800" y="3962400"/>
+            <a:ext cx="4673011" cy="369332"/>
+          </a:xfrm>
+          <a:prstGeom prst="rect">
+            <a:avLst/>
+          </a:prstGeom>
+          <a:noFill/>
+        </p:spPr>
+        <p:txBody>
+          <a:bodyPr wrap="none" rtlCol="0">
+            <a:spAutoFit/>
+          </a:bodyPr>
+          <a:lstStyle/>
+          <a:p>
+            <a:r>
+              <a:rPr lang="en-US" dirty="0"/>
+              <a:t>Our thread continued to work after cancellation</a:t>
+            </a:r>
+          </a:p>
+        </p:txBody>
+      </p:sp>
+      <p:cxnSp>
+        <p:nvCxnSpPr>
+          <p:cNvPr id="13" name="Straight Arrow Connector 12"/>
+          <p:cNvCxnSpPr/>
+          <p:nvPr/>
+        </p:nvCxnSpPr>
+        <p:spPr>
+          <a:xfrm rot="10800000">
+            <a:off x="3505200" y="6324600"/>
+            <a:ext cx="685800" cy="1588"/>
+          </a:xfrm>
+          <a:prstGeom prst="straightConnector1">
+            <a:avLst/>
+          </a:prstGeom>
+          <a:ln>
+            <a:tailEnd type="arrow"/>
+          </a:ln>
+        </p:spPr>
+        <p:style>
+          <a:lnRef idx="1">
+            <a:schemeClr val="accent1"/>
+          </a:lnRef>
+          <a:fillRef idx="0">
+            <a:schemeClr val="accent1"/>
+          </a:fillRef>
+          <a:effectRef idx="0">
+            <a:schemeClr val="accent1"/>
+          </a:effectRef>
+          <a:fontRef idx="minor">
+            <a:schemeClr val="tx1"/>
+          </a:fontRef>
+        </p:style>
+      </p:cxnSp>
+      <p:sp>
+        <p:nvSpPr>
+          <p:cNvPr id="14" name="TextBox 13"/>
+          <p:cNvSpPr txBox="1"/>
+          <p:nvPr/>
+        </p:nvSpPr>
+        <p:spPr>
+          <a:xfrm>
+            <a:off x="4191000" y="6172200"/>
+            <a:ext cx="1688732" cy="369332"/>
+          </a:xfrm>
+          <a:prstGeom prst="rect">
+            <a:avLst/>
+          </a:prstGeom>
+          <a:noFill/>
+        </p:spPr>
+        <p:txBody>
+          <a:bodyPr wrap="none" rtlCol="0">
+            <a:spAutoFit/>
+          </a:bodyPr>
+          <a:lstStyle/>
+          <a:p>
+            <a:r>
+              <a:rPr lang="en-US" dirty="0"/>
+              <a:t>get </a:t>
+            </a:r>
+            <a:r>
+              <a:rPr lang="en-US"/>
+              <a:t>still  throws!</a:t>
+            </a:r>
+          </a:p>
+        </p:txBody>
+      </p:sp>
+    </p:spTree>
+  </p:cSld>
+  <p:clrMapOvr>
+    <a:masterClrMapping/>
+  </p:clrMapOvr>
+</p:sld>
+</file>
+
+<file path=ppt/slides/slide44.xml><?xml version="1.0" encoding="utf-8"?>
+<p:sld xmlns:a="http://schemas.openxmlformats.org/drawingml/2006/main" xmlns:r="http://schemas.openxmlformats.org/officeDocument/2006/relationships" xmlns:p="http://schemas.openxmlformats.org/presentationml/2006/main">
+  <p:cSld>
+    <p:spTree>
+      <p:nvGrpSpPr>
+        <p:cNvPr id="1" name=""/>
+        <p:cNvGrpSpPr/>
+        <p:nvPr/>
+      </p:nvGrpSpPr>
+      <p:grpSpPr>
+        <a:xfrm>
+          <a:off x="0" y="0"/>
+          <a:ext cx="0" cy="0"/>
+          <a:chOff x="0" y="0"/>
+          <a:chExt cx="0" cy="0"/>
+        </a:xfrm>
+      </p:grpSpPr>
+      <p:pic>
+        <p:nvPicPr>
+          <p:cNvPr id="1027" name="Picture 3"/>
+          <p:cNvPicPr>
+            <a:picLocks noChangeAspect="1" noChangeArrowheads="1"/>
+          </p:cNvPicPr>
+          <p:nvPr/>
+        </p:nvPicPr>
+        <p:blipFill>
+          <a:blip r:embed="rId2" cstate="print"/>
+          <a:srcRect/>
+          <a:stretch>
+            <a:fillRect/>
+          </a:stretch>
+        </p:blipFill>
+        <p:spPr bwMode="auto">
+          <a:xfrm>
+            <a:off x="457200" y="304800"/>
+            <a:ext cx="5112774" cy="6400800"/>
+          </a:xfrm>
+          <a:prstGeom prst="rect">
+            <a:avLst/>
+          </a:prstGeom>
+          <a:noFill/>
+          <a:ln w="9525">
+            <a:noFill/>
+            <a:miter lim="800000"/>
+            <a:headEnd/>
+            <a:tailEnd/>
+          </a:ln>
+        </p:spPr>
+      </p:pic>
+      <p:cxnSp>
+        <p:nvCxnSpPr>
+          <p:cNvPr id="5" name="Straight Arrow Connector 4"/>
+          <p:cNvCxnSpPr/>
+          <p:nvPr/>
+        </p:nvCxnSpPr>
+        <p:spPr>
+          <a:xfrm rot="10800000">
+            <a:off x="3886200" y="2132011"/>
+            <a:ext cx="838200" cy="1588"/>
+          </a:xfrm>
+          <a:prstGeom prst="straightConnector1">
+            <a:avLst/>
+          </a:prstGeom>
+          <a:ln>
+            <a:tailEnd type="arrow"/>
+          </a:ln>
+        </p:spPr>
+        <p:style>
+          <a:lnRef idx="1">
+            <a:schemeClr val="accent1"/>
+          </a:lnRef>
+          <a:fillRef idx="0">
+            <a:schemeClr val="accent1"/>
+          </a:fillRef>
+          <a:effectRef idx="0">
+            <a:schemeClr val="accent1"/>
+          </a:effectRef>
+          <a:fontRef idx="minor">
+            <a:schemeClr val="tx1"/>
+          </a:fontRef>
+        </p:style>
+      </p:cxnSp>
+      <p:sp>
+        <p:nvSpPr>
+          <p:cNvPr id="6" name="TextBox 5"/>
+          <p:cNvSpPr txBox="1"/>
+          <p:nvPr/>
+        </p:nvSpPr>
+        <p:spPr>
+          <a:xfrm>
+            <a:off x="5410200" y="533400"/>
+            <a:ext cx="2791598" cy="369332"/>
+          </a:xfrm>
+          <a:prstGeom prst="rect">
+            <a:avLst/>
+          </a:prstGeom>
+          <a:noFill/>
+        </p:spPr>
+        <p:txBody>
+          <a:bodyPr wrap="none" rtlCol="0">
+            <a:spAutoFit/>
+          </a:bodyPr>
+          <a:lstStyle/>
+          <a:p>
+            <a:r>
+              <a:rPr lang="en-US" dirty="0"/>
+              <a:t>Our cancellation now works</a:t>
+            </a:r>
+          </a:p>
+        </p:txBody>
+      </p:sp>
+      <p:pic>
+        <p:nvPicPr>
+          <p:cNvPr id="1028" name="Picture 4"/>
+          <p:cNvPicPr>
+            <a:picLocks noChangeAspect="1" noChangeArrowheads="1"/>
+          </p:cNvPicPr>
+          <p:nvPr/>
+        </p:nvPicPr>
+        <p:blipFill>
+          <a:blip r:embed="rId3" cstate="print"/>
+          <a:srcRect/>
+          <a:stretch>
+            <a:fillRect/>
+          </a:stretch>
+        </p:blipFill>
+        <p:spPr bwMode="auto">
+          <a:xfrm>
+            <a:off x="3810000" y="4419600"/>
+            <a:ext cx="5124450" cy="1480594"/>
+          </a:xfrm>
+          <a:prstGeom prst="rect">
+            <a:avLst/>
+          </a:prstGeom>
+          <a:noFill/>
+          <a:ln w="9525">
+            <a:noFill/>
+            <a:miter lim="800000"/>
+            <a:headEnd/>
+            <a:tailEnd/>
+          </a:ln>
+        </p:spPr>
+      </p:pic>
+      <p:sp>
+        <p:nvSpPr>
+          <p:cNvPr id="8" name="TextBox 7"/>
+          <p:cNvSpPr txBox="1"/>
+          <p:nvPr/>
+        </p:nvSpPr>
+        <p:spPr>
+          <a:xfrm>
+            <a:off x="4114800" y="5943600"/>
+            <a:ext cx="4800600" cy="646331"/>
+          </a:xfrm>
+          <a:prstGeom prst="rect">
+            <a:avLst/>
+          </a:prstGeom>
+          <a:noFill/>
+        </p:spPr>
+        <p:txBody>
+          <a:bodyPr wrap="square" rtlCol="0">
+            <a:spAutoFit/>
+          </a:bodyPr>
+          <a:lstStyle/>
+          <a:p>
+            <a:r>
+              <a:rPr lang="en-US" dirty="0"/>
+              <a:t>The thread is successfully cancelled.  “end work” is not reached</a:t>
+            </a:r>
+          </a:p>
+        </p:txBody>
+      </p:sp>
+    </p:spTree>
+  </p:cSld>
+  <p:clrMapOvr>
+    <a:masterClrMapping/>
+  </p:clrMapOvr>
+</p:sld>
+</file>
+
+<file path=ppt/slides/slide45.xml><?xml version="1.0" encoding="utf-8"?>
+<p:sld xmlns:a="http://schemas.openxmlformats.org/drawingml/2006/main" xmlns:r="http://schemas.openxmlformats.org/officeDocument/2006/relationships" xmlns:p="http://schemas.openxmlformats.org/presentationml/2006/main">
+  <p:cSld>
+    <p:spTree>
+      <p:nvGrpSpPr>
+        <p:cNvPr id="1" name=""/>
+        <p:cNvGrpSpPr/>
+        <p:nvPr/>
+      </p:nvGrpSpPr>
+      <p:grpSpPr>
+        <a:xfrm>
+          <a:off x="0" y="0"/>
+          <a:ext cx="0" cy="0"/>
+          <a:chOff x="0" y="0"/>
+          <a:chExt cx="0" cy="0"/>
+        </a:xfrm>
+      </p:grpSpPr>
+      <p:pic>
+        <p:nvPicPr>
+          <p:cNvPr id="3074" name="Picture 2"/>
+          <p:cNvPicPr>
+            <a:picLocks noChangeAspect="1" noChangeArrowheads="1"/>
+          </p:cNvPicPr>
+          <p:nvPr/>
+        </p:nvPicPr>
+        <p:blipFill>
+          <a:blip r:embed="rId2" cstate="print"/>
+          <a:srcRect/>
+          <a:stretch>
+            <a:fillRect/>
+          </a:stretch>
+        </p:blipFill>
+        <p:spPr bwMode="auto">
+          <a:xfrm>
+            <a:off x="228600" y="0"/>
+            <a:ext cx="4791075" cy="4000500"/>
+          </a:xfrm>
+          <a:prstGeom prst="rect">
+            <a:avLst/>
+          </a:prstGeom>
+          <a:noFill/>
+          <a:ln w="9525">
+            <a:noFill/>
+            <a:miter lim="800000"/>
+            <a:headEnd/>
+            <a:tailEnd/>
+          </a:ln>
+        </p:spPr>
+      </p:pic>
+      <p:pic>
+        <p:nvPicPr>
+          <p:cNvPr id="3075" name="Picture 3"/>
+          <p:cNvPicPr>
+            <a:picLocks noChangeAspect="1" noChangeArrowheads="1"/>
+          </p:cNvPicPr>
+          <p:nvPr/>
+        </p:nvPicPr>
+        <p:blipFill>
+          <a:blip r:embed="rId3" cstate="print"/>
+          <a:srcRect/>
+          <a:stretch>
+            <a:fillRect/>
+          </a:stretch>
+        </p:blipFill>
+        <p:spPr bwMode="auto">
+          <a:xfrm>
+            <a:off x="457200" y="4191000"/>
+            <a:ext cx="3947448" cy="2438400"/>
+          </a:xfrm>
+          <a:prstGeom prst="rect">
+            <a:avLst/>
+          </a:prstGeom>
+          <a:noFill/>
+          <a:ln w="9525">
+            <a:noFill/>
+            <a:miter lim="800000"/>
+            <a:headEnd/>
+            <a:tailEnd/>
+          </a:ln>
+        </p:spPr>
+      </p:pic>
+      <p:sp>
+        <p:nvSpPr>
+          <p:cNvPr id="7" name="TextBox 6"/>
+          <p:cNvSpPr txBox="1"/>
+          <p:nvPr/>
+        </p:nvSpPr>
+        <p:spPr>
+          <a:xfrm>
+            <a:off x="4800600" y="762000"/>
+            <a:ext cx="3834961" cy="646331"/>
+          </a:xfrm>
+          <a:prstGeom prst="rect">
+            <a:avLst/>
+          </a:prstGeom>
+          <a:noFill/>
+        </p:spPr>
+        <p:txBody>
+          <a:bodyPr wrap="none" rtlCol="0">
+            <a:spAutoFit/>
+          </a:bodyPr>
+          <a:lstStyle/>
+          <a:p>
+            <a:r>
+              <a:rPr lang="en-US" dirty="0"/>
+              <a:t>If we throw a normal</a:t>
+            </a:r>
+          </a:p>
+          <a:p>
+            <a:r>
+              <a:rPr lang="en-US" dirty="0"/>
+              <a:t>Exception (not </a:t>
+            </a:r>
+            <a:r>
+              <a:rPr lang="en-US" dirty="0" err="1"/>
+              <a:t>InterruptedException</a:t>
+            </a:r>
+            <a:r>
+              <a:rPr lang="en-US" dirty="0"/>
+              <a:t>)…</a:t>
+            </a:r>
+          </a:p>
+        </p:txBody>
+      </p:sp>
+      <p:cxnSp>
+        <p:nvCxnSpPr>
+          <p:cNvPr id="9" name="Straight Arrow Connector 8"/>
+          <p:cNvCxnSpPr/>
+          <p:nvPr/>
+        </p:nvCxnSpPr>
+        <p:spPr>
+          <a:xfrm rot="10800000">
+            <a:off x="2971800" y="6400800"/>
+            <a:ext cx="609600" cy="1588"/>
+          </a:xfrm>
+          <a:prstGeom prst="straightConnector1">
+            <a:avLst/>
+          </a:prstGeom>
+          <a:ln>
+            <a:tailEnd type="arrow"/>
+          </a:ln>
+        </p:spPr>
+        <p:style>
+          <a:lnRef idx="1">
+            <a:schemeClr val="accent1"/>
+          </a:lnRef>
+          <a:fillRef idx="0">
+            <a:schemeClr val="accent1"/>
+          </a:fillRef>
+          <a:effectRef idx="0">
+            <a:schemeClr val="accent1"/>
+          </a:effectRef>
+          <a:fontRef idx="minor">
+            <a:schemeClr val="tx1"/>
+          </a:fontRef>
+        </p:style>
+      </p:cxnSp>
+      <p:sp>
+        <p:nvSpPr>
           <p:cNvPr id="10" name="TextBox 9"/>
           <p:cNvSpPr txBox="1"/>
           <p:nvPr/>
@@ -9340,7 +9924,7 @@
 </p:sld>
 </file>
 
-<file path=ppt/slides/slide44.xml><?xml version="1.0" encoding="utf-8"?>
+<file path=ppt/slides/slide46.xml><?xml version="1.0" encoding="utf-8"?>
 <p:sld xmlns:a="http://schemas.openxmlformats.org/drawingml/2006/main" xmlns:r="http://schemas.openxmlformats.org/officeDocument/2006/relationships" xmlns:p="http://schemas.openxmlformats.org/presentationml/2006/main">
   <p:cSld>
     <p:spTree>

</xml_diff>